<commit_message>
Finished the first section
</commit_message>
<xml_diff>
--- a/ScalaLecture/source/resources/Graphics.pptx
+++ b/ScalaLecture/source/resources/Graphics.pptx
@@ -7,6 +7,9 @@
   <p:sldIdLst>
     <p:sldId id="256" r:id="rId2"/>
     <p:sldId id="257" r:id="rId3"/>
+    <p:sldId id="260" r:id="rId4"/>
+    <p:sldId id="259" r:id="rId5"/>
+    <p:sldId id="261" r:id="rId6"/>
   </p:sldIdLst>
   <p:sldSz cx="9144000" cy="6858000" type="screen4x3"/>
   <p:notesSz cx="6858000" cy="9144000"/>
@@ -290,7 +293,7 @@
             <a:fld id="{1D8BD707-D9CF-40AE-B4C6-C98DA3205C09}" type="datetimeFigureOut">
               <a:rPr lang="en-US" smtClean="0"/>
               <a:pPr/>
-              <a:t>2/27/2012</a:t>
+              <a:t>2/28/2012</a:t>
             </a:fld>
             <a:endParaRPr lang="en-US"/>
           </a:p>
@@ -457,7 +460,7 @@
             <a:fld id="{1D8BD707-D9CF-40AE-B4C6-C98DA3205C09}" type="datetimeFigureOut">
               <a:rPr lang="en-US" smtClean="0"/>
               <a:pPr/>
-              <a:t>2/27/2012</a:t>
+              <a:t>2/28/2012</a:t>
             </a:fld>
             <a:endParaRPr lang="en-US"/>
           </a:p>
@@ -634,7 +637,7 @@
             <a:fld id="{1D8BD707-D9CF-40AE-B4C6-C98DA3205C09}" type="datetimeFigureOut">
               <a:rPr lang="en-US" smtClean="0"/>
               <a:pPr/>
-              <a:t>2/27/2012</a:t>
+              <a:t>2/28/2012</a:t>
             </a:fld>
             <a:endParaRPr lang="en-US"/>
           </a:p>
@@ -801,7 +804,7 @@
             <a:fld id="{1D8BD707-D9CF-40AE-B4C6-C98DA3205C09}" type="datetimeFigureOut">
               <a:rPr lang="en-US" smtClean="0"/>
               <a:pPr/>
-              <a:t>2/27/2012</a:t>
+              <a:t>2/28/2012</a:t>
             </a:fld>
             <a:endParaRPr lang="en-US"/>
           </a:p>
@@ -1044,7 +1047,7 @@
             <a:fld id="{1D8BD707-D9CF-40AE-B4C6-C98DA3205C09}" type="datetimeFigureOut">
               <a:rPr lang="en-US" smtClean="0"/>
               <a:pPr/>
-              <a:t>2/27/2012</a:t>
+              <a:t>2/28/2012</a:t>
             </a:fld>
             <a:endParaRPr lang="en-US"/>
           </a:p>
@@ -1329,7 +1332,7 @@
             <a:fld id="{1D8BD707-D9CF-40AE-B4C6-C98DA3205C09}" type="datetimeFigureOut">
               <a:rPr lang="en-US" smtClean="0"/>
               <a:pPr/>
-              <a:t>2/27/2012</a:t>
+              <a:t>2/28/2012</a:t>
             </a:fld>
             <a:endParaRPr lang="en-US"/>
           </a:p>
@@ -1748,7 +1751,7 @@
             <a:fld id="{1D8BD707-D9CF-40AE-B4C6-C98DA3205C09}" type="datetimeFigureOut">
               <a:rPr lang="en-US" smtClean="0"/>
               <a:pPr/>
-              <a:t>2/27/2012</a:t>
+              <a:t>2/28/2012</a:t>
             </a:fld>
             <a:endParaRPr lang="en-US"/>
           </a:p>
@@ -1863,7 +1866,7 @@
             <a:fld id="{1D8BD707-D9CF-40AE-B4C6-C98DA3205C09}" type="datetimeFigureOut">
               <a:rPr lang="en-US" smtClean="0"/>
               <a:pPr/>
-              <a:t>2/27/2012</a:t>
+              <a:t>2/28/2012</a:t>
             </a:fld>
             <a:endParaRPr lang="en-US"/>
           </a:p>
@@ -1955,7 +1958,7 @@
             <a:fld id="{1D8BD707-D9CF-40AE-B4C6-C98DA3205C09}" type="datetimeFigureOut">
               <a:rPr lang="en-US" smtClean="0"/>
               <a:pPr/>
-              <a:t>2/27/2012</a:t>
+              <a:t>2/28/2012</a:t>
             </a:fld>
             <a:endParaRPr lang="en-US"/>
           </a:p>
@@ -2229,7 +2232,7 @@
             <a:fld id="{1D8BD707-D9CF-40AE-B4C6-C98DA3205C09}" type="datetimeFigureOut">
               <a:rPr lang="en-US" smtClean="0"/>
               <a:pPr/>
-              <a:t>2/27/2012</a:t>
+              <a:t>2/28/2012</a:t>
             </a:fld>
             <a:endParaRPr lang="en-US"/>
           </a:p>
@@ -2479,7 +2482,7 @@
             <a:fld id="{1D8BD707-D9CF-40AE-B4C6-C98DA3205C09}" type="datetimeFigureOut">
               <a:rPr lang="en-US" smtClean="0"/>
               <a:pPr/>
-              <a:t>2/27/2012</a:t>
+              <a:t>2/28/2012</a:t>
             </a:fld>
             <a:endParaRPr lang="en-US"/>
           </a:p>
@@ -2689,7 +2692,7 @@
             <a:fld id="{1D8BD707-D9CF-40AE-B4C6-C98DA3205C09}" type="datetimeFigureOut">
               <a:rPr lang="en-US" smtClean="0"/>
               <a:pPr/>
-              <a:t>2/27/2012</a:t>
+              <a:t>2/28/2012</a:t>
             </a:fld>
             <a:endParaRPr lang="en-US"/>
           </a:p>
@@ -4060,6 +4063,1463 @@
     <p:extLst>
       <p:ext uri="{BB962C8B-B14F-4D97-AF65-F5344CB8AC3E}">
         <p14:creationId xmlns:p14="http://schemas.microsoft.com/office/powerpoint/2010/main" val="1400059582"/>
+      </p:ext>
+    </p:extLst>
+  </p:cSld>
+  <p:clrMapOvr>
+    <a:masterClrMapping/>
+  </p:clrMapOvr>
+  <p:timing>
+    <p:tnLst>
+      <p:par>
+        <p:cTn id="1" dur="indefinite" restart="never" nodeType="tmRoot"/>
+      </p:par>
+    </p:tnLst>
+  </p:timing>
+</p:sld>
+</file>
+
+<file path=ppt/slides/slide3.xml><?xml version="1.0" encoding="utf-8"?>
+<p:sld xmlns:a="http://schemas.openxmlformats.org/drawingml/2006/main" xmlns:r="http://schemas.openxmlformats.org/officeDocument/2006/relationships" xmlns:p="http://schemas.openxmlformats.org/presentationml/2006/main">
+  <p:cSld>
+    <p:spTree>
+      <p:nvGrpSpPr>
+        <p:cNvPr id="1" name=""/>
+        <p:cNvGrpSpPr/>
+        <p:nvPr/>
+      </p:nvGrpSpPr>
+      <p:grpSpPr>
+        <a:xfrm>
+          <a:off x="0" y="0"/>
+          <a:ext cx="0" cy="0"/>
+          <a:chOff x="0" y="0"/>
+          <a:chExt cx="0" cy="0"/>
+        </a:xfrm>
+      </p:grpSpPr>
+      <p:pic>
+        <p:nvPicPr>
+          <p:cNvPr id="1026" name="Picture 2" descr="D:\Dropbox\Documents\Papers\ScalaLecture\source\resources\Linux.jpg"/>
+          <p:cNvPicPr>
+            <a:picLocks noChangeAspect="1" noChangeArrowheads="1"/>
+          </p:cNvPicPr>
+          <p:nvPr/>
+        </p:nvPicPr>
+        <p:blipFill>
+          <a:blip r:embed="rId2">
+            <a:extLst>
+              <a:ext uri="{28A0092B-C50C-407E-A947-70E740481C1C}">
+                <a14:useLocalDpi xmlns:a14="http://schemas.microsoft.com/office/drawing/2010/main" val="0"/>
+              </a:ext>
+            </a:extLst>
+          </a:blip>
+          <a:srcRect/>
+          <a:stretch>
+            <a:fillRect/>
+          </a:stretch>
+        </p:blipFill>
+        <p:spPr bwMode="auto">
+          <a:xfrm>
+            <a:off x="7540389" y="685800"/>
+            <a:ext cx="1451211" cy="1451211"/>
+          </a:xfrm>
+          <a:prstGeom prst="rect">
+            <a:avLst/>
+          </a:prstGeom>
+          <a:noFill/>
+          <a:extLst>
+            <a:ext uri="{909E8E84-426E-40DD-AFC4-6F175D3DCCD1}">
+              <a14:hiddenFill xmlns:a14="http://schemas.microsoft.com/office/drawing/2010/main">
+                <a:solidFill>
+                  <a:srgbClr val="FFFFFF"/>
+                </a:solidFill>
+              </a14:hiddenFill>
+            </a:ext>
+          </a:extLst>
+        </p:spPr>
+      </p:pic>
+      <p:pic>
+        <p:nvPicPr>
+          <p:cNvPr id="1027" name="Picture 3" descr="D:\Dropbox\Documents\Papers\ScalaLecture\source\resources\Mac.jpg"/>
+          <p:cNvPicPr>
+            <a:picLocks noChangeAspect="1" noChangeArrowheads="1"/>
+          </p:cNvPicPr>
+          <p:nvPr/>
+        </p:nvPicPr>
+        <p:blipFill>
+          <a:blip r:embed="rId3">
+            <a:extLst>
+              <a:ext uri="{28A0092B-C50C-407E-A947-70E740481C1C}">
+                <a14:useLocalDpi xmlns:a14="http://schemas.microsoft.com/office/drawing/2010/main" val="0"/>
+              </a:ext>
+            </a:extLst>
+          </a:blip>
+          <a:srcRect/>
+          <a:stretch>
+            <a:fillRect/>
+          </a:stretch>
+        </p:blipFill>
+        <p:spPr bwMode="auto">
+          <a:xfrm>
+            <a:off x="7634728" y="4419600"/>
+            <a:ext cx="1280672" cy="1524000"/>
+          </a:xfrm>
+          <a:prstGeom prst="rect">
+            <a:avLst/>
+          </a:prstGeom>
+          <a:noFill/>
+          <a:extLst>
+            <a:ext uri="{909E8E84-426E-40DD-AFC4-6F175D3DCCD1}">
+              <a14:hiddenFill xmlns:a14="http://schemas.microsoft.com/office/drawing/2010/main">
+                <a:solidFill>
+                  <a:srgbClr val="FFFFFF"/>
+                </a:solidFill>
+              </a14:hiddenFill>
+            </a:ext>
+          </a:extLst>
+        </p:spPr>
+      </p:pic>
+      <p:pic>
+        <p:nvPicPr>
+          <p:cNvPr id="1028" name="Picture 4" descr="D:\Dropbox\Documents\Papers\ScalaLecture\source\resources\Windows.png"/>
+          <p:cNvPicPr>
+            <a:picLocks noChangeAspect="1" noChangeArrowheads="1"/>
+          </p:cNvPicPr>
+          <p:nvPr/>
+        </p:nvPicPr>
+        <p:blipFill>
+          <a:blip r:embed="rId4">
+            <a:extLst>
+              <a:ext uri="{28A0092B-C50C-407E-A947-70E740481C1C}">
+                <a14:useLocalDpi xmlns:a14="http://schemas.microsoft.com/office/drawing/2010/main" val="0"/>
+              </a:ext>
+            </a:extLst>
+          </a:blip>
+          <a:srcRect/>
+          <a:stretch>
+            <a:fillRect/>
+          </a:stretch>
+        </p:blipFill>
+        <p:spPr bwMode="auto">
+          <a:xfrm>
+            <a:off x="7705726" y="2667000"/>
+            <a:ext cx="1285874" cy="1285874"/>
+          </a:xfrm>
+          <a:prstGeom prst="rect">
+            <a:avLst/>
+          </a:prstGeom>
+          <a:noFill/>
+          <a:extLst>
+            <a:ext uri="{909E8E84-426E-40DD-AFC4-6F175D3DCCD1}">
+              <a14:hiddenFill xmlns:a14="http://schemas.microsoft.com/office/drawing/2010/main">
+                <a:solidFill>
+                  <a:srgbClr val="FFFFFF"/>
+                </a:solidFill>
+              </a14:hiddenFill>
+            </a:ext>
+          </a:extLst>
+        </p:spPr>
+      </p:pic>
+      <p:sp>
+        <p:nvSpPr>
+          <p:cNvPr id="14" name="Right Arrow 13"/>
+          <p:cNvSpPr/>
+          <p:nvPr/>
+        </p:nvSpPr>
+        <p:spPr>
+          <a:xfrm>
+            <a:off x="1371600" y="2999096"/>
+            <a:ext cx="2819401" cy="533400"/>
+          </a:xfrm>
+          <a:prstGeom prst="rightArrow">
+            <a:avLst/>
+          </a:prstGeom>
+          <a:solidFill>
+            <a:srgbClr val="0070C0"/>
+          </a:solidFill>
+          <a:ln>
+            <a:solidFill>
+              <a:srgbClr val="0070C0"/>
+            </a:solidFill>
+          </a:ln>
+        </p:spPr>
+        <p:style>
+          <a:lnRef idx="2">
+            <a:schemeClr val="accent1">
+              <a:shade val="50000"/>
+            </a:schemeClr>
+          </a:lnRef>
+          <a:fillRef idx="1">
+            <a:schemeClr val="accent1"/>
+          </a:fillRef>
+          <a:effectRef idx="0">
+            <a:schemeClr val="accent1"/>
+          </a:effectRef>
+          <a:fontRef idx="minor">
+            <a:schemeClr val="lt1"/>
+          </a:fontRef>
+        </p:style>
+        <p:txBody>
+          <a:bodyPr rtlCol="0" anchor="ctr"/>
+          <a:lstStyle/>
+          <a:p>
+            <a:pPr algn="ctr"/>
+            <a:r>
+              <a:rPr lang="en-US" dirty="0" smtClean="0">
+                <a:latin typeface="Comic Sans MS" pitchFamily="66" charset="0"/>
+              </a:rPr>
+              <a:t>compiles to </a:t>
+            </a:r>
+            <a:r>
+              <a:rPr lang="en-US" dirty="0" err="1" smtClean="0">
+                <a:latin typeface="Comic Sans MS" pitchFamily="66" charset="0"/>
+              </a:rPr>
+              <a:t>bytecode</a:t>
+            </a:r>
+            <a:endParaRPr lang="en-US" dirty="0">
+              <a:latin typeface="Comic Sans MS" pitchFamily="66" charset="0"/>
+            </a:endParaRPr>
+          </a:p>
+        </p:txBody>
+      </p:sp>
+      <p:sp>
+        <p:nvSpPr>
+          <p:cNvPr id="15" name="Right Arrow 14"/>
+          <p:cNvSpPr/>
+          <p:nvPr/>
+        </p:nvSpPr>
+        <p:spPr>
+          <a:xfrm>
+            <a:off x="5527789" y="2999096"/>
+            <a:ext cx="1676400" cy="533400"/>
+          </a:xfrm>
+          <a:prstGeom prst="rightArrow">
+            <a:avLst/>
+          </a:prstGeom>
+          <a:solidFill>
+            <a:srgbClr val="0070C0"/>
+          </a:solidFill>
+          <a:ln>
+            <a:solidFill>
+              <a:srgbClr val="0070C0"/>
+            </a:solidFill>
+          </a:ln>
+        </p:spPr>
+        <p:style>
+          <a:lnRef idx="2">
+            <a:schemeClr val="accent1">
+              <a:shade val="50000"/>
+            </a:schemeClr>
+          </a:lnRef>
+          <a:fillRef idx="1">
+            <a:schemeClr val="accent1"/>
+          </a:fillRef>
+          <a:effectRef idx="0">
+            <a:schemeClr val="accent1"/>
+          </a:effectRef>
+          <a:fontRef idx="minor">
+            <a:schemeClr val="lt1"/>
+          </a:fontRef>
+        </p:style>
+        <p:txBody>
+          <a:bodyPr rtlCol="0" anchor="ctr"/>
+          <a:lstStyle/>
+          <a:p>
+            <a:pPr algn="ctr"/>
+            <a:r>
+              <a:rPr lang="en-US" dirty="0" smtClean="0">
+                <a:latin typeface="Comic Sans MS" pitchFamily="66" charset="0"/>
+              </a:rPr>
+              <a:t>runs on</a:t>
+            </a:r>
+            <a:endParaRPr lang="en-US" dirty="0">
+              <a:latin typeface="Comic Sans MS" pitchFamily="66" charset="0"/>
+            </a:endParaRPr>
+          </a:p>
+        </p:txBody>
+      </p:sp>
+      <p:sp>
+        <p:nvSpPr>
+          <p:cNvPr id="16" name="Right Arrow 15"/>
+          <p:cNvSpPr/>
+          <p:nvPr/>
+        </p:nvSpPr>
+        <p:spPr>
+          <a:xfrm rot="20356900">
+            <a:off x="5299189" y="1974302"/>
+            <a:ext cx="1905000" cy="533400"/>
+          </a:xfrm>
+          <a:prstGeom prst="rightArrow">
+            <a:avLst/>
+          </a:prstGeom>
+          <a:solidFill>
+            <a:srgbClr val="0070C0"/>
+          </a:solidFill>
+          <a:ln>
+            <a:solidFill>
+              <a:srgbClr val="0070C0"/>
+            </a:solidFill>
+          </a:ln>
+        </p:spPr>
+        <p:style>
+          <a:lnRef idx="2">
+            <a:schemeClr val="accent1">
+              <a:shade val="50000"/>
+            </a:schemeClr>
+          </a:lnRef>
+          <a:fillRef idx="1">
+            <a:schemeClr val="accent1"/>
+          </a:fillRef>
+          <a:effectRef idx="0">
+            <a:schemeClr val="accent1"/>
+          </a:effectRef>
+          <a:fontRef idx="minor">
+            <a:schemeClr val="lt1"/>
+          </a:fontRef>
+        </p:style>
+        <p:txBody>
+          <a:bodyPr rtlCol="0" anchor="ctr"/>
+          <a:lstStyle/>
+          <a:p>
+            <a:pPr algn="ctr"/>
+            <a:r>
+              <a:rPr lang="en-US" dirty="0" smtClean="0">
+                <a:latin typeface="Comic Sans MS" pitchFamily="66" charset="0"/>
+              </a:rPr>
+              <a:t>runs on</a:t>
+            </a:r>
+            <a:endParaRPr lang="en-US" dirty="0">
+              <a:latin typeface="Comic Sans MS" pitchFamily="66" charset="0"/>
+            </a:endParaRPr>
+          </a:p>
+        </p:txBody>
+      </p:sp>
+      <p:sp>
+        <p:nvSpPr>
+          <p:cNvPr id="17" name="Right Arrow 16"/>
+          <p:cNvSpPr/>
+          <p:nvPr/>
+        </p:nvSpPr>
+        <p:spPr>
+          <a:xfrm rot="1147277">
+            <a:off x="5299189" y="4031095"/>
+            <a:ext cx="1905000" cy="533400"/>
+          </a:xfrm>
+          <a:prstGeom prst="rightArrow">
+            <a:avLst/>
+          </a:prstGeom>
+          <a:solidFill>
+            <a:srgbClr val="0070C0"/>
+          </a:solidFill>
+          <a:ln>
+            <a:solidFill>
+              <a:srgbClr val="0070C0"/>
+            </a:solidFill>
+          </a:ln>
+        </p:spPr>
+        <p:style>
+          <a:lnRef idx="2">
+            <a:schemeClr val="accent1">
+              <a:shade val="50000"/>
+            </a:schemeClr>
+          </a:lnRef>
+          <a:fillRef idx="1">
+            <a:schemeClr val="accent1"/>
+          </a:fillRef>
+          <a:effectRef idx="0">
+            <a:schemeClr val="accent1"/>
+          </a:effectRef>
+          <a:fontRef idx="minor">
+            <a:schemeClr val="lt1"/>
+          </a:fontRef>
+        </p:style>
+        <p:txBody>
+          <a:bodyPr rtlCol="0" anchor="ctr"/>
+          <a:lstStyle/>
+          <a:p>
+            <a:pPr algn="ctr"/>
+            <a:r>
+              <a:rPr lang="en-US" dirty="0" smtClean="0">
+                <a:latin typeface="Comic Sans MS" pitchFamily="66" charset="0"/>
+              </a:rPr>
+              <a:t>runs on</a:t>
+            </a:r>
+            <a:endParaRPr lang="en-US" dirty="0">
+              <a:latin typeface="Comic Sans MS" pitchFamily="66" charset="0"/>
+            </a:endParaRPr>
+          </a:p>
+        </p:txBody>
+      </p:sp>
+      <p:pic>
+        <p:nvPicPr>
+          <p:cNvPr id="5" name="Picture 3" descr="D:\Dropbox\Documents\Papers\ScalaLecture\source\resources\jvm.png"/>
+          <p:cNvPicPr>
+            <a:picLocks noChangeAspect="1" noChangeArrowheads="1"/>
+          </p:cNvPicPr>
+          <p:nvPr/>
+        </p:nvPicPr>
+        <p:blipFill>
+          <a:blip r:embed="rId5" cstate="print">
+            <a:extLst>
+              <a:ext uri="{28A0092B-C50C-407E-A947-70E740481C1C}">
+                <a14:useLocalDpi xmlns:a14="http://schemas.microsoft.com/office/drawing/2010/main" val="0"/>
+              </a:ext>
+            </a:extLst>
+          </a:blip>
+          <a:srcRect/>
+          <a:stretch>
+            <a:fillRect/>
+          </a:stretch>
+        </p:blipFill>
+        <p:spPr bwMode="auto">
+          <a:xfrm>
+            <a:off x="4212312" y="2809875"/>
+            <a:ext cx="1121688" cy="923925"/>
+          </a:xfrm>
+          <a:prstGeom prst="rect">
+            <a:avLst/>
+          </a:prstGeom>
+          <a:noFill/>
+          <a:extLst>
+            <a:ext uri="{909E8E84-426E-40DD-AFC4-6F175D3DCCD1}">
+              <a14:hiddenFill xmlns:a14="http://schemas.microsoft.com/office/drawing/2010/main">
+                <a:solidFill>
+                  <a:srgbClr val="FFFFFF"/>
+                </a:solidFill>
+              </a14:hiddenFill>
+            </a:ext>
+          </a:extLst>
+        </p:spPr>
+      </p:pic>
+      <p:pic>
+        <p:nvPicPr>
+          <p:cNvPr id="12" name="Picture 11" descr="D:\Dropbox\Documents\Papers\ScalaLecture\source\resources\QuestionMark.jpg"/>
+          <p:cNvPicPr>
+            <a:picLocks noChangeAspect="1" noChangeArrowheads="1"/>
+          </p:cNvPicPr>
+          <p:nvPr/>
+        </p:nvPicPr>
+        <p:blipFill>
+          <a:blip r:embed="rId6" cstate="print">
+            <a:extLst>
+              <a:ext uri="{28A0092B-C50C-407E-A947-70E740481C1C}">
+                <a14:useLocalDpi xmlns:a14="http://schemas.microsoft.com/office/drawing/2010/main" val="0"/>
+              </a:ext>
+            </a:extLst>
+          </a:blip>
+          <a:srcRect/>
+          <a:stretch>
+            <a:fillRect/>
+          </a:stretch>
+        </p:blipFill>
+        <p:spPr bwMode="auto">
+          <a:xfrm>
+            <a:off x="136525" y="2667000"/>
+            <a:ext cx="1158875" cy="1158875"/>
+          </a:xfrm>
+          <a:prstGeom prst="rect">
+            <a:avLst/>
+          </a:prstGeom>
+          <a:noFill/>
+          <a:extLst>
+            <a:ext uri="{909E8E84-426E-40DD-AFC4-6F175D3DCCD1}">
+              <a14:hiddenFill xmlns:a14="http://schemas.microsoft.com/office/drawing/2010/main">
+                <a:solidFill>
+                  <a:srgbClr val="FFFFFF"/>
+                </a:solidFill>
+              </a14:hiddenFill>
+            </a:ext>
+          </a:extLst>
+        </p:spPr>
+      </p:pic>
+    </p:spTree>
+    <p:extLst>
+      <p:ext uri="{BB962C8B-B14F-4D97-AF65-F5344CB8AC3E}">
+        <p14:creationId xmlns:p14="http://schemas.microsoft.com/office/powerpoint/2010/main" val="3824848655"/>
+      </p:ext>
+    </p:extLst>
+  </p:cSld>
+  <p:clrMapOvr>
+    <a:masterClrMapping/>
+  </p:clrMapOvr>
+  <p:timing>
+    <p:tnLst>
+      <p:par>
+        <p:cTn id="1" dur="indefinite" restart="never" nodeType="tmRoot"/>
+      </p:par>
+    </p:tnLst>
+  </p:timing>
+</p:sld>
+</file>
+
+<file path=ppt/slides/slide4.xml><?xml version="1.0" encoding="utf-8"?>
+<p:sld xmlns:a="http://schemas.openxmlformats.org/drawingml/2006/main" xmlns:r="http://schemas.openxmlformats.org/officeDocument/2006/relationships" xmlns:p="http://schemas.openxmlformats.org/presentationml/2006/main">
+  <p:cSld>
+    <p:spTree>
+      <p:nvGrpSpPr>
+        <p:cNvPr id="1" name=""/>
+        <p:cNvGrpSpPr/>
+        <p:nvPr/>
+      </p:nvGrpSpPr>
+      <p:grpSpPr>
+        <a:xfrm>
+          <a:off x="0" y="0"/>
+          <a:ext cx="0" cy="0"/>
+          <a:chOff x="0" y="0"/>
+          <a:chExt cx="0" cy="0"/>
+        </a:xfrm>
+      </p:grpSpPr>
+      <p:pic>
+        <p:nvPicPr>
+          <p:cNvPr id="1026" name="Picture 2" descr="D:\Dropbox\Documents\Papers\ScalaLecture\source\resources\Linux.jpg"/>
+          <p:cNvPicPr>
+            <a:picLocks noChangeAspect="1" noChangeArrowheads="1"/>
+          </p:cNvPicPr>
+          <p:nvPr/>
+        </p:nvPicPr>
+        <p:blipFill>
+          <a:blip r:embed="rId2">
+            <a:extLst>
+              <a:ext uri="{28A0092B-C50C-407E-A947-70E740481C1C}">
+                <a14:useLocalDpi xmlns:a14="http://schemas.microsoft.com/office/drawing/2010/main" val="0"/>
+              </a:ext>
+            </a:extLst>
+          </a:blip>
+          <a:srcRect/>
+          <a:stretch>
+            <a:fillRect/>
+          </a:stretch>
+        </p:blipFill>
+        <p:spPr bwMode="auto">
+          <a:xfrm>
+            <a:off x="7540389" y="685800"/>
+            <a:ext cx="1451211" cy="1451211"/>
+          </a:xfrm>
+          <a:prstGeom prst="rect">
+            <a:avLst/>
+          </a:prstGeom>
+          <a:noFill/>
+          <a:extLst>
+            <a:ext uri="{909E8E84-426E-40DD-AFC4-6F175D3DCCD1}">
+              <a14:hiddenFill xmlns:a14="http://schemas.microsoft.com/office/drawing/2010/main">
+                <a:solidFill>
+                  <a:srgbClr val="FFFFFF"/>
+                </a:solidFill>
+              </a14:hiddenFill>
+            </a:ext>
+          </a:extLst>
+        </p:spPr>
+      </p:pic>
+      <p:pic>
+        <p:nvPicPr>
+          <p:cNvPr id="1027" name="Picture 3" descr="D:\Dropbox\Documents\Papers\ScalaLecture\source\resources\Mac.jpg"/>
+          <p:cNvPicPr>
+            <a:picLocks noChangeAspect="1" noChangeArrowheads="1"/>
+          </p:cNvPicPr>
+          <p:nvPr/>
+        </p:nvPicPr>
+        <p:blipFill>
+          <a:blip r:embed="rId3">
+            <a:extLst>
+              <a:ext uri="{28A0092B-C50C-407E-A947-70E740481C1C}">
+                <a14:useLocalDpi xmlns:a14="http://schemas.microsoft.com/office/drawing/2010/main" val="0"/>
+              </a:ext>
+            </a:extLst>
+          </a:blip>
+          <a:srcRect/>
+          <a:stretch>
+            <a:fillRect/>
+          </a:stretch>
+        </p:blipFill>
+        <p:spPr bwMode="auto">
+          <a:xfrm>
+            <a:off x="7634728" y="4419600"/>
+            <a:ext cx="1280672" cy="1524000"/>
+          </a:xfrm>
+          <a:prstGeom prst="rect">
+            <a:avLst/>
+          </a:prstGeom>
+          <a:noFill/>
+          <a:extLst>
+            <a:ext uri="{909E8E84-426E-40DD-AFC4-6F175D3DCCD1}">
+              <a14:hiddenFill xmlns:a14="http://schemas.microsoft.com/office/drawing/2010/main">
+                <a:solidFill>
+                  <a:srgbClr val="FFFFFF"/>
+                </a:solidFill>
+              </a14:hiddenFill>
+            </a:ext>
+          </a:extLst>
+        </p:spPr>
+      </p:pic>
+      <p:pic>
+        <p:nvPicPr>
+          <p:cNvPr id="1028" name="Picture 4" descr="D:\Dropbox\Documents\Papers\ScalaLecture\source\resources\Windows.png"/>
+          <p:cNvPicPr>
+            <a:picLocks noChangeAspect="1" noChangeArrowheads="1"/>
+          </p:cNvPicPr>
+          <p:nvPr/>
+        </p:nvPicPr>
+        <p:blipFill>
+          <a:blip r:embed="rId4">
+            <a:extLst>
+              <a:ext uri="{28A0092B-C50C-407E-A947-70E740481C1C}">
+                <a14:useLocalDpi xmlns:a14="http://schemas.microsoft.com/office/drawing/2010/main" val="0"/>
+              </a:ext>
+            </a:extLst>
+          </a:blip>
+          <a:srcRect/>
+          <a:stretch>
+            <a:fillRect/>
+          </a:stretch>
+        </p:blipFill>
+        <p:spPr bwMode="auto">
+          <a:xfrm>
+            <a:off x="7705726" y="2667000"/>
+            <a:ext cx="1285874" cy="1285874"/>
+          </a:xfrm>
+          <a:prstGeom prst="rect">
+            <a:avLst/>
+          </a:prstGeom>
+          <a:noFill/>
+          <a:extLst>
+            <a:ext uri="{909E8E84-426E-40DD-AFC4-6F175D3DCCD1}">
+              <a14:hiddenFill xmlns:a14="http://schemas.microsoft.com/office/drawing/2010/main">
+                <a:solidFill>
+                  <a:srgbClr val="FFFFFF"/>
+                </a:solidFill>
+              </a14:hiddenFill>
+            </a:ext>
+          </a:extLst>
+        </p:spPr>
+      </p:pic>
+      <p:sp>
+        <p:nvSpPr>
+          <p:cNvPr id="14" name="Right Arrow 13"/>
+          <p:cNvSpPr/>
+          <p:nvPr/>
+        </p:nvSpPr>
+        <p:spPr>
+          <a:xfrm>
+            <a:off x="1371600" y="2999096"/>
+            <a:ext cx="2819401" cy="533400"/>
+          </a:xfrm>
+          <a:prstGeom prst="rightArrow">
+            <a:avLst/>
+          </a:prstGeom>
+          <a:solidFill>
+            <a:srgbClr val="0070C0"/>
+          </a:solidFill>
+          <a:ln>
+            <a:solidFill>
+              <a:srgbClr val="0070C0"/>
+            </a:solidFill>
+          </a:ln>
+        </p:spPr>
+        <p:style>
+          <a:lnRef idx="2">
+            <a:schemeClr val="accent1">
+              <a:shade val="50000"/>
+            </a:schemeClr>
+          </a:lnRef>
+          <a:fillRef idx="1">
+            <a:schemeClr val="accent1"/>
+          </a:fillRef>
+          <a:effectRef idx="0">
+            <a:schemeClr val="accent1"/>
+          </a:effectRef>
+          <a:fontRef idx="minor">
+            <a:schemeClr val="lt1"/>
+          </a:fontRef>
+        </p:style>
+        <p:txBody>
+          <a:bodyPr rtlCol="0" anchor="ctr"/>
+          <a:lstStyle/>
+          <a:p>
+            <a:pPr algn="ctr"/>
+            <a:r>
+              <a:rPr lang="en-US" dirty="0" smtClean="0">
+                <a:latin typeface="Comic Sans MS" pitchFamily="66" charset="0"/>
+              </a:rPr>
+              <a:t>compiles to </a:t>
+            </a:r>
+            <a:r>
+              <a:rPr lang="en-US" dirty="0" err="1" smtClean="0">
+                <a:latin typeface="Comic Sans MS" pitchFamily="66" charset="0"/>
+              </a:rPr>
+              <a:t>bytecode</a:t>
+            </a:r>
+            <a:endParaRPr lang="en-US" dirty="0">
+              <a:latin typeface="Comic Sans MS" pitchFamily="66" charset="0"/>
+            </a:endParaRPr>
+          </a:p>
+        </p:txBody>
+      </p:sp>
+      <p:sp>
+        <p:nvSpPr>
+          <p:cNvPr id="15" name="Right Arrow 14"/>
+          <p:cNvSpPr/>
+          <p:nvPr/>
+        </p:nvSpPr>
+        <p:spPr>
+          <a:xfrm>
+            <a:off x="5527789" y="2999096"/>
+            <a:ext cx="1676400" cy="533400"/>
+          </a:xfrm>
+          <a:prstGeom prst="rightArrow">
+            <a:avLst/>
+          </a:prstGeom>
+          <a:solidFill>
+            <a:srgbClr val="0070C0"/>
+          </a:solidFill>
+          <a:ln>
+            <a:solidFill>
+              <a:srgbClr val="0070C0"/>
+            </a:solidFill>
+          </a:ln>
+        </p:spPr>
+        <p:style>
+          <a:lnRef idx="2">
+            <a:schemeClr val="accent1">
+              <a:shade val="50000"/>
+            </a:schemeClr>
+          </a:lnRef>
+          <a:fillRef idx="1">
+            <a:schemeClr val="accent1"/>
+          </a:fillRef>
+          <a:effectRef idx="0">
+            <a:schemeClr val="accent1"/>
+          </a:effectRef>
+          <a:fontRef idx="minor">
+            <a:schemeClr val="lt1"/>
+          </a:fontRef>
+        </p:style>
+        <p:txBody>
+          <a:bodyPr rtlCol="0" anchor="ctr"/>
+          <a:lstStyle/>
+          <a:p>
+            <a:pPr algn="ctr"/>
+            <a:r>
+              <a:rPr lang="en-US" dirty="0" smtClean="0">
+                <a:latin typeface="Comic Sans MS" pitchFamily="66" charset="0"/>
+              </a:rPr>
+              <a:t>runs on</a:t>
+            </a:r>
+            <a:endParaRPr lang="en-US" dirty="0">
+              <a:latin typeface="Comic Sans MS" pitchFamily="66" charset="0"/>
+            </a:endParaRPr>
+          </a:p>
+        </p:txBody>
+      </p:sp>
+      <p:sp>
+        <p:nvSpPr>
+          <p:cNvPr id="16" name="Right Arrow 15"/>
+          <p:cNvSpPr/>
+          <p:nvPr/>
+        </p:nvSpPr>
+        <p:spPr>
+          <a:xfrm rot="20356900">
+            <a:off x="5299189" y="1974302"/>
+            <a:ext cx="1905000" cy="533400"/>
+          </a:xfrm>
+          <a:prstGeom prst="rightArrow">
+            <a:avLst/>
+          </a:prstGeom>
+          <a:solidFill>
+            <a:srgbClr val="0070C0"/>
+          </a:solidFill>
+          <a:ln>
+            <a:solidFill>
+              <a:srgbClr val="0070C0"/>
+            </a:solidFill>
+          </a:ln>
+        </p:spPr>
+        <p:style>
+          <a:lnRef idx="2">
+            <a:schemeClr val="accent1">
+              <a:shade val="50000"/>
+            </a:schemeClr>
+          </a:lnRef>
+          <a:fillRef idx="1">
+            <a:schemeClr val="accent1"/>
+          </a:fillRef>
+          <a:effectRef idx="0">
+            <a:schemeClr val="accent1"/>
+          </a:effectRef>
+          <a:fontRef idx="minor">
+            <a:schemeClr val="lt1"/>
+          </a:fontRef>
+        </p:style>
+        <p:txBody>
+          <a:bodyPr rtlCol="0" anchor="ctr"/>
+          <a:lstStyle/>
+          <a:p>
+            <a:pPr algn="ctr"/>
+            <a:r>
+              <a:rPr lang="en-US" dirty="0" smtClean="0">
+                <a:latin typeface="Comic Sans MS" pitchFamily="66" charset="0"/>
+              </a:rPr>
+              <a:t>runs on</a:t>
+            </a:r>
+            <a:endParaRPr lang="en-US" dirty="0">
+              <a:latin typeface="Comic Sans MS" pitchFamily="66" charset="0"/>
+            </a:endParaRPr>
+          </a:p>
+        </p:txBody>
+      </p:sp>
+      <p:sp>
+        <p:nvSpPr>
+          <p:cNvPr id="17" name="Right Arrow 16"/>
+          <p:cNvSpPr/>
+          <p:nvPr/>
+        </p:nvSpPr>
+        <p:spPr>
+          <a:xfrm rot="1147277">
+            <a:off x="5299189" y="4031095"/>
+            <a:ext cx="1905000" cy="533400"/>
+          </a:xfrm>
+          <a:prstGeom prst="rightArrow">
+            <a:avLst/>
+          </a:prstGeom>
+          <a:solidFill>
+            <a:srgbClr val="0070C0"/>
+          </a:solidFill>
+          <a:ln>
+            <a:solidFill>
+              <a:srgbClr val="0070C0"/>
+            </a:solidFill>
+          </a:ln>
+        </p:spPr>
+        <p:style>
+          <a:lnRef idx="2">
+            <a:schemeClr val="accent1">
+              <a:shade val="50000"/>
+            </a:schemeClr>
+          </a:lnRef>
+          <a:fillRef idx="1">
+            <a:schemeClr val="accent1"/>
+          </a:fillRef>
+          <a:effectRef idx="0">
+            <a:schemeClr val="accent1"/>
+          </a:effectRef>
+          <a:fontRef idx="minor">
+            <a:schemeClr val="lt1"/>
+          </a:fontRef>
+        </p:style>
+        <p:txBody>
+          <a:bodyPr rtlCol="0" anchor="ctr"/>
+          <a:lstStyle/>
+          <a:p>
+            <a:pPr algn="ctr"/>
+            <a:r>
+              <a:rPr lang="en-US" dirty="0" smtClean="0">
+                <a:latin typeface="Comic Sans MS" pitchFamily="66" charset="0"/>
+              </a:rPr>
+              <a:t>runs on</a:t>
+            </a:r>
+            <a:endParaRPr lang="en-US" dirty="0">
+              <a:latin typeface="Comic Sans MS" pitchFamily="66" charset="0"/>
+            </a:endParaRPr>
+          </a:p>
+        </p:txBody>
+      </p:sp>
+      <p:pic>
+        <p:nvPicPr>
+          <p:cNvPr id="5" name="Picture 3" descr="D:\Dropbox\Documents\Papers\ScalaLecture\source\resources\jvm.png"/>
+          <p:cNvPicPr>
+            <a:picLocks noChangeAspect="1" noChangeArrowheads="1"/>
+          </p:cNvPicPr>
+          <p:nvPr/>
+        </p:nvPicPr>
+        <p:blipFill>
+          <a:blip r:embed="rId5" cstate="print">
+            <a:extLst>
+              <a:ext uri="{28A0092B-C50C-407E-A947-70E740481C1C}">
+                <a14:useLocalDpi xmlns:a14="http://schemas.microsoft.com/office/drawing/2010/main" val="0"/>
+              </a:ext>
+            </a:extLst>
+          </a:blip>
+          <a:srcRect/>
+          <a:stretch>
+            <a:fillRect/>
+          </a:stretch>
+        </p:blipFill>
+        <p:spPr bwMode="auto">
+          <a:xfrm>
+            <a:off x="4212312" y="2809875"/>
+            <a:ext cx="1121688" cy="923925"/>
+          </a:xfrm>
+          <a:prstGeom prst="rect">
+            <a:avLst/>
+          </a:prstGeom>
+          <a:noFill/>
+          <a:extLst>
+            <a:ext uri="{909E8E84-426E-40DD-AFC4-6F175D3DCCD1}">
+              <a14:hiddenFill xmlns:a14="http://schemas.microsoft.com/office/drawing/2010/main">
+                <a:solidFill>
+                  <a:srgbClr val="FFFFFF"/>
+                </a:solidFill>
+              </a14:hiddenFill>
+            </a:ext>
+          </a:extLst>
+        </p:spPr>
+      </p:pic>
+      <p:pic>
+        <p:nvPicPr>
+          <p:cNvPr id="11" name="Picture 10" descr="D:\Dropbox\Documents\Papers\ScalaLecture\source\resources\QuestionMark.jpg"/>
+          <p:cNvPicPr>
+            <a:picLocks noChangeAspect="1" noChangeArrowheads="1"/>
+          </p:cNvPicPr>
+          <p:nvPr/>
+        </p:nvPicPr>
+        <p:blipFill>
+          <a:blip r:embed="rId6" cstate="print">
+            <a:extLst>
+              <a:ext uri="{28A0092B-C50C-407E-A947-70E740481C1C}">
+                <a14:useLocalDpi xmlns:a14="http://schemas.microsoft.com/office/drawing/2010/main" val="0"/>
+              </a:ext>
+            </a:extLst>
+          </a:blip>
+          <a:srcRect/>
+          <a:stretch>
+            <a:fillRect/>
+          </a:stretch>
+        </p:blipFill>
+        <p:spPr bwMode="auto">
+          <a:xfrm>
+            <a:off x="2057400" y="1889125"/>
+            <a:ext cx="1158875" cy="1158875"/>
+          </a:xfrm>
+          <a:prstGeom prst="rect">
+            <a:avLst/>
+          </a:prstGeom>
+          <a:noFill/>
+          <a:extLst>
+            <a:ext uri="{909E8E84-426E-40DD-AFC4-6F175D3DCCD1}">
+              <a14:hiddenFill xmlns:a14="http://schemas.microsoft.com/office/drawing/2010/main">
+                <a:solidFill>
+                  <a:srgbClr val="FFFFFF"/>
+                </a:solidFill>
+              </a14:hiddenFill>
+            </a:ext>
+          </a:extLst>
+        </p:spPr>
+      </p:pic>
+      <p:pic>
+        <p:nvPicPr>
+          <p:cNvPr id="13" name="Picture 12" descr="D:\Dropbox\Documents\Papers\ScalaLecture\source\resources\QuestionMark.jpg"/>
+          <p:cNvPicPr>
+            <a:picLocks noChangeAspect="1" noChangeArrowheads="1"/>
+          </p:cNvPicPr>
+          <p:nvPr/>
+        </p:nvPicPr>
+        <p:blipFill>
+          <a:blip r:embed="rId6" cstate="print">
+            <a:extLst>
+              <a:ext uri="{28A0092B-C50C-407E-A947-70E740481C1C}">
+                <a14:useLocalDpi xmlns:a14="http://schemas.microsoft.com/office/drawing/2010/main" val="0"/>
+              </a:ext>
+            </a:extLst>
+          </a:blip>
+          <a:srcRect/>
+          <a:stretch>
+            <a:fillRect/>
+          </a:stretch>
+        </p:blipFill>
+        <p:spPr bwMode="auto">
+          <a:xfrm>
+            <a:off x="136525" y="2667000"/>
+            <a:ext cx="1158875" cy="1158875"/>
+          </a:xfrm>
+          <a:prstGeom prst="rect">
+            <a:avLst/>
+          </a:prstGeom>
+          <a:noFill/>
+          <a:extLst>
+            <a:ext uri="{909E8E84-426E-40DD-AFC4-6F175D3DCCD1}">
+              <a14:hiddenFill xmlns:a14="http://schemas.microsoft.com/office/drawing/2010/main">
+                <a:solidFill>
+                  <a:srgbClr val="FFFFFF"/>
+                </a:solidFill>
+              </a14:hiddenFill>
+            </a:ext>
+          </a:extLst>
+        </p:spPr>
+      </p:pic>
+    </p:spTree>
+    <p:extLst>
+      <p:ext uri="{BB962C8B-B14F-4D97-AF65-F5344CB8AC3E}">
+        <p14:creationId xmlns:p14="http://schemas.microsoft.com/office/powerpoint/2010/main" val="144318906"/>
+      </p:ext>
+    </p:extLst>
+  </p:cSld>
+  <p:clrMapOvr>
+    <a:masterClrMapping/>
+  </p:clrMapOvr>
+  <p:timing>
+    <p:tnLst>
+      <p:par>
+        <p:cTn id="1" dur="indefinite" restart="never" nodeType="tmRoot"/>
+      </p:par>
+    </p:tnLst>
+  </p:timing>
+</p:sld>
+</file>
+
+<file path=ppt/slides/slide5.xml><?xml version="1.0" encoding="utf-8"?>
+<p:sld xmlns:a="http://schemas.openxmlformats.org/drawingml/2006/main" xmlns:r="http://schemas.openxmlformats.org/officeDocument/2006/relationships" xmlns:p="http://schemas.openxmlformats.org/presentationml/2006/main">
+  <p:cSld>
+    <p:spTree>
+      <p:nvGrpSpPr>
+        <p:cNvPr id="1" name=""/>
+        <p:cNvGrpSpPr/>
+        <p:nvPr/>
+      </p:nvGrpSpPr>
+      <p:grpSpPr>
+        <a:xfrm>
+          <a:off x="0" y="0"/>
+          <a:ext cx="0" cy="0"/>
+          <a:chOff x="0" y="0"/>
+          <a:chExt cx="0" cy="0"/>
+        </a:xfrm>
+      </p:grpSpPr>
+      <p:pic>
+        <p:nvPicPr>
+          <p:cNvPr id="1026" name="Picture 2" descr="D:\Dropbox\Documents\Papers\ScalaLecture\source\resources\Linux.jpg"/>
+          <p:cNvPicPr>
+            <a:picLocks noChangeAspect="1" noChangeArrowheads="1"/>
+          </p:cNvPicPr>
+          <p:nvPr/>
+        </p:nvPicPr>
+        <p:blipFill>
+          <a:blip r:embed="rId2">
+            <a:extLst>
+              <a:ext uri="{28A0092B-C50C-407E-A947-70E740481C1C}">
+                <a14:useLocalDpi xmlns:a14="http://schemas.microsoft.com/office/drawing/2010/main" val="0"/>
+              </a:ext>
+            </a:extLst>
+          </a:blip>
+          <a:srcRect/>
+          <a:stretch>
+            <a:fillRect/>
+          </a:stretch>
+        </p:blipFill>
+        <p:spPr bwMode="auto">
+          <a:xfrm>
+            <a:off x="7540389" y="685800"/>
+            <a:ext cx="1451211" cy="1451211"/>
+          </a:xfrm>
+          <a:prstGeom prst="rect">
+            <a:avLst/>
+          </a:prstGeom>
+          <a:noFill/>
+          <a:extLst>
+            <a:ext uri="{909E8E84-426E-40DD-AFC4-6F175D3DCCD1}">
+              <a14:hiddenFill xmlns:a14="http://schemas.microsoft.com/office/drawing/2010/main">
+                <a:solidFill>
+                  <a:srgbClr val="FFFFFF"/>
+                </a:solidFill>
+              </a14:hiddenFill>
+            </a:ext>
+          </a:extLst>
+        </p:spPr>
+      </p:pic>
+      <p:pic>
+        <p:nvPicPr>
+          <p:cNvPr id="1027" name="Picture 3" descr="D:\Dropbox\Documents\Papers\ScalaLecture\source\resources\Mac.jpg"/>
+          <p:cNvPicPr>
+            <a:picLocks noChangeAspect="1" noChangeArrowheads="1"/>
+          </p:cNvPicPr>
+          <p:nvPr/>
+        </p:nvPicPr>
+        <p:blipFill>
+          <a:blip r:embed="rId3">
+            <a:extLst>
+              <a:ext uri="{28A0092B-C50C-407E-A947-70E740481C1C}">
+                <a14:useLocalDpi xmlns:a14="http://schemas.microsoft.com/office/drawing/2010/main" val="0"/>
+              </a:ext>
+            </a:extLst>
+          </a:blip>
+          <a:srcRect/>
+          <a:stretch>
+            <a:fillRect/>
+          </a:stretch>
+        </p:blipFill>
+        <p:spPr bwMode="auto">
+          <a:xfrm>
+            <a:off x="7634728" y="4419600"/>
+            <a:ext cx="1280672" cy="1524000"/>
+          </a:xfrm>
+          <a:prstGeom prst="rect">
+            <a:avLst/>
+          </a:prstGeom>
+          <a:noFill/>
+          <a:extLst>
+            <a:ext uri="{909E8E84-426E-40DD-AFC4-6F175D3DCCD1}">
+              <a14:hiddenFill xmlns:a14="http://schemas.microsoft.com/office/drawing/2010/main">
+                <a:solidFill>
+                  <a:srgbClr val="FFFFFF"/>
+                </a:solidFill>
+              </a14:hiddenFill>
+            </a:ext>
+          </a:extLst>
+        </p:spPr>
+      </p:pic>
+      <p:pic>
+        <p:nvPicPr>
+          <p:cNvPr id="1028" name="Picture 4" descr="D:\Dropbox\Documents\Papers\ScalaLecture\source\resources\Windows.png"/>
+          <p:cNvPicPr>
+            <a:picLocks noChangeAspect="1" noChangeArrowheads="1"/>
+          </p:cNvPicPr>
+          <p:nvPr/>
+        </p:nvPicPr>
+        <p:blipFill>
+          <a:blip r:embed="rId4">
+            <a:extLst>
+              <a:ext uri="{28A0092B-C50C-407E-A947-70E740481C1C}">
+                <a14:useLocalDpi xmlns:a14="http://schemas.microsoft.com/office/drawing/2010/main" val="0"/>
+              </a:ext>
+            </a:extLst>
+          </a:blip>
+          <a:srcRect/>
+          <a:stretch>
+            <a:fillRect/>
+          </a:stretch>
+        </p:blipFill>
+        <p:spPr bwMode="auto">
+          <a:xfrm>
+            <a:off x="7705726" y="2667000"/>
+            <a:ext cx="1285874" cy="1285874"/>
+          </a:xfrm>
+          <a:prstGeom prst="rect">
+            <a:avLst/>
+          </a:prstGeom>
+          <a:noFill/>
+          <a:extLst>
+            <a:ext uri="{909E8E84-426E-40DD-AFC4-6F175D3DCCD1}">
+              <a14:hiddenFill xmlns:a14="http://schemas.microsoft.com/office/drawing/2010/main">
+                <a:solidFill>
+                  <a:srgbClr val="FFFFFF"/>
+                </a:solidFill>
+              </a14:hiddenFill>
+            </a:ext>
+          </a:extLst>
+        </p:spPr>
+      </p:pic>
+      <p:sp>
+        <p:nvSpPr>
+          <p:cNvPr id="14" name="Right Arrow 13"/>
+          <p:cNvSpPr/>
+          <p:nvPr/>
+        </p:nvSpPr>
+        <p:spPr>
+          <a:xfrm>
+            <a:off x="1371600" y="2999096"/>
+            <a:ext cx="2819401" cy="533400"/>
+          </a:xfrm>
+          <a:prstGeom prst="rightArrow">
+            <a:avLst/>
+          </a:prstGeom>
+          <a:solidFill>
+            <a:srgbClr val="0070C0"/>
+          </a:solidFill>
+          <a:ln>
+            <a:solidFill>
+              <a:srgbClr val="0070C0"/>
+            </a:solidFill>
+          </a:ln>
+        </p:spPr>
+        <p:style>
+          <a:lnRef idx="2">
+            <a:schemeClr val="accent1">
+              <a:shade val="50000"/>
+            </a:schemeClr>
+          </a:lnRef>
+          <a:fillRef idx="1">
+            <a:schemeClr val="accent1"/>
+          </a:fillRef>
+          <a:effectRef idx="0">
+            <a:schemeClr val="accent1"/>
+          </a:effectRef>
+          <a:fontRef idx="minor">
+            <a:schemeClr val="lt1"/>
+          </a:fontRef>
+        </p:style>
+        <p:txBody>
+          <a:bodyPr rtlCol="0" anchor="ctr"/>
+          <a:lstStyle/>
+          <a:p>
+            <a:pPr algn="ctr"/>
+            <a:r>
+              <a:rPr lang="en-US" dirty="0" smtClean="0">
+                <a:latin typeface="Comic Sans MS" pitchFamily="66" charset="0"/>
+              </a:rPr>
+              <a:t>compiles to </a:t>
+            </a:r>
+            <a:r>
+              <a:rPr lang="en-US" dirty="0" err="1" smtClean="0">
+                <a:latin typeface="Comic Sans MS" pitchFamily="66" charset="0"/>
+              </a:rPr>
+              <a:t>bytecode</a:t>
+            </a:r>
+            <a:endParaRPr lang="en-US" dirty="0">
+              <a:latin typeface="Comic Sans MS" pitchFamily="66" charset="0"/>
+            </a:endParaRPr>
+          </a:p>
+        </p:txBody>
+      </p:sp>
+      <p:sp>
+        <p:nvSpPr>
+          <p:cNvPr id="15" name="Right Arrow 14"/>
+          <p:cNvSpPr/>
+          <p:nvPr/>
+        </p:nvSpPr>
+        <p:spPr>
+          <a:xfrm>
+            <a:off x="5527789" y="2999096"/>
+            <a:ext cx="1676400" cy="533400"/>
+          </a:xfrm>
+          <a:prstGeom prst="rightArrow">
+            <a:avLst/>
+          </a:prstGeom>
+          <a:solidFill>
+            <a:srgbClr val="0070C0"/>
+          </a:solidFill>
+          <a:ln>
+            <a:solidFill>
+              <a:srgbClr val="0070C0"/>
+            </a:solidFill>
+          </a:ln>
+        </p:spPr>
+        <p:style>
+          <a:lnRef idx="2">
+            <a:schemeClr val="accent1">
+              <a:shade val="50000"/>
+            </a:schemeClr>
+          </a:lnRef>
+          <a:fillRef idx="1">
+            <a:schemeClr val="accent1"/>
+          </a:fillRef>
+          <a:effectRef idx="0">
+            <a:schemeClr val="accent1"/>
+          </a:effectRef>
+          <a:fontRef idx="minor">
+            <a:schemeClr val="lt1"/>
+          </a:fontRef>
+        </p:style>
+        <p:txBody>
+          <a:bodyPr rtlCol="0" anchor="ctr"/>
+          <a:lstStyle/>
+          <a:p>
+            <a:pPr algn="ctr"/>
+            <a:r>
+              <a:rPr lang="en-US" dirty="0" smtClean="0">
+                <a:latin typeface="Comic Sans MS" pitchFamily="66" charset="0"/>
+              </a:rPr>
+              <a:t>runs on</a:t>
+            </a:r>
+            <a:endParaRPr lang="en-US" dirty="0">
+              <a:latin typeface="Comic Sans MS" pitchFamily="66" charset="0"/>
+            </a:endParaRPr>
+          </a:p>
+        </p:txBody>
+      </p:sp>
+      <p:sp>
+        <p:nvSpPr>
+          <p:cNvPr id="16" name="Right Arrow 15"/>
+          <p:cNvSpPr/>
+          <p:nvPr/>
+        </p:nvSpPr>
+        <p:spPr>
+          <a:xfrm rot="20356900">
+            <a:off x="5299189" y="1974302"/>
+            <a:ext cx="1905000" cy="533400"/>
+          </a:xfrm>
+          <a:prstGeom prst="rightArrow">
+            <a:avLst/>
+          </a:prstGeom>
+          <a:solidFill>
+            <a:srgbClr val="0070C0"/>
+          </a:solidFill>
+          <a:ln>
+            <a:solidFill>
+              <a:srgbClr val="0070C0"/>
+            </a:solidFill>
+          </a:ln>
+        </p:spPr>
+        <p:style>
+          <a:lnRef idx="2">
+            <a:schemeClr val="accent1">
+              <a:shade val="50000"/>
+            </a:schemeClr>
+          </a:lnRef>
+          <a:fillRef idx="1">
+            <a:schemeClr val="accent1"/>
+          </a:fillRef>
+          <a:effectRef idx="0">
+            <a:schemeClr val="accent1"/>
+          </a:effectRef>
+          <a:fontRef idx="minor">
+            <a:schemeClr val="lt1"/>
+          </a:fontRef>
+        </p:style>
+        <p:txBody>
+          <a:bodyPr rtlCol="0" anchor="ctr"/>
+          <a:lstStyle/>
+          <a:p>
+            <a:pPr algn="ctr"/>
+            <a:r>
+              <a:rPr lang="en-US" dirty="0" smtClean="0">
+                <a:latin typeface="Comic Sans MS" pitchFamily="66" charset="0"/>
+              </a:rPr>
+              <a:t>runs on</a:t>
+            </a:r>
+            <a:endParaRPr lang="en-US" dirty="0">
+              <a:latin typeface="Comic Sans MS" pitchFamily="66" charset="0"/>
+            </a:endParaRPr>
+          </a:p>
+        </p:txBody>
+      </p:sp>
+      <p:sp>
+        <p:nvSpPr>
+          <p:cNvPr id="17" name="Right Arrow 16"/>
+          <p:cNvSpPr/>
+          <p:nvPr/>
+        </p:nvSpPr>
+        <p:spPr>
+          <a:xfrm rot="1147277">
+            <a:off x="5299189" y="4031095"/>
+            <a:ext cx="1905000" cy="533400"/>
+          </a:xfrm>
+          <a:prstGeom prst="rightArrow">
+            <a:avLst/>
+          </a:prstGeom>
+          <a:solidFill>
+            <a:srgbClr val="0070C0"/>
+          </a:solidFill>
+          <a:ln>
+            <a:solidFill>
+              <a:srgbClr val="0070C0"/>
+            </a:solidFill>
+          </a:ln>
+        </p:spPr>
+        <p:style>
+          <a:lnRef idx="2">
+            <a:schemeClr val="accent1">
+              <a:shade val="50000"/>
+            </a:schemeClr>
+          </a:lnRef>
+          <a:fillRef idx="1">
+            <a:schemeClr val="accent1"/>
+          </a:fillRef>
+          <a:effectRef idx="0">
+            <a:schemeClr val="accent1"/>
+          </a:effectRef>
+          <a:fontRef idx="minor">
+            <a:schemeClr val="lt1"/>
+          </a:fontRef>
+        </p:style>
+        <p:txBody>
+          <a:bodyPr rtlCol="0" anchor="ctr"/>
+          <a:lstStyle/>
+          <a:p>
+            <a:pPr algn="ctr"/>
+            <a:r>
+              <a:rPr lang="en-US" dirty="0" smtClean="0">
+                <a:latin typeface="Comic Sans MS" pitchFamily="66" charset="0"/>
+              </a:rPr>
+              <a:t>runs on</a:t>
+            </a:r>
+            <a:endParaRPr lang="en-US" dirty="0">
+              <a:latin typeface="Comic Sans MS" pitchFamily="66" charset="0"/>
+            </a:endParaRPr>
+          </a:p>
+        </p:txBody>
+      </p:sp>
+      <p:pic>
+        <p:nvPicPr>
+          <p:cNvPr id="5" name="Picture 3" descr="D:\Dropbox\Documents\Papers\ScalaLecture\source\resources\jvm.png"/>
+          <p:cNvPicPr>
+            <a:picLocks noChangeAspect="1" noChangeArrowheads="1"/>
+          </p:cNvPicPr>
+          <p:nvPr/>
+        </p:nvPicPr>
+        <p:blipFill>
+          <a:blip r:embed="rId5" cstate="print">
+            <a:extLst>
+              <a:ext uri="{28A0092B-C50C-407E-A947-70E740481C1C}">
+                <a14:useLocalDpi xmlns:a14="http://schemas.microsoft.com/office/drawing/2010/main" val="0"/>
+              </a:ext>
+            </a:extLst>
+          </a:blip>
+          <a:srcRect/>
+          <a:stretch>
+            <a:fillRect/>
+          </a:stretch>
+        </p:blipFill>
+        <p:spPr bwMode="auto">
+          <a:xfrm>
+            <a:off x="4212312" y="2809875"/>
+            <a:ext cx="1121688" cy="923925"/>
+          </a:xfrm>
+          <a:prstGeom prst="rect">
+            <a:avLst/>
+          </a:prstGeom>
+          <a:noFill/>
+          <a:extLst>
+            <a:ext uri="{909E8E84-426E-40DD-AFC4-6F175D3DCCD1}">
+              <a14:hiddenFill xmlns:a14="http://schemas.microsoft.com/office/drawing/2010/main">
+                <a:solidFill>
+                  <a:srgbClr val="FFFFFF"/>
+                </a:solidFill>
+              </a14:hiddenFill>
+            </a:ext>
+          </a:extLst>
+        </p:spPr>
+      </p:pic>
+      <p:pic>
+        <p:nvPicPr>
+          <p:cNvPr id="2" name="Picture 2" descr="D:\Dropbox\Documents\Papers\ScalaLecture\source\resources\ScalaSmall.jpg"/>
+          <p:cNvPicPr>
+            <a:picLocks noChangeAspect="1" noChangeArrowheads="1"/>
+          </p:cNvPicPr>
+          <p:nvPr/>
+        </p:nvPicPr>
+        <p:blipFill>
+          <a:blip r:embed="rId6">
+            <a:extLst>
+              <a:ext uri="{28A0092B-C50C-407E-A947-70E740481C1C}">
+                <a14:useLocalDpi xmlns:a14="http://schemas.microsoft.com/office/drawing/2010/main" val="0"/>
+              </a:ext>
+            </a:extLst>
+          </a:blip>
+          <a:srcRect/>
+          <a:stretch>
+            <a:fillRect/>
+          </a:stretch>
+        </p:blipFill>
+        <p:spPr bwMode="auto">
+          <a:xfrm>
+            <a:off x="457200" y="2867025"/>
+            <a:ext cx="552450" cy="866775"/>
+          </a:xfrm>
+          <a:prstGeom prst="rect">
+            <a:avLst/>
+          </a:prstGeom>
+          <a:noFill/>
+          <a:extLst>
+            <a:ext uri="{909E8E84-426E-40DD-AFC4-6F175D3DCCD1}">
+              <a14:hiddenFill xmlns:a14="http://schemas.microsoft.com/office/drawing/2010/main">
+                <a:solidFill>
+                  <a:srgbClr val="FFFFFF"/>
+                </a:solidFill>
+              </a14:hiddenFill>
+            </a:ext>
+          </a:extLst>
+        </p:spPr>
+      </p:pic>
+    </p:spTree>
+    <p:extLst>
+      <p:ext uri="{BB962C8B-B14F-4D97-AF65-F5344CB8AC3E}">
+        <p14:creationId xmlns:p14="http://schemas.microsoft.com/office/powerpoint/2010/main" val="3833825958"/>
       </p:ext>
     </p:extLst>
   </p:cSld>

</xml_diff>

<commit_message>
Completed Part I - The Java Ecosystem
</commit_message>
<xml_diff>
--- a/ScalaLecture/source/resources/Graphics.pptx
+++ b/ScalaLecture/source/resources/Graphics.pptx
@@ -10,6 +10,7 @@
     <p:sldId id="260" r:id="rId4"/>
     <p:sldId id="259" r:id="rId5"/>
     <p:sldId id="261" r:id="rId6"/>
+    <p:sldId id="262" r:id="rId7"/>
   </p:sldIdLst>
   <p:sldSz cx="9144000" cy="6858000" type="screen4x3"/>
   <p:notesSz cx="6858000" cy="9144000"/>
@@ -293,7 +294,7 @@
             <a:fld id="{1D8BD707-D9CF-40AE-B4C6-C98DA3205C09}" type="datetimeFigureOut">
               <a:rPr lang="en-US" smtClean="0"/>
               <a:pPr/>
-              <a:t>2/28/2012</a:t>
+              <a:t>3/3/2012</a:t>
             </a:fld>
             <a:endParaRPr lang="en-US"/>
           </a:p>
@@ -460,7 +461,7 @@
             <a:fld id="{1D8BD707-D9CF-40AE-B4C6-C98DA3205C09}" type="datetimeFigureOut">
               <a:rPr lang="en-US" smtClean="0"/>
               <a:pPr/>
-              <a:t>2/28/2012</a:t>
+              <a:t>3/3/2012</a:t>
             </a:fld>
             <a:endParaRPr lang="en-US"/>
           </a:p>
@@ -637,7 +638,7 @@
             <a:fld id="{1D8BD707-D9CF-40AE-B4C6-C98DA3205C09}" type="datetimeFigureOut">
               <a:rPr lang="en-US" smtClean="0"/>
               <a:pPr/>
-              <a:t>2/28/2012</a:t>
+              <a:t>3/3/2012</a:t>
             </a:fld>
             <a:endParaRPr lang="en-US"/>
           </a:p>
@@ -804,7 +805,7 @@
             <a:fld id="{1D8BD707-D9CF-40AE-B4C6-C98DA3205C09}" type="datetimeFigureOut">
               <a:rPr lang="en-US" smtClean="0"/>
               <a:pPr/>
-              <a:t>2/28/2012</a:t>
+              <a:t>3/3/2012</a:t>
             </a:fld>
             <a:endParaRPr lang="en-US"/>
           </a:p>
@@ -1047,7 +1048,7 @@
             <a:fld id="{1D8BD707-D9CF-40AE-B4C6-C98DA3205C09}" type="datetimeFigureOut">
               <a:rPr lang="en-US" smtClean="0"/>
               <a:pPr/>
-              <a:t>2/28/2012</a:t>
+              <a:t>3/3/2012</a:t>
             </a:fld>
             <a:endParaRPr lang="en-US"/>
           </a:p>
@@ -1332,7 +1333,7 @@
             <a:fld id="{1D8BD707-D9CF-40AE-B4C6-C98DA3205C09}" type="datetimeFigureOut">
               <a:rPr lang="en-US" smtClean="0"/>
               <a:pPr/>
-              <a:t>2/28/2012</a:t>
+              <a:t>3/3/2012</a:t>
             </a:fld>
             <a:endParaRPr lang="en-US"/>
           </a:p>
@@ -1751,7 +1752,7 @@
             <a:fld id="{1D8BD707-D9CF-40AE-B4C6-C98DA3205C09}" type="datetimeFigureOut">
               <a:rPr lang="en-US" smtClean="0"/>
               <a:pPr/>
-              <a:t>2/28/2012</a:t>
+              <a:t>3/3/2012</a:t>
             </a:fld>
             <a:endParaRPr lang="en-US"/>
           </a:p>
@@ -1866,7 +1867,7 @@
             <a:fld id="{1D8BD707-D9CF-40AE-B4C6-C98DA3205C09}" type="datetimeFigureOut">
               <a:rPr lang="en-US" smtClean="0"/>
               <a:pPr/>
-              <a:t>2/28/2012</a:t>
+              <a:t>3/3/2012</a:t>
             </a:fld>
             <a:endParaRPr lang="en-US"/>
           </a:p>
@@ -1958,7 +1959,7 @@
             <a:fld id="{1D8BD707-D9CF-40AE-B4C6-C98DA3205C09}" type="datetimeFigureOut">
               <a:rPr lang="en-US" smtClean="0"/>
               <a:pPr/>
-              <a:t>2/28/2012</a:t>
+              <a:t>3/3/2012</a:t>
             </a:fld>
             <a:endParaRPr lang="en-US"/>
           </a:p>
@@ -2232,7 +2233,7 @@
             <a:fld id="{1D8BD707-D9CF-40AE-B4C6-C98DA3205C09}" type="datetimeFigureOut">
               <a:rPr lang="en-US" smtClean="0"/>
               <a:pPr/>
-              <a:t>2/28/2012</a:t>
+              <a:t>3/3/2012</a:t>
             </a:fld>
             <a:endParaRPr lang="en-US"/>
           </a:p>
@@ -2482,7 +2483,7 @@
             <a:fld id="{1D8BD707-D9CF-40AE-B4C6-C98DA3205C09}" type="datetimeFigureOut">
               <a:rPr lang="en-US" smtClean="0"/>
               <a:pPr/>
-              <a:t>2/28/2012</a:t>
+              <a:t>3/3/2012</a:t>
             </a:fld>
             <a:endParaRPr lang="en-US"/>
           </a:p>
@@ -2692,7 +2693,7 @@
             <a:fld id="{1D8BD707-D9CF-40AE-B4C6-C98DA3205C09}" type="datetimeFigureOut">
               <a:rPr lang="en-US" smtClean="0"/>
               <a:pPr/>
-              <a:t>2/28/2012</a:t>
+              <a:t>3/3/2012</a:t>
             </a:fld>
             <a:endParaRPr lang="en-US"/>
           </a:p>
@@ -3663,7 +3664,7 @@
               <a:rPr lang="en-US" sz="2000" dirty="0" smtClean="0">
                 <a:latin typeface="Comic Sans MS" pitchFamily="66" charset="0"/>
               </a:rPr>
-              <a:t>Code</a:t>
+              <a:t>Model</a:t>
             </a:r>
             <a:endParaRPr lang="en-US" sz="2000" dirty="0">
               <a:latin typeface="Comic Sans MS" pitchFamily="66" charset="0"/>
@@ -5520,6 +5521,453 @@
     <p:extLst>
       <p:ext uri="{BB962C8B-B14F-4D97-AF65-F5344CB8AC3E}">
         <p14:creationId xmlns:p14="http://schemas.microsoft.com/office/powerpoint/2010/main" val="3833825958"/>
+      </p:ext>
+    </p:extLst>
+  </p:cSld>
+  <p:clrMapOvr>
+    <a:masterClrMapping/>
+  </p:clrMapOvr>
+  <p:timing>
+    <p:tnLst>
+      <p:par>
+        <p:cTn id="1" dur="indefinite" restart="never" nodeType="tmRoot"/>
+      </p:par>
+    </p:tnLst>
+  </p:timing>
+</p:sld>
+</file>
+
+<file path=ppt/slides/slide6.xml><?xml version="1.0" encoding="utf-8"?>
+<p:sld xmlns:a="http://schemas.openxmlformats.org/drawingml/2006/main" xmlns:r="http://schemas.openxmlformats.org/officeDocument/2006/relationships" xmlns:p="http://schemas.openxmlformats.org/presentationml/2006/main">
+  <p:cSld>
+    <p:spTree>
+      <p:nvGrpSpPr>
+        <p:cNvPr id="1" name=""/>
+        <p:cNvGrpSpPr/>
+        <p:nvPr/>
+      </p:nvGrpSpPr>
+      <p:grpSpPr>
+        <a:xfrm>
+          <a:off x="0" y="0"/>
+          <a:ext cx="0" cy="0"/>
+          <a:chOff x="0" y="0"/>
+          <a:chExt cx="0" cy="0"/>
+        </a:xfrm>
+      </p:grpSpPr>
+      <p:pic>
+        <p:nvPicPr>
+          <p:cNvPr id="4" name="Picture 3" descr="D:\Dropbox\Documents\Papers\ScalaLecture\source\resources\industry\foursquare.png"/>
+          <p:cNvPicPr>
+            <a:picLocks noChangeAspect="1" noChangeArrowheads="1"/>
+          </p:cNvPicPr>
+          <p:nvPr/>
+        </p:nvPicPr>
+        <p:blipFill>
+          <a:blip r:embed="rId2">
+            <a:extLst>
+              <a:ext uri="{28A0092B-C50C-407E-A947-70E740481C1C}">
+                <a14:useLocalDpi xmlns:a14="http://schemas.microsoft.com/office/drawing/2010/main" val="0"/>
+              </a:ext>
+            </a:extLst>
+          </a:blip>
+          <a:srcRect/>
+          <a:stretch>
+            <a:fillRect/>
+          </a:stretch>
+        </p:blipFill>
+        <p:spPr bwMode="auto">
+          <a:xfrm>
+            <a:off x="228600" y="2721745"/>
+            <a:ext cx="3408363" cy="944709"/>
+          </a:xfrm>
+          <a:prstGeom prst="rect">
+            <a:avLst/>
+          </a:prstGeom>
+          <a:noFill/>
+          <a:extLst>
+            <a:ext uri="{909E8E84-426E-40DD-AFC4-6F175D3DCCD1}">
+              <a14:hiddenFill xmlns:a14="http://schemas.microsoft.com/office/drawing/2010/main">
+                <a:solidFill>
+                  <a:srgbClr val="FFFFFF"/>
+                </a:solidFill>
+              </a14:hiddenFill>
+            </a:ext>
+          </a:extLst>
+        </p:spPr>
+      </p:pic>
+      <p:pic>
+        <p:nvPicPr>
+          <p:cNvPr id="6" name="Picture 4" descr="D:\Dropbox\Documents\Papers\ScalaLecture\source\resources\industry\linkedin.png"/>
+          <p:cNvPicPr>
+            <a:picLocks noChangeAspect="1" noChangeArrowheads="1"/>
+          </p:cNvPicPr>
+          <p:nvPr/>
+        </p:nvPicPr>
+        <p:blipFill>
+          <a:blip r:embed="rId3" cstate="print">
+            <a:extLst>
+              <a:ext uri="{28A0092B-C50C-407E-A947-70E740481C1C}">
+                <a14:useLocalDpi xmlns:a14="http://schemas.microsoft.com/office/drawing/2010/main" val="0"/>
+              </a:ext>
+            </a:extLst>
+          </a:blip>
+          <a:srcRect/>
+          <a:stretch>
+            <a:fillRect/>
+          </a:stretch>
+        </p:blipFill>
+        <p:spPr bwMode="auto">
+          <a:xfrm>
+            <a:off x="5030445" y="685800"/>
+            <a:ext cx="2522002" cy="712444"/>
+          </a:xfrm>
+          <a:prstGeom prst="rect">
+            <a:avLst/>
+          </a:prstGeom>
+          <a:noFill/>
+          <a:extLst>
+            <a:ext uri="{909E8E84-426E-40DD-AFC4-6F175D3DCCD1}">
+              <a14:hiddenFill xmlns:a14="http://schemas.microsoft.com/office/drawing/2010/main">
+                <a:solidFill>
+                  <a:srgbClr val="FFFFFF"/>
+                </a:solidFill>
+              </a14:hiddenFill>
+            </a:ext>
+          </a:extLst>
+        </p:spPr>
+      </p:pic>
+      <p:pic>
+        <p:nvPicPr>
+          <p:cNvPr id="1029" name="Picture 5" descr="D:\Dropbox\Documents\Papers\ScalaLecture\source\resources\industry\nasa.png"/>
+          <p:cNvPicPr>
+            <a:picLocks noChangeAspect="1" noChangeArrowheads="1"/>
+          </p:cNvPicPr>
+          <p:nvPr/>
+        </p:nvPicPr>
+        <p:blipFill>
+          <a:blip r:embed="rId4" cstate="print">
+            <a:extLst>
+              <a:ext uri="{28A0092B-C50C-407E-A947-70E740481C1C}">
+                <a14:useLocalDpi xmlns:a14="http://schemas.microsoft.com/office/drawing/2010/main" val="0"/>
+              </a:ext>
+            </a:extLst>
+          </a:blip>
+          <a:srcRect/>
+          <a:stretch>
+            <a:fillRect/>
+          </a:stretch>
+        </p:blipFill>
+        <p:spPr bwMode="auto">
+          <a:xfrm>
+            <a:off x="3505200" y="2301755"/>
+            <a:ext cx="2094431" cy="1784691"/>
+          </a:xfrm>
+          <a:prstGeom prst="rect">
+            <a:avLst/>
+          </a:prstGeom>
+          <a:noFill/>
+          <a:extLst>
+            <a:ext uri="{909E8E84-426E-40DD-AFC4-6F175D3DCCD1}">
+              <a14:hiddenFill xmlns:a14="http://schemas.microsoft.com/office/drawing/2010/main">
+                <a:solidFill>
+                  <a:srgbClr val="FFFFFF"/>
+                </a:solidFill>
+              </a14:hiddenFill>
+            </a:ext>
+          </a:extLst>
+        </p:spPr>
+      </p:pic>
+      <p:pic>
+        <p:nvPicPr>
+          <p:cNvPr id="1030" name="Picture 6" descr="D:\Dropbox\Documents\Papers\ScalaLecture\source\resources\industry\siemens.png"/>
+          <p:cNvPicPr>
+            <a:picLocks noChangeAspect="1" noChangeArrowheads="1"/>
+          </p:cNvPicPr>
+          <p:nvPr/>
+        </p:nvPicPr>
+        <p:blipFill>
+          <a:blip r:embed="rId5" cstate="print">
+            <a:extLst>
+              <a:ext uri="{28A0092B-C50C-407E-A947-70E740481C1C}">
+                <a14:useLocalDpi xmlns:a14="http://schemas.microsoft.com/office/drawing/2010/main" val="0"/>
+              </a:ext>
+            </a:extLst>
+          </a:blip>
+          <a:srcRect/>
+          <a:stretch>
+            <a:fillRect/>
+          </a:stretch>
+        </p:blipFill>
+        <p:spPr bwMode="auto">
+          <a:xfrm>
+            <a:off x="4402703" y="4898764"/>
+            <a:ext cx="3671237" cy="887010"/>
+          </a:xfrm>
+          <a:prstGeom prst="rect">
+            <a:avLst/>
+          </a:prstGeom>
+          <a:noFill/>
+          <a:extLst>
+            <a:ext uri="{909E8E84-426E-40DD-AFC4-6F175D3DCCD1}">
+              <a14:hiddenFill xmlns:a14="http://schemas.microsoft.com/office/drawing/2010/main">
+                <a:solidFill>
+                  <a:srgbClr val="FFFFFF"/>
+                </a:solidFill>
+              </a14:hiddenFill>
+            </a:ext>
+          </a:extLst>
+        </p:spPr>
+      </p:pic>
+      <p:pic>
+        <p:nvPicPr>
+          <p:cNvPr id="1031" name="Picture 7" descr="D:\Dropbox\Documents\Papers\ScalaLecture\source\resources\industry\tomtom.png"/>
+          <p:cNvPicPr>
+            <a:picLocks noChangeAspect="1" noChangeArrowheads="1"/>
+          </p:cNvPicPr>
+          <p:nvPr/>
+        </p:nvPicPr>
+        <p:blipFill>
+          <a:blip r:embed="rId6" cstate="print">
+            <a:extLst>
+              <a:ext uri="{28A0092B-C50C-407E-A947-70E740481C1C}">
+                <a14:useLocalDpi xmlns:a14="http://schemas.microsoft.com/office/drawing/2010/main" val="0"/>
+              </a:ext>
+            </a:extLst>
+          </a:blip>
+          <a:srcRect/>
+          <a:stretch>
+            <a:fillRect/>
+          </a:stretch>
+        </p:blipFill>
+        <p:spPr bwMode="auto">
+          <a:xfrm>
+            <a:off x="1726620" y="3720188"/>
+            <a:ext cx="2114550" cy="366258"/>
+          </a:xfrm>
+          <a:prstGeom prst="rect">
+            <a:avLst/>
+          </a:prstGeom>
+          <a:noFill/>
+          <a:extLst>
+            <a:ext uri="{909E8E84-426E-40DD-AFC4-6F175D3DCCD1}">
+              <a14:hiddenFill xmlns:a14="http://schemas.microsoft.com/office/drawing/2010/main">
+                <a:solidFill>
+                  <a:srgbClr val="FFFFFF"/>
+                </a:solidFill>
+              </a14:hiddenFill>
+            </a:ext>
+          </a:extLst>
+        </p:spPr>
+      </p:pic>
+      <p:pic>
+        <p:nvPicPr>
+          <p:cNvPr id="1032" name="Picture 8" descr="D:\Dropbox\Documents\Papers\ScalaLecture\source\resources\industry\twitter.png"/>
+          <p:cNvPicPr>
+            <a:picLocks noChangeAspect="1" noChangeArrowheads="1"/>
+          </p:cNvPicPr>
+          <p:nvPr/>
+        </p:nvPicPr>
+        <p:blipFill>
+          <a:blip r:embed="rId7">
+            <a:extLst>
+              <a:ext uri="{28A0092B-C50C-407E-A947-70E740481C1C}">
+                <a14:useLocalDpi xmlns:a14="http://schemas.microsoft.com/office/drawing/2010/main" val="0"/>
+              </a:ext>
+            </a:extLst>
+          </a:blip>
+          <a:srcRect/>
+          <a:stretch>
+            <a:fillRect/>
+          </a:stretch>
+        </p:blipFill>
+        <p:spPr bwMode="auto">
+          <a:xfrm>
+            <a:off x="571610" y="1350146"/>
+            <a:ext cx="5054179" cy="940078"/>
+          </a:xfrm>
+          <a:prstGeom prst="rect">
+            <a:avLst/>
+          </a:prstGeom>
+          <a:noFill/>
+          <a:extLst>
+            <a:ext uri="{909E8E84-426E-40DD-AFC4-6F175D3DCCD1}">
+              <a14:hiddenFill xmlns:a14="http://schemas.microsoft.com/office/drawing/2010/main">
+                <a:solidFill>
+                  <a:srgbClr val="FFFFFF"/>
+                </a:solidFill>
+              </a14:hiddenFill>
+            </a:ext>
+          </a:extLst>
+        </p:spPr>
+      </p:pic>
+      <p:pic>
+        <p:nvPicPr>
+          <p:cNvPr id="1033" name="Picture 9" descr="D:\Dropbox\Documents\Papers\ScalaLecture\source\resources\industry\ubs.png"/>
+          <p:cNvPicPr>
+            <a:picLocks noChangeAspect="1" noChangeArrowheads="1"/>
+          </p:cNvPicPr>
+          <p:nvPr/>
+        </p:nvPicPr>
+        <p:blipFill>
+          <a:blip r:embed="rId8">
+            <a:extLst>
+              <a:ext uri="{28A0092B-C50C-407E-A947-70E740481C1C}">
+                <a14:useLocalDpi xmlns:a14="http://schemas.microsoft.com/office/drawing/2010/main" val="0"/>
+              </a:ext>
+            </a:extLst>
+          </a:blip>
+          <a:srcRect/>
+          <a:stretch>
+            <a:fillRect/>
+          </a:stretch>
+        </p:blipFill>
+        <p:spPr bwMode="auto">
+          <a:xfrm>
+            <a:off x="1671377" y="4303546"/>
+            <a:ext cx="2547938" cy="981075"/>
+          </a:xfrm>
+          <a:prstGeom prst="rect">
+            <a:avLst/>
+          </a:prstGeom>
+          <a:noFill/>
+          <a:extLst>
+            <a:ext uri="{909E8E84-426E-40DD-AFC4-6F175D3DCCD1}">
+              <a14:hiddenFill xmlns:a14="http://schemas.microsoft.com/office/drawing/2010/main">
+                <a:solidFill>
+                  <a:srgbClr val="FFFFFF"/>
+                </a:solidFill>
+              </a14:hiddenFill>
+            </a:ext>
+          </a:extLst>
+        </p:spPr>
+      </p:pic>
+      <p:pic>
+        <p:nvPicPr>
+          <p:cNvPr id="1034" name="Picture 10" descr="D:\Dropbox\Documents\Papers\ScalaLecture\source\resources\industry\xerox.png"/>
+          <p:cNvPicPr>
+            <a:picLocks noChangeAspect="1" noChangeArrowheads="1"/>
+          </p:cNvPicPr>
+          <p:nvPr/>
+        </p:nvPicPr>
+        <p:blipFill>
+          <a:blip r:embed="rId9" cstate="print">
+            <a:extLst>
+              <a:ext uri="{28A0092B-C50C-407E-A947-70E740481C1C}">
+                <a14:useLocalDpi xmlns:a14="http://schemas.microsoft.com/office/drawing/2010/main" val="0"/>
+              </a:ext>
+            </a:extLst>
+          </a:blip>
+          <a:srcRect/>
+          <a:stretch>
+            <a:fillRect/>
+          </a:stretch>
+        </p:blipFill>
+        <p:spPr bwMode="auto">
+          <a:xfrm>
+            <a:off x="5656486" y="3990975"/>
+            <a:ext cx="2917825" cy="824964"/>
+          </a:xfrm>
+          <a:prstGeom prst="rect">
+            <a:avLst/>
+          </a:prstGeom>
+          <a:noFill/>
+          <a:extLst>
+            <a:ext uri="{909E8E84-426E-40DD-AFC4-6F175D3DCCD1}">
+              <a14:hiddenFill xmlns:a14="http://schemas.microsoft.com/office/drawing/2010/main">
+                <a:solidFill>
+                  <a:srgbClr val="FFFFFF"/>
+                </a:solidFill>
+              </a14:hiddenFill>
+            </a:ext>
+          </a:extLst>
+        </p:spPr>
+      </p:pic>
+      <p:pic>
+        <p:nvPicPr>
+          <p:cNvPr id="1035" name="Picture 11" descr="D:\Dropbox\Documents\Papers\ScalaLecture\source\resources\industry\yammer.png"/>
+          <p:cNvPicPr>
+            <a:picLocks noChangeAspect="1" noChangeArrowheads="1"/>
+          </p:cNvPicPr>
+          <p:nvPr/>
+        </p:nvPicPr>
+        <p:blipFill>
+          <a:blip r:embed="rId10">
+            <a:extLst>
+              <a:ext uri="{28A0092B-C50C-407E-A947-70E740481C1C}">
+                <a14:useLocalDpi xmlns:a14="http://schemas.microsoft.com/office/drawing/2010/main" val="0"/>
+              </a:ext>
+            </a:extLst>
+          </a:blip>
+          <a:srcRect/>
+          <a:stretch>
+            <a:fillRect/>
+          </a:stretch>
+        </p:blipFill>
+        <p:spPr bwMode="auto">
+          <a:xfrm>
+            <a:off x="4596875" y="1874749"/>
+            <a:ext cx="4074434" cy="984427"/>
+          </a:xfrm>
+          <a:prstGeom prst="rect">
+            <a:avLst/>
+          </a:prstGeom>
+          <a:noFill/>
+          <a:extLst>
+            <a:ext uri="{909E8E84-426E-40DD-AFC4-6F175D3DCCD1}">
+              <a14:hiddenFill xmlns:a14="http://schemas.microsoft.com/office/drawing/2010/main">
+                <a:solidFill>
+                  <a:srgbClr val="FFFFFF"/>
+                </a:solidFill>
+              </a14:hiddenFill>
+            </a:ext>
+          </a:extLst>
+        </p:spPr>
+      </p:pic>
+      <p:pic>
+        <p:nvPicPr>
+          <p:cNvPr id="3" name="Picture 2" descr="D:\Dropbox\Documents\Papers\ScalaLecture\source\resources\industry\atlassian.png"/>
+          <p:cNvPicPr>
+            <a:picLocks noChangeAspect="1" noChangeArrowheads="1"/>
+          </p:cNvPicPr>
+          <p:nvPr/>
+        </p:nvPicPr>
+        <p:blipFill>
+          <a:blip r:embed="rId11">
+            <a:extLst>
+              <a:ext uri="{28A0092B-C50C-407E-A947-70E740481C1C}">
+                <a14:useLocalDpi xmlns:a14="http://schemas.microsoft.com/office/drawing/2010/main" val="0"/>
+              </a:ext>
+            </a:extLst>
+          </a:blip>
+          <a:srcRect/>
+          <a:stretch>
+            <a:fillRect/>
+          </a:stretch>
+        </p:blipFill>
+        <p:spPr bwMode="auto">
+          <a:xfrm>
+            <a:off x="5126832" y="3046265"/>
+            <a:ext cx="3718578" cy="944709"/>
+          </a:xfrm>
+          <a:prstGeom prst="rect">
+            <a:avLst/>
+          </a:prstGeom>
+          <a:noFill/>
+          <a:extLst>
+            <a:ext uri="{909E8E84-426E-40DD-AFC4-6F175D3DCCD1}">
+              <a14:hiddenFill xmlns:a14="http://schemas.microsoft.com/office/drawing/2010/main">
+                <a:solidFill>
+                  <a:srgbClr val="FFFFFF"/>
+                </a:solidFill>
+              </a14:hiddenFill>
+            </a:ext>
+          </a:extLst>
+        </p:spPr>
+      </p:pic>
+    </p:spTree>
+    <p:extLst>
+      <p:ext uri="{BB962C8B-B14F-4D97-AF65-F5344CB8AC3E}">
+        <p14:creationId xmlns:p14="http://schemas.microsoft.com/office/powerpoint/2010/main" val="262775922"/>
       </p:ext>
     </p:extLst>
   </p:cSld>

</xml_diff>

<commit_message>
Added expressions, functions, classes, properties, underscore, UAP
</commit_message>
<xml_diff>
--- a/ScalaLecture/source/resources/Graphics.pptx
+++ b/ScalaLecture/source/resources/Graphics.pptx
@@ -11,6 +11,7 @@
     <p:sldId id="259" r:id="rId5"/>
     <p:sldId id="261" r:id="rId6"/>
     <p:sldId id="262" r:id="rId7"/>
+    <p:sldId id="263" r:id="rId8"/>
   </p:sldIdLst>
   <p:sldSz cx="9144000" cy="6858000" type="screen4x3"/>
   <p:notesSz cx="6858000" cy="9144000"/>
@@ -294,7 +295,7 @@
             <a:fld id="{1D8BD707-D9CF-40AE-B4C6-C98DA3205C09}" type="datetimeFigureOut">
               <a:rPr lang="en-US" smtClean="0"/>
               <a:pPr/>
-              <a:t>3/3/2012</a:t>
+              <a:t>3/12/2012</a:t>
             </a:fld>
             <a:endParaRPr lang="en-US"/>
           </a:p>
@@ -461,7 +462,7 @@
             <a:fld id="{1D8BD707-D9CF-40AE-B4C6-C98DA3205C09}" type="datetimeFigureOut">
               <a:rPr lang="en-US" smtClean="0"/>
               <a:pPr/>
-              <a:t>3/3/2012</a:t>
+              <a:t>3/12/2012</a:t>
             </a:fld>
             <a:endParaRPr lang="en-US"/>
           </a:p>
@@ -638,7 +639,7 @@
             <a:fld id="{1D8BD707-D9CF-40AE-B4C6-C98DA3205C09}" type="datetimeFigureOut">
               <a:rPr lang="en-US" smtClean="0"/>
               <a:pPr/>
-              <a:t>3/3/2012</a:t>
+              <a:t>3/12/2012</a:t>
             </a:fld>
             <a:endParaRPr lang="en-US"/>
           </a:p>
@@ -805,7 +806,7 @@
             <a:fld id="{1D8BD707-D9CF-40AE-B4C6-C98DA3205C09}" type="datetimeFigureOut">
               <a:rPr lang="en-US" smtClean="0"/>
               <a:pPr/>
-              <a:t>3/3/2012</a:t>
+              <a:t>3/12/2012</a:t>
             </a:fld>
             <a:endParaRPr lang="en-US"/>
           </a:p>
@@ -1048,7 +1049,7 @@
             <a:fld id="{1D8BD707-D9CF-40AE-B4C6-C98DA3205C09}" type="datetimeFigureOut">
               <a:rPr lang="en-US" smtClean="0"/>
               <a:pPr/>
-              <a:t>3/3/2012</a:t>
+              <a:t>3/12/2012</a:t>
             </a:fld>
             <a:endParaRPr lang="en-US"/>
           </a:p>
@@ -1333,7 +1334,7 @@
             <a:fld id="{1D8BD707-D9CF-40AE-B4C6-C98DA3205C09}" type="datetimeFigureOut">
               <a:rPr lang="en-US" smtClean="0"/>
               <a:pPr/>
-              <a:t>3/3/2012</a:t>
+              <a:t>3/12/2012</a:t>
             </a:fld>
             <a:endParaRPr lang="en-US"/>
           </a:p>
@@ -1752,7 +1753,7 @@
             <a:fld id="{1D8BD707-D9CF-40AE-B4C6-C98DA3205C09}" type="datetimeFigureOut">
               <a:rPr lang="en-US" smtClean="0"/>
               <a:pPr/>
-              <a:t>3/3/2012</a:t>
+              <a:t>3/12/2012</a:t>
             </a:fld>
             <a:endParaRPr lang="en-US"/>
           </a:p>
@@ -1867,7 +1868,7 @@
             <a:fld id="{1D8BD707-D9CF-40AE-B4C6-C98DA3205C09}" type="datetimeFigureOut">
               <a:rPr lang="en-US" smtClean="0"/>
               <a:pPr/>
-              <a:t>3/3/2012</a:t>
+              <a:t>3/12/2012</a:t>
             </a:fld>
             <a:endParaRPr lang="en-US"/>
           </a:p>
@@ -1959,7 +1960,7 @@
             <a:fld id="{1D8BD707-D9CF-40AE-B4C6-C98DA3205C09}" type="datetimeFigureOut">
               <a:rPr lang="en-US" smtClean="0"/>
               <a:pPr/>
-              <a:t>3/3/2012</a:t>
+              <a:t>3/12/2012</a:t>
             </a:fld>
             <a:endParaRPr lang="en-US"/>
           </a:p>
@@ -2233,7 +2234,7 @@
             <a:fld id="{1D8BD707-D9CF-40AE-B4C6-C98DA3205C09}" type="datetimeFigureOut">
               <a:rPr lang="en-US" smtClean="0"/>
               <a:pPr/>
-              <a:t>3/3/2012</a:t>
+              <a:t>3/12/2012</a:t>
             </a:fld>
             <a:endParaRPr lang="en-US"/>
           </a:p>
@@ -2483,7 +2484,7 @@
             <a:fld id="{1D8BD707-D9CF-40AE-B4C6-C98DA3205C09}" type="datetimeFigureOut">
               <a:rPr lang="en-US" smtClean="0"/>
               <a:pPr/>
-              <a:t>3/3/2012</a:t>
+              <a:t>3/12/2012</a:t>
             </a:fld>
             <a:endParaRPr lang="en-US"/>
           </a:p>
@@ -2693,7 +2694,7 @@
             <a:fld id="{1D8BD707-D9CF-40AE-B4C6-C98DA3205C09}" type="datetimeFigureOut">
               <a:rPr lang="en-US" smtClean="0"/>
               <a:pPr/>
-              <a:t>3/3/2012</a:t>
+              <a:t>3/12/2012</a:t>
             </a:fld>
             <a:endParaRPr lang="en-US"/>
           </a:p>
@@ -5968,6 +5969,584 @@
     <p:extLst>
       <p:ext uri="{BB962C8B-B14F-4D97-AF65-F5344CB8AC3E}">
         <p14:creationId xmlns:p14="http://schemas.microsoft.com/office/powerpoint/2010/main" val="262775922"/>
+      </p:ext>
+    </p:extLst>
+  </p:cSld>
+  <p:clrMapOvr>
+    <a:masterClrMapping/>
+  </p:clrMapOvr>
+  <p:timing>
+    <p:tnLst>
+      <p:par>
+        <p:cTn id="1" dur="indefinite" restart="never" nodeType="tmRoot"/>
+      </p:par>
+    </p:tnLst>
+  </p:timing>
+</p:sld>
+</file>
+
+<file path=ppt/slides/slide7.xml><?xml version="1.0" encoding="utf-8"?>
+<p:sld xmlns:a="http://schemas.openxmlformats.org/drawingml/2006/main" xmlns:r="http://schemas.openxmlformats.org/officeDocument/2006/relationships" xmlns:p="http://schemas.openxmlformats.org/presentationml/2006/main">
+  <p:cSld>
+    <p:spTree>
+      <p:nvGrpSpPr>
+        <p:cNvPr id="1" name=""/>
+        <p:cNvGrpSpPr/>
+        <p:nvPr/>
+      </p:nvGrpSpPr>
+      <p:grpSpPr>
+        <a:xfrm>
+          <a:off x="0" y="0"/>
+          <a:ext cx="0" cy="0"/>
+          <a:chOff x="0" y="0"/>
+          <a:chExt cx="0" cy="0"/>
+        </a:xfrm>
+      </p:grpSpPr>
+      <p:pic>
+        <p:nvPicPr>
+          <p:cNvPr id="1026" name="Picture 2" descr="D:\Dropbox\Documents\Papers\ScalaLecture\source\resources\Method.png"/>
+          <p:cNvPicPr>
+            <a:picLocks noChangeAspect="1" noChangeArrowheads="1"/>
+          </p:cNvPicPr>
+          <p:nvPr/>
+        </p:nvPicPr>
+        <p:blipFill>
+          <a:blip r:embed="rId2">
+            <a:extLst>
+              <a:ext uri="{28A0092B-C50C-407E-A947-70E740481C1C}">
+                <a14:useLocalDpi xmlns:a14="http://schemas.microsoft.com/office/drawing/2010/main" val="0"/>
+              </a:ext>
+            </a:extLst>
+          </a:blip>
+          <a:srcRect/>
+          <a:stretch>
+            <a:fillRect/>
+          </a:stretch>
+        </p:blipFill>
+        <p:spPr bwMode="auto">
+          <a:xfrm>
+            <a:off x="2619375" y="2952750"/>
+            <a:ext cx="4543425" cy="1847850"/>
+          </a:xfrm>
+          <a:prstGeom prst="rect">
+            <a:avLst/>
+          </a:prstGeom>
+          <a:noFill/>
+          <a:extLst>
+            <a:ext uri="{909E8E84-426E-40DD-AFC4-6F175D3DCCD1}">
+              <a14:hiddenFill xmlns:a14="http://schemas.microsoft.com/office/drawing/2010/main">
+                <a:solidFill>
+                  <a:srgbClr val="FFFFFF"/>
+                </a:solidFill>
+              </a14:hiddenFill>
+            </a:ext>
+          </a:extLst>
+        </p:spPr>
+      </p:pic>
+      <p:cxnSp>
+        <p:nvCxnSpPr>
+          <p:cNvPr id="5" name="Straight Arrow Connector 4"/>
+          <p:cNvCxnSpPr/>
+          <p:nvPr/>
+        </p:nvCxnSpPr>
+        <p:spPr>
+          <a:xfrm>
+            <a:off x="1828800" y="1981200"/>
+            <a:ext cx="914400" cy="838200"/>
+          </a:xfrm>
+          <a:prstGeom prst="straightConnector1">
+            <a:avLst/>
+          </a:prstGeom>
+          <a:ln>
+            <a:solidFill>
+              <a:schemeClr val="tx1"/>
+            </a:solidFill>
+            <a:tailEnd type="arrow"/>
+          </a:ln>
+        </p:spPr>
+        <p:style>
+          <a:lnRef idx="1">
+            <a:schemeClr val="accent1"/>
+          </a:lnRef>
+          <a:fillRef idx="0">
+            <a:schemeClr val="accent1"/>
+          </a:fillRef>
+          <a:effectRef idx="0">
+            <a:schemeClr val="accent1"/>
+          </a:effectRef>
+          <a:fontRef idx="minor">
+            <a:schemeClr val="tx1"/>
+          </a:fontRef>
+        </p:style>
+      </p:cxnSp>
+      <p:cxnSp>
+        <p:nvCxnSpPr>
+          <p:cNvPr id="10" name="Straight Arrow Connector 9"/>
+          <p:cNvCxnSpPr/>
+          <p:nvPr/>
+        </p:nvCxnSpPr>
+        <p:spPr>
+          <a:xfrm>
+            <a:off x="3429000" y="2057400"/>
+            <a:ext cx="0" cy="838200"/>
+          </a:xfrm>
+          <a:prstGeom prst="straightConnector1">
+            <a:avLst/>
+          </a:prstGeom>
+          <a:ln>
+            <a:solidFill>
+              <a:schemeClr val="tx1"/>
+            </a:solidFill>
+            <a:tailEnd type="arrow"/>
+          </a:ln>
+        </p:spPr>
+        <p:style>
+          <a:lnRef idx="1">
+            <a:schemeClr val="accent1"/>
+          </a:lnRef>
+          <a:fillRef idx="0">
+            <a:schemeClr val="accent1"/>
+          </a:fillRef>
+          <a:effectRef idx="0">
+            <a:schemeClr val="accent1"/>
+          </a:effectRef>
+          <a:fontRef idx="minor">
+            <a:schemeClr val="tx1"/>
+          </a:fontRef>
+        </p:style>
+      </p:cxnSp>
+      <p:cxnSp>
+        <p:nvCxnSpPr>
+          <p:cNvPr id="12" name="Straight Arrow Connector 11"/>
+          <p:cNvCxnSpPr/>
+          <p:nvPr/>
+        </p:nvCxnSpPr>
+        <p:spPr>
+          <a:xfrm flipH="1">
+            <a:off x="3962400" y="1981200"/>
+            <a:ext cx="381000" cy="971550"/>
+          </a:xfrm>
+          <a:prstGeom prst="straightConnector1">
+            <a:avLst/>
+          </a:prstGeom>
+          <a:ln>
+            <a:solidFill>
+              <a:schemeClr val="tx1"/>
+            </a:solidFill>
+            <a:tailEnd type="arrow"/>
+          </a:ln>
+        </p:spPr>
+        <p:style>
+          <a:lnRef idx="1">
+            <a:schemeClr val="accent1"/>
+          </a:lnRef>
+          <a:fillRef idx="0">
+            <a:schemeClr val="accent1"/>
+          </a:fillRef>
+          <a:effectRef idx="0">
+            <a:schemeClr val="accent1"/>
+          </a:effectRef>
+          <a:fontRef idx="minor">
+            <a:schemeClr val="tx1"/>
+          </a:fontRef>
+        </p:style>
+      </p:cxnSp>
+      <p:cxnSp>
+        <p:nvCxnSpPr>
+          <p:cNvPr id="14" name="Straight Arrow Connector 13"/>
+          <p:cNvCxnSpPr>
+            <a:endCxn id="1026" idx="0"/>
+          </p:cNvCxnSpPr>
+          <p:nvPr/>
+        </p:nvCxnSpPr>
+        <p:spPr>
+          <a:xfrm>
+            <a:off x="4343400" y="1981200"/>
+            <a:ext cx="547688" cy="971550"/>
+          </a:xfrm>
+          <a:prstGeom prst="straightConnector1">
+            <a:avLst/>
+          </a:prstGeom>
+          <a:ln>
+            <a:solidFill>
+              <a:schemeClr val="tx1"/>
+            </a:solidFill>
+            <a:tailEnd type="arrow"/>
+          </a:ln>
+        </p:spPr>
+        <p:style>
+          <a:lnRef idx="1">
+            <a:schemeClr val="accent1"/>
+          </a:lnRef>
+          <a:fillRef idx="0">
+            <a:schemeClr val="accent1"/>
+          </a:fillRef>
+          <a:effectRef idx="0">
+            <a:schemeClr val="accent1"/>
+          </a:effectRef>
+          <a:fontRef idx="minor">
+            <a:schemeClr val="tx1"/>
+          </a:fontRef>
+        </p:style>
+      </p:cxnSp>
+      <p:cxnSp>
+        <p:nvCxnSpPr>
+          <p:cNvPr id="16" name="Straight Arrow Connector 15"/>
+          <p:cNvCxnSpPr/>
+          <p:nvPr/>
+        </p:nvCxnSpPr>
+        <p:spPr>
+          <a:xfrm>
+            <a:off x="5943600" y="2133600"/>
+            <a:ext cx="304800" cy="685800"/>
+          </a:xfrm>
+          <a:prstGeom prst="straightConnector1">
+            <a:avLst/>
+          </a:prstGeom>
+          <a:ln>
+            <a:solidFill>
+              <a:schemeClr val="tx1"/>
+            </a:solidFill>
+            <a:tailEnd type="arrow"/>
+          </a:ln>
+        </p:spPr>
+        <p:style>
+          <a:lnRef idx="1">
+            <a:schemeClr val="accent1"/>
+          </a:lnRef>
+          <a:fillRef idx="0">
+            <a:schemeClr val="accent1"/>
+          </a:fillRef>
+          <a:effectRef idx="0">
+            <a:schemeClr val="accent1"/>
+          </a:effectRef>
+          <a:fontRef idx="minor">
+            <a:schemeClr val="tx1"/>
+          </a:fontRef>
+        </p:style>
+      </p:cxnSp>
+      <p:cxnSp>
+        <p:nvCxnSpPr>
+          <p:cNvPr id="18" name="Straight Arrow Connector 17"/>
+          <p:cNvCxnSpPr/>
+          <p:nvPr/>
+        </p:nvCxnSpPr>
+        <p:spPr>
+          <a:xfrm flipH="1">
+            <a:off x="6858000" y="2400300"/>
+            <a:ext cx="457200" cy="552450"/>
+          </a:xfrm>
+          <a:prstGeom prst="straightConnector1">
+            <a:avLst/>
+          </a:prstGeom>
+          <a:ln>
+            <a:solidFill>
+              <a:schemeClr val="tx1"/>
+            </a:solidFill>
+            <a:tailEnd type="arrow"/>
+          </a:ln>
+        </p:spPr>
+        <p:style>
+          <a:lnRef idx="1">
+            <a:schemeClr val="accent1"/>
+          </a:lnRef>
+          <a:fillRef idx="0">
+            <a:schemeClr val="accent1"/>
+          </a:fillRef>
+          <a:effectRef idx="0">
+            <a:schemeClr val="accent1"/>
+          </a:effectRef>
+          <a:fontRef idx="minor">
+            <a:schemeClr val="tx1"/>
+          </a:fontRef>
+        </p:style>
+      </p:cxnSp>
+      <p:cxnSp>
+        <p:nvCxnSpPr>
+          <p:cNvPr id="22" name="Straight Arrow Connector 21"/>
+          <p:cNvCxnSpPr/>
+          <p:nvPr/>
+        </p:nvCxnSpPr>
+        <p:spPr>
+          <a:xfrm flipH="1" flipV="1">
+            <a:off x="4343400" y="3886200"/>
+            <a:ext cx="1752600" cy="533400"/>
+          </a:xfrm>
+          <a:prstGeom prst="straightConnector1">
+            <a:avLst/>
+          </a:prstGeom>
+          <a:ln>
+            <a:solidFill>
+              <a:schemeClr val="tx1"/>
+            </a:solidFill>
+            <a:tailEnd type="arrow"/>
+          </a:ln>
+        </p:spPr>
+        <p:style>
+          <a:lnRef idx="1">
+            <a:schemeClr val="accent1"/>
+          </a:lnRef>
+          <a:fillRef idx="0">
+            <a:schemeClr val="accent1"/>
+          </a:fillRef>
+          <a:effectRef idx="0">
+            <a:schemeClr val="accent1"/>
+          </a:effectRef>
+          <a:fontRef idx="minor">
+            <a:schemeClr val="tx1"/>
+          </a:fontRef>
+        </p:style>
+      </p:cxnSp>
+      <p:sp>
+        <p:nvSpPr>
+          <p:cNvPr id="23" name="TextBox 22"/>
+          <p:cNvSpPr txBox="1"/>
+          <p:nvPr/>
+        </p:nvSpPr>
+        <p:spPr>
+          <a:xfrm>
+            <a:off x="533400" y="1447800"/>
+            <a:ext cx="3276600" cy="369332"/>
+          </a:xfrm>
+          <a:prstGeom prst="rect">
+            <a:avLst/>
+          </a:prstGeom>
+          <a:noFill/>
+        </p:spPr>
+        <p:txBody>
+          <a:bodyPr wrap="square" rtlCol="0">
+            <a:spAutoFit/>
+          </a:bodyPr>
+          <a:lstStyle/>
+          <a:p>
+            <a:r>
+              <a:rPr lang="en-US" dirty="0" smtClean="0">
+                <a:latin typeface="Times New Roman" pitchFamily="18" charset="0"/>
+                <a:cs typeface="Times New Roman" pitchFamily="18" charset="0"/>
+              </a:rPr>
+              <a:t>“</a:t>
+            </a:r>
+            <a:r>
+              <a:rPr lang="en-US" dirty="0" err="1" smtClean="0">
+                <a:latin typeface="Times New Roman" pitchFamily="18" charset="0"/>
+                <a:cs typeface="Times New Roman" pitchFamily="18" charset="0"/>
+              </a:rPr>
+              <a:t>def</a:t>
+            </a:r>
+            <a:r>
+              <a:rPr lang="en-US" dirty="0" smtClean="0">
+                <a:latin typeface="Times New Roman" pitchFamily="18" charset="0"/>
+                <a:cs typeface="Times New Roman" pitchFamily="18" charset="0"/>
+              </a:rPr>
+              <a:t>” starts a function definition</a:t>
+            </a:r>
+            <a:endParaRPr lang="en-US" dirty="0">
+              <a:latin typeface="Times New Roman" pitchFamily="18" charset="0"/>
+              <a:cs typeface="Times New Roman" pitchFamily="18" charset="0"/>
+            </a:endParaRPr>
+          </a:p>
+        </p:txBody>
+      </p:sp>
+      <p:sp>
+        <p:nvSpPr>
+          <p:cNvPr id="25" name="TextBox 24"/>
+          <p:cNvSpPr txBox="1"/>
+          <p:nvPr/>
+        </p:nvSpPr>
+        <p:spPr>
+          <a:xfrm>
+            <a:off x="2514600" y="1688068"/>
+            <a:ext cx="1600200" cy="369332"/>
+          </a:xfrm>
+          <a:prstGeom prst="rect">
+            <a:avLst/>
+          </a:prstGeom>
+          <a:noFill/>
+        </p:spPr>
+        <p:txBody>
+          <a:bodyPr wrap="square" rtlCol="0">
+            <a:spAutoFit/>
+          </a:bodyPr>
+          <a:lstStyle/>
+          <a:p>
+            <a:r>
+              <a:rPr lang="en-US" dirty="0" smtClean="0">
+                <a:latin typeface="Times New Roman" pitchFamily="18" charset="0"/>
+                <a:cs typeface="Times New Roman" pitchFamily="18" charset="0"/>
+              </a:rPr>
+              <a:t>function name</a:t>
+            </a:r>
+            <a:endParaRPr lang="en-US" dirty="0">
+              <a:latin typeface="Times New Roman" pitchFamily="18" charset="0"/>
+              <a:cs typeface="Times New Roman" pitchFamily="18" charset="0"/>
+            </a:endParaRPr>
+          </a:p>
+        </p:txBody>
+      </p:sp>
+      <p:sp>
+        <p:nvSpPr>
+          <p:cNvPr id="26" name="TextBox 25"/>
+          <p:cNvSpPr txBox="1"/>
+          <p:nvPr/>
+        </p:nvSpPr>
+        <p:spPr>
+          <a:xfrm>
+            <a:off x="3807725" y="1447800"/>
+            <a:ext cx="3050275" cy="369332"/>
+          </a:xfrm>
+          <a:prstGeom prst="rect">
+            <a:avLst/>
+          </a:prstGeom>
+          <a:noFill/>
+        </p:spPr>
+        <p:txBody>
+          <a:bodyPr wrap="square" rtlCol="0">
+            <a:spAutoFit/>
+          </a:bodyPr>
+          <a:lstStyle/>
+          <a:p>
+            <a:r>
+              <a:rPr lang="en-US" dirty="0">
+                <a:latin typeface="Times New Roman" pitchFamily="18" charset="0"/>
+                <a:cs typeface="Times New Roman" pitchFamily="18" charset="0"/>
+              </a:rPr>
+              <a:t>p</a:t>
+            </a:r>
+            <a:r>
+              <a:rPr lang="en-US" dirty="0" smtClean="0">
+                <a:latin typeface="Times New Roman" pitchFamily="18" charset="0"/>
+                <a:cs typeface="Times New Roman" pitchFamily="18" charset="0"/>
+              </a:rPr>
+              <a:t>arameter list in parentheses</a:t>
+            </a:r>
+            <a:endParaRPr lang="en-US" dirty="0">
+              <a:latin typeface="Times New Roman" pitchFamily="18" charset="0"/>
+              <a:cs typeface="Times New Roman" pitchFamily="18" charset="0"/>
+            </a:endParaRPr>
+          </a:p>
+        </p:txBody>
+      </p:sp>
+      <p:sp>
+        <p:nvSpPr>
+          <p:cNvPr id="27" name="TextBox 26"/>
+          <p:cNvSpPr txBox="1"/>
+          <p:nvPr/>
+        </p:nvSpPr>
+        <p:spPr>
+          <a:xfrm>
+            <a:off x="5026925" y="1764268"/>
+            <a:ext cx="2135875" cy="369332"/>
+          </a:xfrm>
+          <a:prstGeom prst="rect">
+            <a:avLst/>
+          </a:prstGeom>
+          <a:noFill/>
+        </p:spPr>
+        <p:txBody>
+          <a:bodyPr wrap="square" rtlCol="0">
+            <a:spAutoFit/>
+          </a:bodyPr>
+          <a:lstStyle/>
+          <a:p>
+            <a:r>
+              <a:rPr lang="en-US" dirty="0" smtClean="0">
+                <a:latin typeface="Times New Roman" pitchFamily="18" charset="0"/>
+                <a:cs typeface="Times New Roman" pitchFamily="18" charset="0"/>
+              </a:rPr>
+              <a:t>function’s result type</a:t>
+            </a:r>
+            <a:endParaRPr lang="en-US" dirty="0">
+              <a:latin typeface="Times New Roman" pitchFamily="18" charset="0"/>
+              <a:cs typeface="Times New Roman" pitchFamily="18" charset="0"/>
+            </a:endParaRPr>
+          </a:p>
+        </p:txBody>
+      </p:sp>
+      <p:sp>
+        <p:nvSpPr>
+          <p:cNvPr id="28" name="TextBox 27"/>
+          <p:cNvSpPr txBox="1"/>
+          <p:nvPr/>
+        </p:nvSpPr>
+        <p:spPr>
+          <a:xfrm>
+            <a:off x="6931925" y="1981200"/>
+            <a:ext cx="1221475" cy="369332"/>
+          </a:xfrm>
+          <a:prstGeom prst="rect">
+            <a:avLst/>
+          </a:prstGeom>
+          <a:noFill/>
+        </p:spPr>
+        <p:txBody>
+          <a:bodyPr wrap="square" rtlCol="0">
+            <a:spAutoFit/>
+          </a:bodyPr>
+          <a:lstStyle/>
+          <a:p>
+            <a:r>
+              <a:rPr lang="en-US" dirty="0" smtClean="0">
+                <a:latin typeface="Times New Roman" pitchFamily="18" charset="0"/>
+                <a:cs typeface="Times New Roman" pitchFamily="18" charset="0"/>
+              </a:rPr>
+              <a:t>equals sign</a:t>
+            </a:r>
+            <a:endParaRPr lang="en-US" dirty="0">
+              <a:latin typeface="Times New Roman" pitchFamily="18" charset="0"/>
+              <a:cs typeface="Times New Roman" pitchFamily="18" charset="0"/>
+            </a:endParaRPr>
+          </a:p>
+        </p:txBody>
+      </p:sp>
+      <p:sp>
+        <p:nvSpPr>
+          <p:cNvPr id="29" name="TextBox 28"/>
+          <p:cNvSpPr txBox="1"/>
+          <p:nvPr/>
+        </p:nvSpPr>
+        <p:spPr>
+          <a:xfrm>
+            <a:off x="6169925" y="4267200"/>
+            <a:ext cx="1754875" cy="646331"/>
+          </a:xfrm>
+          <a:prstGeom prst="rect">
+            <a:avLst/>
+          </a:prstGeom>
+          <a:noFill/>
+        </p:spPr>
+        <p:txBody>
+          <a:bodyPr wrap="square" rtlCol="0">
+            <a:spAutoFit/>
+          </a:bodyPr>
+          <a:lstStyle/>
+          <a:p>
+            <a:r>
+              <a:rPr lang="en-US" dirty="0" smtClean="0">
+                <a:latin typeface="Times New Roman" pitchFamily="18" charset="0"/>
+                <a:cs typeface="Times New Roman" pitchFamily="18" charset="0"/>
+              </a:rPr>
+              <a:t>function body</a:t>
+            </a:r>
+          </a:p>
+          <a:p>
+            <a:r>
+              <a:rPr lang="en-US" dirty="0" smtClean="0">
+                <a:latin typeface="Times New Roman" pitchFamily="18" charset="0"/>
+                <a:cs typeface="Times New Roman" pitchFamily="18" charset="0"/>
+              </a:rPr>
+              <a:t>in curly braces</a:t>
+            </a:r>
+            <a:endParaRPr lang="en-US" dirty="0">
+              <a:latin typeface="Times New Roman" pitchFamily="18" charset="0"/>
+              <a:cs typeface="Times New Roman" pitchFamily="18" charset="0"/>
+            </a:endParaRPr>
+          </a:p>
+        </p:txBody>
+      </p:sp>
+    </p:spTree>
+    <p:extLst>
+      <p:ext uri="{BB962C8B-B14F-4D97-AF65-F5344CB8AC3E}">
+        <p14:creationId xmlns:p14="http://schemas.microsoft.com/office/powerpoint/2010/main" val="3473946142"/>
       </p:ext>
     </p:extLst>
   </p:cSld>

</xml_diff>

<commit_message>
completed part 3, added link to the 'principles of the type theory' video
</commit_message>
<xml_diff>
--- a/ScalaLecture/source/resources/Graphics.pptx
+++ b/ScalaLecture/source/resources/Graphics.pptx
@@ -12,6 +12,7 @@
     <p:sldId id="261" r:id="rId6"/>
     <p:sldId id="262" r:id="rId7"/>
     <p:sldId id="263" r:id="rId8"/>
+    <p:sldId id="264" r:id="rId9"/>
   </p:sldIdLst>
   <p:sldSz cx="9144000" cy="6858000" type="screen4x3"/>
   <p:notesSz cx="6858000" cy="9144000"/>
@@ -295,7 +296,7 @@
             <a:fld id="{1D8BD707-D9CF-40AE-B4C6-C98DA3205C09}" type="datetimeFigureOut">
               <a:rPr lang="en-US" smtClean="0"/>
               <a:pPr/>
-              <a:t>3/12/2012</a:t>
+              <a:t>3/15/2012</a:t>
             </a:fld>
             <a:endParaRPr lang="en-US"/>
           </a:p>
@@ -462,7 +463,7 @@
             <a:fld id="{1D8BD707-D9CF-40AE-B4C6-C98DA3205C09}" type="datetimeFigureOut">
               <a:rPr lang="en-US" smtClean="0"/>
               <a:pPr/>
-              <a:t>3/12/2012</a:t>
+              <a:t>3/15/2012</a:t>
             </a:fld>
             <a:endParaRPr lang="en-US"/>
           </a:p>
@@ -639,7 +640,7 @@
             <a:fld id="{1D8BD707-D9CF-40AE-B4C6-C98DA3205C09}" type="datetimeFigureOut">
               <a:rPr lang="en-US" smtClean="0"/>
               <a:pPr/>
-              <a:t>3/12/2012</a:t>
+              <a:t>3/15/2012</a:t>
             </a:fld>
             <a:endParaRPr lang="en-US"/>
           </a:p>
@@ -806,7 +807,7 @@
             <a:fld id="{1D8BD707-D9CF-40AE-B4C6-C98DA3205C09}" type="datetimeFigureOut">
               <a:rPr lang="en-US" smtClean="0"/>
               <a:pPr/>
-              <a:t>3/12/2012</a:t>
+              <a:t>3/15/2012</a:t>
             </a:fld>
             <a:endParaRPr lang="en-US"/>
           </a:p>
@@ -1049,7 +1050,7 @@
             <a:fld id="{1D8BD707-D9CF-40AE-B4C6-C98DA3205C09}" type="datetimeFigureOut">
               <a:rPr lang="en-US" smtClean="0"/>
               <a:pPr/>
-              <a:t>3/12/2012</a:t>
+              <a:t>3/15/2012</a:t>
             </a:fld>
             <a:endParaRPr lang="en-US"/>
           </a:p>
@@ -1334,7 +1335,7 @@
             <a:fld id="{1D8BD707-D9CF-40AE-B4C6-C98DA3205C09}" type="datetimeFigureOut">
               <a:rPr lang="en-US" smtClean="0"/>
               <a:pPr/>
-              <a:t>3/12/2012</a:t>
+              <a:t>3/15/2012</a:t>
             </a:fld>
             <a:endParaRPr lang="en-US"/>
           </a:p>
@@ -1753,7 +1754,7 @@
             <a:fld id="{1D8BD707-D9CF-40AE-B4C6-C98DA3205C09}" type="datetimeFigureOut">
               <a:rPr lang="en-US" smtClean="0"/>
               <a:pPr/>
-              <a:t>3/12/2012</a:t>
+              <a:t>3/15/2012</a:t>
             </a:fld>
             <a:endParaRPr lang="en-US"/>
           </a:p>
@@ -1868,7 +1869,7 @@
             <a:fld id="{1D8BD707-D9CF-40AE-B4C6-C98DA3205C09}" type="datetimeFigureOut">
               <a:rPr lang="en-US" smtClean="0"/>
               <a:pPr/>
-              <a:t>3/12/2012</a:t>
+              <a:t>3/15/2012</a:t>
             </a:fld>
             <a:endParaRPr lang="en-US"/>
           </a:p>
@@ -1960,7 +1961,7 @@
             <a:fld id="{1D8BD707-D9CF-40AE-B4C6-C98DA3205C09}" type="datetimeFigureOut">
               <a:rPr lang="en-US" smtClean="0"/>
               <a:pPr/>
-              <a:t>3/12/2012</a:t>
+              <a:t>3/15/2012</a:t>
             </a:fld>
             <a:endParaRPr lang="en-US"/>
           </a:p>
@@ -2234,7 +2235,7 @@
             <a:fld id="{1D8BD707-D9CF-40AE-B4C6-C98DA3205C09}" type="datetimeFigureOut">
               <a:rPr lang="en-US" smtClean="0"/>
               <a:pPr/>
-              <a:t>3/12/2012</a:t>
+              <a:t>3/15/2012</a:t>
             </a:fld>
             <a:endParaRPr lang="en-US"/>
           </a:p>
@@ -2484,7 +2485,7 @@
             <a:fld id="{1D8BD707-D9CF-40AE-B4C6-C98DA3205C09}" type="datetimeFigureOut">
               <a:rPr lang="en-US" smtClean="0"/>
               <a:pPr/>
-              <a:t>3/12/2012</a:t>
+              <a:t>3/15/2012</a:t>
             </a:fld>
             <a:endParaRPr lang="en-US"/>
           </a:p>
@@ -2694,7 +2695,7 @@
             <a:fld id="{1D8BD707-D9CF-40AE-B4C6-C98DA3205C09}" type="datetimeFigureOut">
               <a:rPr lang="en-US" smtClean="0"/>
               <a:pPr/>
-              <a:t>3/12/2012</a:t>
+              <a:t>3/15/2012</a:t>
             </a:fld>
             <a:endParaRPr lang="en-US"/>
           </a:p>
@@ -6563,6 +6564,381 @@
 </p:sld>
 </file>
 
+<file path=ppt/slides/slide8.xml><?xml version="1.0" encoding="utf-8"?>
+<p:sld xmlns:a="http://schemas.openxmlformats.org/drawingml/2006/main" xmlns:r="http://schemas.openxmlformats.org/officeDocument/2006/relationships" xmlns:p="http://schemas.openxmlformats.org/presentationml/2006/main">
+  <p:cSld>
+    <p:spTree>
+      <p:nvGrpSpPr>
+        <p:cNvPr id="1" name=""/>
+        <p:cNvGrpSpPr/>
+        <p:nvPr/>
+      </p:nvGrpSpPr>
+      <p:grpSpPr>
+        <a:xfrm>
+          <a:off x="0" y="0"/>
+          <a:ext cx="0" cy="0"/>
+          <a:chOff x="0" y="0"/>
+          <a:chExt cx="0" cy="0"/>
+        </a:xfrm>
+      </p:grpSpPr>
+      <p:pic>
+        <p:nvPicPr>
+          <p:cNvPr id="1026" name="Picture 2" descr="D:\Dropbox\Documents\Papers\ScalaLecture\source\resources\SOGithub.jpg"/>
+          <p:cNvPicPr>
+            <a:picLocks noChangeAspect="1" noChangeArrowheads="1"/>
+          </p:cNvPicPr>
+          <p:nvPr/>
+        </p:nvPicPr>
+        <p:blipFill>
+          <a:blip r:embed="rId2">
+            <a:extLst>
+              <a:ext uri="{28A0092B-C50C-407E-A947-70E740481C1C}">
+                <a14:useLocalDpi xmlns:a14="http://schemas.microsoft.com/office/drawing/2010/main" val="0"/>
+              </a:ext>
+            </a:extLst>
+          </a:blip>
+          <a:srcRect/>
+          <a:stretch>
+            <a:fillRect/>
+          </a:stretch>
+        </p:blipFill>
+        <p:spPr bwMode="auto">
+          <a:xfrm>
+            <a:off x="697310" y="-50800"/>
+            <a:ext cx="7837090" cy="6299200"/>
+          </a:xfrm>
+          <a:prstGeom prst="rect">
+            <a:avLst/>
+          </a:prstGeom>
+          <a:noFill/>
+          <a:extLst>
+            <a:ext uri="{909E8E84-426E-40DD-AFC4-6F175D3DCCD1}">
+              <a14:hiddenFill xmlns:a14="http://schemas.microsoft.com/office/drawing/2010/main">
+                <a:solidFill>
+                  <a:srgbClr val="FFFFFF"/>
+                </a:solidFill>
+              </a14:hiddenFill>
+            </a:ext>
+          </a:extLst>
+        </p:spPr>
+      </p:pic>
+      <p:sp>
+        <p:nvSpPr>
+          <p:cNvPr id="4" name="Oval 3"/>
+          <p:cNvSpPr/>
+          <p:nvPr/>
+        </p:nvSpPr>
+        <p:spPr>
+          <a:xfrm>
+            <a:off x="6096000" y="1143000"/>
+            <a:ext cx="685800" cy="304800"/>
+          </a:xfrm>
+          <a:prstGeom prst="ellipse">
+            <a:avLst/>
+          </a:prstGeom>
+          <a:noFill/>
+          <a:ln>
+            <a:solidFill>
+              <a:srgbClr val="FF0000"/>
+            </a:solidFill>
+          </a:ln>
+        </p:spPr>
+        <p:style>
+          <a:lnRef idx="2">
+            <a:schemeClr val="accent1">
+              <a:shade val="50000"/>
+            </a:schemeClr>
+          </a:lnRef>
+          <a:fillRef idx="1">
+            <a:schemeClr val="accent1"/>
+          </a:fillRef>
+          <a:effectRef idx="0">
+            <a:schemeClr val="accent1"/>
+          </a:effectRef>
+          <a:fontRef idx="minor">
+            <a:schemeClr val="lt1"/>
+          </a:fontRef>
+        </p:style>
+        <p:txBody>
+          <a:bodyPr rtlCol="0" anchor="ctr"/>
+          <a:lstStyle/>
+          <a:p>
+            <a:pPr algn="ctr"/>
+            <a:endParaRPr lang="en-US"/>
+          </a:p>
+        </p:txBody>
+      </p:sp>
+      <p:sp>
+        <p:nvSpPr>
+          <p:cNvPr id="2" name="Oval 1"/>
+          <p:cNvSpPr/>
+          <p:nvPr/>
+        </p:nvSpPr>
+        <p:spPr>
+          <a:xfrm>
+            <a:off x="4495800" y="1447800"/>
+            <a:ext cx="2514600" cy="1752600"/>
+          </a:xfrm>
+          <a:prstGeom prst="ellipse">
+            <a:avLst/>
+          </a:prstGeom>
+          <a:noFill/>
+          <a:ln>
+            <a:solidFill>
+              <a:srgbClr val="00B050"/>
+            </a:solidFill>
+          </a:ln>
+        </p:spPr>
+        <p:style>
+          <a:lnRef idx="2">
+            <a:schemeClr val="accent1">
+              <a:shade val="50000"/>
+            </a:schemeClr>
+          </a:lnRef>
+          <a:fillRef idx="1">
+            <a:schemeClr val="accent1"/>
+          </a:fillRef>
+          <a:effectRef idx="0">
+            <a:schemeClr val="accent1"/>
+          </a:effectRef>
+          <a:fontRef idx="minor">
+            <a:schemeClr val="lt1"/>
+          </a:fontRef>
+        </p:style>
+        <p:txBody>
+          <a:bodyPr rtlCol="0" anchor="ctr"/>
+          <a:lstStyle/>
+          <a:p>
+            <a:pPr algn="ctr"/>
+            <a:endParaRPr lang="en-US"/>
+          </a:p>
+        </p:txBody>
+      </p:sp>
+      <p:sp>
+        <p:nvSpPr>
+          <p:cNvPr id="3" name="Oval 2"/>
+          <p:cNvSpPr/>
+          <p:nvPr/>
+        </p:nvSpPr>
+        <p:spPr>
+          <a:xfrm>
+            <a:off x="6781800" y="152400"/>
+            <a:ext cx="1524000" cy="1066800"/>
+          </a:xfrm>
+          <a:prstGeom prst="ellipse">
+            <a:avLst/>
+          </a:prstGeom>
+          <a:noFill/>
+          <a:ln>
+            <a:solidFill>
+              <a:srgbClr val="00B050"/>
+            </a:solidFill>
+          </a:ln>
+        </p:spPr>
+        <p:style>
+          <a:lnRef idx="2">
+            <a:schemeClr val="accent1">
+              <a:shade val="50000"/>
+            </a:schemeClr>
+          </a:lnRef>
+          <a:fillRef idx="1">
+            <a:schemeClr val="accent1"/>
+          </a:fillRef>
+          <a:effectRef idx="0">
+            <a:schemeClr val="accent1"/>
+          </a:effectRef>
+          <a:fontRef idx="minor">
+            <a:schemeClr val="lt1"/>
+          </a:fontRef>
+        </p:style>
+        <p:txBody>
+          <a:bodyPr rtlCol="0" anchor="ctr"/>
+          <a:lstStyle/>
+          <a:p>
+            <a:pPr algn="ctr"/>
+            <a:endParaRPr lang="en-US"/>
+          </a:p>
+        </p:txBody>
+      </p:sp>
+      <p:cxnSp>
+        <p:nvCxnSpPr>
+          <p:cNvPr id="6" name="Straight Arrow Connector 5"/>
+          <p:cNvCxnSpPr>
+            <a:endCxn id="2" idx="5"/>
+          </p:cNvCxnSpPr>
+          <p:nvPr/>
+        </p:nvCxnSpPr>
+        <p:spPr>
+          <a:xfrm flipH="1" flipV="1">
+            <a:off x="6642145" y="2943738"/>
+            <a:ext cx="1206455" cy="942462"/>
+          </a:xfrm>
+          <a:prstGeom prst="straightConnector1">
+            <a:avLst/>
+          </a:prstGeom>
+          <a:ln>
+            <a:solidFill>
+              <a:srgbClr val="00B050"/>
+            </a:solidFill>
+            <a:tailEnd type="arrow"/>
+          </a:ln>
+        </p:spPr>
+        <p:style>
+          <a:lnRef idx="1">
+            <a:schemeClr val="accent1"/>
+          </a:lnRef>
+          <a:fillRef idx="0">
+            <a:schemeClr val="accent1"/>
+          </a:fillRef>
+          <a:effectRef idx="0">
+            <a:schemeClr val="accent1"/>
+          </a:effectRef>
+          <a:fontRef idx="minor">
+            <a:schemeClr val="tx1"/>
+          </a:fontRef>
+        </p:style>
+      </p:cxnSp>
+      <p:cxnSp>
+        <p:nvCxnSpPr>
+          <p:cNvPr id="10" name="Straight Arrow Connector 9"/>
+          <p:cNvCxnSpPr>
+            <a:endCxn id="3" idx="4"/>
+          </p:cNvCxnSpPr>
+          <p:nvPr/>
+        </p:nvCxnSpPr>
+        <p:spPr>
+          <a:xfrm flipH="1" flipV="1">
+            <a:off x="7543800" y="1219200"/>
+            <a:ext cx="228600" cy="914400"/>
+          </a:xfrm>
+          <a:prstGeom prst="straightConnector1">
+            <a:avLst/>
+          </a:prstGeom>
+          <a:ln>
+            <a:solidFill>
+              <a:srgbClr val="00B050"/>
+            </a:solidFill>
+            <a:tailEnd type="arrow"/>
+          </a:ln>
+        </p:spPr>
+        <p:style>
+          <a:lnRef idx="1">
+            <a:schemeClr val="accent1"/>
+          </a:lnRef>
+          <a:fillRef idx="0">
+            <a:schemeClr val="accent1"/>
+          </a:fillRef>
+          <a:effectRef idx="0">
+            <a:schemeClr val="accent1"/>
+          </a:effectRef>
+          <a:fontRef idx="minor">
+            <a:schemeClr val="tx1"/>
+          </a:fontRef>
+        </p:style>
+      </p:cxnSp>
+      <p:sp>
+        <p:nvSpPr>
+          <p:cNvPr id="11" name="TextBox 10"/>
+          <p:cNvSpPr txBox="1"/>
+          <p:nvPr/>
+        </p:nvSpPr>
+        <p:spPr>
+          <a:xfrm>
+            <a:off x="7543800" y="3810000"/>
+            <a:ext cx="1295400" cy="461665"/>
+          </a:xfrm>
+          <a:prstGeom prst="rect">
+            <a:avLst/>
+          </a:prstGeom>
+          <a:noFill/>
+          <a:ln>
+            <a:noFill/>
+          </a:ln>
+        </p:spPr>
+        <p:txBody>
+          <a:bodyPr wrap="square" rtlCol="0">
+            <a:spAutoFit/>
+          </a:bodyPr>
+          <a:lstStyle/>
+          <a:p>
+            <a:r>
+              <a:rPr lang="en-US" sz="2400" dirty="0" smtClean="0">
+                <a:solidFill>
+                  <a:srgbClr val="00B050"/>
+                </a:solidFill>
+                <a:latin typeface="Times New Roman" pitchFamily="18" charset="0"/>
+                <a:cs typeface="Times New Roman" pitchFamily="18" charset="0"/>
+              </a:rPr>
+              <a:t>Tier 2</a:t>
+            </a:r>
+            <a:endParaRPr lang="en-US" sz="2400" dirty="0">
+              <a:solidFill>
+                <a:srgbClr val="00B050"/>
+              </a:solidFill>
+              <a:latin typeface="Times New Roman" pitchFamily="18" charset="0"/>
+              <a:cs typeface="Times New Roman" pitchFamily="18" charset="0"/>
+            </a:endParaRPr>
+          </a:p>
+        </p:txBody>
+      </p:sp>
+      <p:sp>
+        <p:nvSpPr>
+          <p:cNvPr id="13" name="TextBox 12"/>
+          <p:cNvSpPr txBox="1"/>
+          <p:nvPr/>
+        </p:nvSpPr>
+        <p:spPr>
+          <a:xfrm>
+            <a:off x="7391400" y="1981200"/>
+            <a:ext cx="1295400" cy="461665"/>
+          </a:xfrm>
+          <a:prstGeom prst="rect">
+            <a:avLst/>
+          </a:prstGeom>
+          <a:noFill/>
+          <a:ln>
+            <a:noFill/>
+          </a:ln>
+        </p:spPr>
+        <p:txBody>
+          <a:bodyPr wrap="square" rtlCol="0">
+            <a:spAutoFit/>
+          </a:bodyPr>
+          <a:lstStyle/>
+          <a:p>
+            <a:r>
+              <a:rPr lang="en-US" sz="2400" dirty="0" smtClean="0">
+                <a:solidFill>
+                  <a:srgbClr val="00B050"/>
+                </a:solidFill>
+                <a:latin typeface="Times New Roman" pitchFamily="18" charset="0"/>
+                <a:cs typeface="Times New Roman" pitchFamily="18" charset="0"/>
+              </a:rPr>
+              <a:t>Tier 1</a:t>
+            </a:r>
+            <a:endParaRPr lang="en-US" sz="2400" dirty="0">
+              <a:solidFill>
+                <a:srgbClr val="00B050"/>
+              </a:solidFill>
+              <a:latin typeface="Times New Roman" pitchFamily="18" charset="0"/>
+              <a:cs typeface="Times New Roman" pitchFamily="18" charset="0"/>
+            </a:endParaRPr>
+          </a:p>
+        </p:txBody>
+      </p:sp>
+    </p:spTree>
+    <p:extLst>
+      <p:ext uri="{BB962C8B-B14F-4D97-AF65-F5344CB8AC3E}">
+        <p14:creationId xmlns:p14="http://schemas.microsoft.com/office/powerpoint/2010/main" val="4065060636"/>
+      </p:ext>
+    </p:extLst>
+  </p:cSld>
+  <p:clrMapOvr>
+    <a:masterClrMapping/>
+  </p:clrMapOvr>
+</p:sld>
+</file>
+
 <file path=ppt/theme/theme1.xml><?xml version="1.0" encoding="utf-8"?>
 <a:theme xmlns:a="http://schemas.openxmlformats.org/drawingml/2006/main" name="Office Theme">
   <a:themeElements>

</xml_diff>

<commit_message>
Refactored chapters 2 and 3
</commit_message>
<xml_diff>
--- a/ScalaLecture/source/resources/Graphics.pptx
+++ b/ScalaLecture/source/resources/Graphics.pptx
@@ -296,7 +296,7 @@
             <a:fld id="{1D8BD707-D9CF-40AE-B4C6-C98DA3205C09}" type="datetimeFigureOut">
               <a:rPr lang="en-US" smtClean="0"/>
               <a:pPr/>
-              <a:t>3/15/2012</a:t>
+              <a:t>3/22/2012</a:t>
             </a:fld>
             <a:endParaRPr lang="en-US"/>
           </a:p>
@@ -463,7 +463,7 @@
             <a:fld id="{1D8BD707-D9CF-40AE-B4C6-C98DA3205C09}" type="datetimeFigureOut">
               <a:rPr lang="en-US" smtClean="0"/>
               <a:pPr/>
-              <a:t>3/15/2012</a:t>
+              <a:t>3/22/2012</a:t>
             </a:fld>
             <a:endParaRPr lang="en-US"/>
           </a:p>
@@ -640,7 +640,7 @@
             <a:fld id="{1D8BD707-D9CF-40AE-B4C6-C98DA3205C09}" type="datetimeFigureOut">
               <a:rPr lang="en-US" smtClean="0"/>
               <a:pPr/>
-              <a:t>3/15/2012</a:t>
+              <a:t>3/22/2012</a:t>
             </a:fld>
             <a:endParaRPr lang="en-US"/>
           </a:p>
@@ -807,7 +807,7 @@
             <a:fld id="{1D8BD707-D9CF-40AE-B4C6-C98DA3205C09}" type="datetimeFigureOut">
               <a:rPr lang="en-US" smtClean="0"/>
               <a:pPr/>
-              <a:t>3/15/2012</a:t>
+              <a:t>3/22/2012</a:t>
             </a:fld>
             <a:endParaRPr lang="en-US"/>
           </a:p>
@@ -1050,7 +1050,7 @@
             <a:fld id="{1D8BD707-D9CF-40AE-B4C6-C98DA3205C09}" type="datetimeFigureOut">
               <a:rPr lang="en-US" smtClean="0"/>
               <a:pPr/>
-              <a:t>3/15/2012</a:t>
+              <a:t>3/22/2012</a:t>
             </a:fld>
             <a:endParaRPr lang="en-US"/>
           </a:p>
@@ -1335,7 +1335,7 @@
             <a:fld id="{1D8BD707-D9CF-40AE-B4C6-C98DA3205C09}" type="datetimeFigureOut">
               <a:rPr lang="en-US" smtClean="0"/>
               <a:pPr/>
-              <a:t>3/15/2012</a:t>
+              <a:t>3/22/2012</a:t>
             </a:fld>
             <a:endParaRPr lang="en-US"/>
           </a:p>
@@ -1754,7 +1754,7 @@
             <a:fld id="{1D8BD707-D9CF-40AE-B4C6-C98DA3205C09}" type="datetimeFigureOut">
               <a:rPr lang="en-US" smtClean="0"/>
               <a:pPr/>
-              <a:t>3/15/2012</a:t>
+              <a:t>3/22/2012</a:t>
             </a:fld>
             <a:endParaRPr lang="en-US"/>
           </a:p>
@@ -1869,7 +1869,7 @@
             <a:fld id="{1D8BD707-D9CF-40AE-B4C6-C98DA3205C09}" type="datetimeFigureOut">
               <a:rPr lang="en-US" smtClean="0"/>
               <a:pPr/>
-              <a:t>3/15/2012</a:t>
+              <a:t>3/22/2012</a:t>
             </a:fld>
             <a:endParaRPr lang="en-US"/>
           </a:p>
@@ -1961,7 +1961,7 @@
             <a:fld id="{1D8BD707-D9CF-40AE-B4C6-C98DA3205C09}" type="datetimeFigureOut">
               <a:rPr lang="en-US" smtClean="0"/>
               <a:pPr/>
-              <a:t>3/15/2012</a:t>
+              <a:t>3/22/2012</a:t>
             </a:fld>
             <a:endParaRPr lang="en-US"/>
           </a:p>
@@ -2235,7 +2235,7 @@
             <a:fld id="{1D8BD707-D9CF-40AE-B4C6-C98DA3205C09}" type="datetimeFigureOut">
               <a:rPr lang="en-US" smtClean="0"/>
               <a:pPr/>
-              <a:t>3/15/2012</a:t>
+              <a:t>3/22/2012</a:t>
             </a:fld>
             <a:endParaRPr lang="en-US"/>
           </a:p>
@@ -2485,7 +2485,7 @@
             <a:fld id="{1D8BD707-D9CF-40AE-B4C6-C98DA3205C09}" type="datetimeFigureOut">
               <a:rPr lang="en-US" smtClean="0"/>
               <a:pPr/>
-              <a:t>3/15/2012</a:t>
+              <a:t>3/22/2012</a:t>
             </a:fld>
             <a:endParaRPr lang="en-US"/>
           </a:p>
@@ -2695,7 +2695,7 @@
             <a:fld id="{1D8BD707-D9CF-40AE-B4C6-C98DA3205C09}" type="datetimeFigureOut">
               <a:rPr lang="en-US" smtClean="0"/>
               <a:pPr/>
-              <a:t>3/15/2012</a:t>
+              <a:t>3/22/2012</a:t>
             </a:fld>
             <a:endParaRPr lang="en-US"/>
           </a:p>
@@ -6005,7 +6005,7 @@
       </p:grpSpPr>
       <p:pic>
         <p:nvPicPr>
-          <p:cNvPr id="1026" name="Picture 2" descr="D:\Dropbox\Documents\Papers\ScalaLecture\source\resources\Method.png"/>
+          <p:cNvPr id="17" name="Picture 2" descr="D:\Dropbox\Documents\Papers\ScalaLecture\source\resources\Functions.png"/>
           <p:cNvPicPr>
             <a:picLocks noChangeAspect="1" noChangeArrowheads="1"/>
           </p:cNvPicPr>
@@ -6026,8 +6026,8 @@
         </p:blipFill>
         <p:spPr bwMode="auto">
           <a:xfrm>
-            <a:off x="2619375" y="2952750"/>
-            <a:ext cx="4543425" cy="1847850"/>
+            <a:off x="2617787" y="2952750"/>
+            <a:ext cx="4545013" cy="1847850"/>
           </a:xfrm>
           <a:prstGeom prst="rect">
             <a:avLst/>
@@ -6155,9 +6155,7 @@
       <p:cxnSp>
         <p:nvCxnSpPr>
           <p:cNvPr id="14" name="Straight Arrow Connector 13"/>
-          <p:cNvCxnSpPr>
-            <a:endCxn id="1026" idx="0"/>
-          </p:cNvCxnSpPr>
+          <p:cNvCxnSpPr/>
           <p:nvPr/>
         </p:nvCxnSpPr>
         <p:spPr>
@@ -6262,6 +6260,252 @@
           </a:fontRef>
         </p:style>
       </p:cxnSp>
+      <p:sp>
+        <p:nvSpPr>
+          <p:cNvPr id="23" name="TextBox 22"/>
+          <p:cNvSpPr txBox="1"/>
+          <p:nvPr/>
+        </p:nvSpPr>
+        <p:spPr>
+          <a:xfrm>
+            <a:off x="533400" y="1447800"/>
+            <a:ext cx="3276600" cy="369332"/>
+          </a:xfrm>
+          <a:prstGeom prst="rect">
+            <a:avLst/>
+          </a:prstGeom>
+          <a:noFill/>
+        </p:spPr>
+        <p:txBody>
+          <a:bodyPr wrap="square" rtlCol="0">
+            <a:spAutoFit/>
+          </a:bodyPr>
+          <a:lstStyle/>
+          <a:p>
+            <a:r>
+              <a:rPr lang="en-US" dirty="0" smtClean="0">
+                <a:latin typeface="Times New Roman" pitchFamily="18" charset="0"/>
+                <a:cs typeface="Times New Roman" pitchFamily="18" charset="0"/>
+              </a:rPr>
+              <a:t>“</a:t>
+            </a:r>
+            <a:r>
+              <a:rPr lang="en-US" dirty="0" err="1" smtClean="0">
+                <a:latin typeface="Times New Roman" pitchFamily="18" charset="0"/>
+                <a:cs typeface="Times New Roman" pitchFamily="18" charset="0"/>
+              </a:rPr>
+              <a:t>def</a:t>
+            </a:r>
+            <a:r>
+              <a:rPr lang="en-US" dirty="0" smtClean="0">
+                <a:latin typeface="Times New Roman" pitchFamily="18" charset="0"/>
+                <a:cs typeface="Times New Roman" pitchFamily="18" charset="0"/>
+              </a:rPr>
+              <a:t>” starts a function definition</a:t>
+            </a:r>
+            <a:endParaRPr lang="en-US" dirty="0">
+              <a:latin typeface="Times New Roman" pitchFamily="18" charset="0"/>
+              <a:cs typeface="Times New Roman" pitchFamily="18" charset="0"/>
+            </a:endParaRPr>
+          </a:p>
+        </p:txBody>
+      </p:sp>
+      <p:sp>
+        <p:nvSpPr>
+          <p:cNvPr id="25" name="TextBox 24"/>
+          <p:cNvSpPr txBox="1"/>
+          <p:nvPr/>
+        </p:nvSpPr>
+        <p:spPr>
+          <a:xfrm>
+            <a:off x="2514600" y="1688068"/>
+            <a:ext cx="1600200" cy="369332"/>
+          </a:xfrm>
+          <a:prstGeom prst="rect">
+            <a:avLst/>
+          </a:prstGeom>
+          <a:noFill/>
+        </p:spPr>
+        <p:txBody>
+          <a:bodyPr wrap="square" rtlCol="0">
+            <a:spAutoFit/>
+          </a:bodyPr>
+          <a:lstStyle/>
+          <a:p>
+            <a:r>
+              <a:rPr lang="en-US" dirty="0" smtClean="0">
+                <a:latin typeface="Times New Roman" pitchFamily="18" charset="0"/>
+                <a:cs typeface="Times New Roman" pitchFamily="18" charset="0"/>
+              </a:rPr>
+              <a:t>function name</a:t>
+            </a:r>
+            <a:endParaRPr lang="en-US" dirty="0">
+              <a:latin typeface="Times New Roman" pitchFamily="18" charset="0"/>
+              <a:cs typeface="Times New Roman" pitchFamily="18" charset="0"/>
+            </a:endParaRPr>
+          </a:p>
+        </p:txBody>
+      </p:sp>
+      <p:sp>
+        <p:nvSpPr>
+          <p:cNvPr id="26" name="TextBox 25"/>
+          <p:cNvSpPr txBox="1"/>
+          <p:nvPr/>
+        </p:nvSpPr>
+        <p:spPr>
+          <a:xfrm>
+            <a:off x="3807725" y="1447800"/>
+            <a:ext cx="3050275" cy="369332"/>
+          </a:xfrm>
+          <a:prstGeom prst="rect">
+            <a:avLst/>
+          </a:prstGeom>
+          <a:noFill/>
+        </p:spPr>
+        <p:txBody>
+          <a:bodyPr wrap="square" rtlCol="0">
+            <a:spAutoFit/>
+          </a:bodyPr>
+          <a:lstStyle/>
+          <a:p>
+            <a:r>
+              <a:rPr lang="en-US" dirty="0">
+                <a:latin typeface="Times New Roman" pitchFamily="18" charset="0"/>
+                <a:cs typeface="Times New Roman" pitchFamily="18" charset="0"/>
+              </a:rPr>
+              <a:t>p</a:t>
+            </a:r>
+            <a:r>
+              <a:rPr lang="en-US" dirty="0" smtClean="0">
+                <a:latin typeface="Times New Roman" pitchFamily="18" charset="0"/>
+                <a:cs typeface="Times New Roman" pitchFamily="18" charset="0"/>
+              </a:rPr>
+              <a:t>arameter list in parentheses</a:t>
+            </a:r>
+            <a:endParaRPr lang="en-US" dirty="0">
+              <a:latin typeface="Times New Roman" pitchFamily="18" charset="0"/>
+              <a:cs typeface="Times New Roman" pitchFamily="18" charset="0"/>
+            </a:endParaRPr>
+          </a:p>
+        </p:txBody>
+      </p:sp>
+      <p:sp>
+        <p:nvSpPr>
+          <p:cNvPr id="27" name="TextBox 26"/>
+          <p:cNvSpPr txBox="1"/>
+          <p:nvPr/>
+        </p:nvSpPr>
+        <p:spPr>
+          <a:xfrm>
+            <a:off x="5026925" y="1764268"/>
+            <a:ext cx="2135875" cy="369332"/>
+          </a:xfrm>
+          <a:prstGeom prst="rect">
+            <a:avLst/>
+          </a:prstGeom>
+          <a:noFill/>
+        </p:spPr>
+        <p:txBody>
+          <a:bodyPr wrap="square" rtlCol="0">
+            <a:spAutoFit/>
+          </a:bodyPr>
+          <a:lstStyle/>
+          <a:p>
+            <a:r>
+              <a:rPr lang="en-US" dirty="0" smtClean="0">
+                <a:latin typeface="Times New Roman" pitchFamily="18" charset="0"/>
+                <a:cs typeface="Times New Roman" pitchFamily="18" charset="0"/>
+              </a:rPr>
+              <a:t>function’s result type</a:t>
+            </a:r>
+            <a:endParaRPr lang="en-US" dirty="0">
+              <a:latin typeface="Times New Roman" pitchFamily="18" charset="0"/>
+              <a:cs typeface="Times New Roman" pitchFamily="18" charset="0"/>
+            </a:endParaRPr>
+          </a:p>
+        </p:txBody>
+      </p:sp>
+      <p:sp>
+        <p:nvSpPr>
+          <p:cNvPr id="28" name="TextBox 27"/>
+          <p:cNvSpPr txBox="1"/>
+          <p:nvPr/>
+        </p:nvSpPr>
+        <p:spPr>
+          <a:xfrm>
+            <a:off x="6931925" y="1981200"/>
+            <a:ext cx="1221475" cy="369332"/>
+          </a:xfrm>
+          <a:prstGeom prst="rect">
+            <a:avLst/>
+          </a:prstGeom>
+          <a:noFill/>
+        </p:spPr>
+        <p:txBody>
+          <a:bodyPr wrap="square" rtlCol="0">
+            <a:spAutoFit/>
+          </a:bodyPr>
+          <a:lstStyle/>
+          <a:p>
+            <a:r>
+              <a:rPr lang="en-US" dirty="0" smtClean="0">
+                <a:latin typeface="Times New Roman" pitchFamily="18" charset="0"/>
+                <a:cs typeface="Times New Roman" pitchFamily="18" charset="0"/>
+              </a:rPr>
+              <a:t>equals sign</a:t>
+            </a:r>
+            <a:endParaRPr lang="en-US" dirty="0">
+              <a:latin typeface="Times New Roman" pitchFamily="18" charset="0"/>
+              <a:cs typeface="Times New Roman" pitchFamily="18" charset="0"/>
+            </a:endParaRPr>
+          </a:p>
+        </p:txBody>
+      </p:sp>
+      <p:sp>
+        <p:nvSpPr>
+          <p:cNvPr id="29" name="TextBox 28"/>
+          <p:cNvSpPr txBox="1"/>
+          <p:nvPr/>
+        </p:nvSpPr>
+        <p:spPr>
+          <a:xfrm>
+            <a:off x="6169925" y="4267200"/>
+            <a:ext cx="1754875" cy="646331"/>
+          </a:xfrm>
+          <a:prstGeom prst="rect">
+            <a:avLst/>
+          </a:prstGeom>
+          <a:noFill/>
+        </p:spPr>
+        <p:txBody>
+          <a:bodyPr wrap="square" rtlCol="0">
+            <a:spAutoFit/>
+          </a:bodyPr>
+          <a:lstStyle/>
+          <a:p>
+            <a:r>
+              <a:rPr lang="en-US" dirty="0" smtClean="0">
+                <a:latin typeface="Times New Roman" pitchFamily="18" charset="0"/>
+                <a:cs typeface="Times New Roman" pitchFamily="18" charset="0"/>
+              </a:rPr>
+              <a:t>function body</a:t>
+            </a:r>
+          </a:p>
+          <a:p>
+            <a:r>
+              <a:rPr lang="en-US" dirty="0" smtClean="0">
+                <a:latin typeface="Times New Roman" pitchFamily="18" charset="0"/>
+                <a:cs typeface="Times New Roman" pitchFamily="18" charset="0"/>
+              </a:rPr>
+              <a:t>in curly braces</a:t>
+            </a:r>
+            <a:endParaRPr lang="en-US" dirty="0">
+              <a:latin typeface="Times New Roman" pitchFamily="18" charset="0"/>
+              <a:cs typeface="Times New Roman" pitchFamily="18" charset="0"/>
+            </a:endParaRPr>
+          </a:p>
+        </p:txBody>
+      </p:sp>
       <p:cxnSp>
         <p:nvCxnSpPr>
           <p:cNvPr id="22" name="Straight Arrow Connector 21"/>
@@ -6298,252 +6542,6 @@
           </a:fontRef>
         </p:style>
       </p:cxnSp>
-      <p:sp>
-        <p:nvSpPr>
-          <p:cNvPr id="23" name="TextBox 22"/>
-          <p:cNvSpPr txBox="1"/>
-          <p:nvPr/>
-        </p:nvSpPr>
-        <p:spPr>
-          <a:xfrm>
-            <a:off x="533400" y="1447800"/>
-            <a:ext cx="3276600" cy="369332"/>
-          </a:xfrm>
-          <a:prstGeom prst="rect">
-            <a:avLst/>
-          </a:prstGeom>
-          <a:noFill/>
-        </p:spPr>
-        <p:txBody>
-          <a:bodyPr wrap="square" rtlCol="0">
-            <a:spAutoFit/>
-          </a:bodyPr>
-          <a:lstStyle/>
-          <a:p>
-            <a:r>
-              <a:rPr lang="en-US" dirty="0" smtClean="0">
-                <a:latin typeface="Times New Roman" pitchFamily="18" charset="0"/>
-                <a:cs typeface="Times New Roman" pitchFamily="18" charset="0"/>
-              </a:rPr>
-              <a:t>“</a:t>
-            </a:r>
-            <a:r>
-              <a:rPr lang="en-US" dirty="0" err="1" smtClean="0">
-                <a:latin typeface="Times New Roman" pitchFamily="18" charset="0"/>
-                <a:cs typeface="Times New Roman" pitchFamily="18" charset="0"/>
-              </a:rPr>
-              <a:t>def</a:t>
-            </a:r>
-            <a:r>
-              <a:rPr lang="en-US" dirty="0" smtClean="0">
-                <a:latin typeface="Times New Roman" pitchFamily="18" charset="0"/>
-                <a:cs typeface="Times New Roman" pitchFamily="18" charset="0"/>
-              </a:rPr>
-              <a:t>” starts a function definition</a:t>
-            </a:r>
-            <a:endParaRPr lang="en-US" dirty="0">
-              <a:latin typeface="Times New Roman" pitchFamily="18" charset="0"/>
-              <a:cs typeface="Times New Roman" pitchFamily="18" charset="0"/>
-            </a:endParaRPr>
-          </a:p>
-        </p:txBody>
-      </p:sp>
-      <p:sp>
-        <p:nvSpPr>
-          <p:cNvPr id="25" name="TextBox 24"/>
-          <p:cNvSpPr txBox="1"/>
-          <p:nvPr/>
-        </p:nvSpPr>
-        <p:spPr>
-          <a:xfrm>
-            <a:off x="2514600" y="1688068"/>
-            <a:ext cx="1600200" cy="369332"/>
-          </a:xfrm>
-          <a:prstGeom prst="rect">
-            <a:avLst/>
-          </a:prstGeom>
-          <a:noFill/>
-        </p:spPr>
-        <p:txBody>
-          <a:bodyPr wrap="square" rtlCol="0">
-            <a:spAutoFit/>
-          </a:bodyPr>
-          <a:lstStyle/>
-          <a:p>
-            <a:r>
-              <a:rPr lang="en-US" dirty="0" smtClean="0">
-                <a:latin typeface="Times New Roman" pitchFamily="18" charset="0"/>
-                <a:cs typeface="Times New Roman" pitchFamily="18" charset="0"/>
-              </a:rPr>
-              <a:t>function name</a:t>
-            </a:r>
-            <a:endParaRPr lang="en-US" dirty="0">
-              <a:latin typeface="Times New Roman" pitchFamily="18" charset="0"/>
-              <a:cs typeface="Times New Roman" pitchFamily="18" charset="0"/>
-            </a:endParaRPr>
-          </a:p>
-        </p:txBody>
-      </p:sp>
-      <p:sp>
-        <p:nvSpPr>
-          <p:cNvPr id="26" name="TextBox 25"/>
-          <p:cNvSpPr txBox="1"/>
-          <p:nvPr/>
-        </p:nvSpPr>
-        <p:spPr>
-          <a:xfrm>
-            <a:off x="3807725" y="1447800"/>
-            <a:ext cx="3050275" cy="369332"/>
-          </a:xfrm>
-          <a:prstGeom prst="rect">
-            <a:avLst/>
-          </a:prstGeom>
-          <a:noFill/>
-        </p:spPr>
-        <p:txBody>
-          <a:bodyPr wrap="square" rtlCol="0">
-            <a:spAutoFit/>
-          </a:bodyPr>
-          <a:lstStyle/>
-          <a:p>
-            <a:r>
-              <a:rPr lang="en-US" dirty="0">
-                <a:latin typeface="Times New Roman" pitchFamily="18" charset="0"/>
-                <a:cs typeface="Times New Roman" pitchFamily="18" charset="0"/>
-              </a:rPr>
-              <a:t>p</a:t>
-            </a:r>
-            <a:r>
-              <a:rPr lang="en-US" dirty="0" smtClean="0">
-                <a:latin typeface="Times New Roman" pitchFamily="18" charset="0"/>
-                <a:cs typeface="Times New Roman" pitchFamily="18" charset="0"/>
-              </a:rPr>
-              <a:t>arameter list in parentheses</a:t>
-            </a:r>
-            <a:endParaRPr lang="en-US" dirty="0">
-              <a:latin typeface="Times New Roman" pitchFamily="18" charset="0"/>
-              <a:cs typeface="Times New Roman" pitchFamily="18" charset="0"/>
-            </a:endParaRPr>
-          </a:p>
-        </p:txBody>
-      </p:sp>
-      <p:sp>
-        <p:nvSpPr>
-          <p:cNvPr id="27" name="TextBox 26"/>
-          <p:cNvSpPr txBox="1"/>
-          <p:nvPr/>
-        </p:nvSpPr>
-        <p:spPr>
-          <a:xfrm>
-            <a:off x="5026925" y="1764268"/>
-            <a:ext cx="2135875" cy="369332"/>
-          </a:xfrm>
-          <a:prstGeom prst="rect">
-            <a:avLst/>
-          </a:prstGeom>
-          <a:noFill/>
-        </p:spPr>
-        <p:txBody>
-          <a:bodyPr wrap="square" rtlCol="0">
-            <a:spAutoFit/>
-          </a:bodyPr>
-          <a:lstStyle/>
-          <a:p>
-            <a:r>
-              <a:rPr lang="en-US" dirty="0" smtClean="0">
-                <a:latin typeface="Times New Roman" pitchFamily="18" charset="0"/>
-                <a:cs typeface="Times New Roman" pitchFamily="18" charset="0"/>
-              </a:rPr>
-              <a:t>function’s result type</a:t>
-            </a:r>
-            <a:endParaRPr lang="en-US" dirty="0">
-              <a:latin typeface="Times New Roman" pitchFamily="18" charset="0"/>
-              <a:cs typeface="Times New Roman" pitchFamily="18" charset="0"/>
-            </a:endParaRPr>
-          </a:p>
-        </p:txBody>
-      </p:sp>
-      <p:sp>
-        <p:nvSpPr>
-          <p:cNvPr id="28" name="TextBox 27"/>
-          <p:cNvSpPr txBox="1"/>
-          <p:nvPr/>
-        </p:nvSpPr>
-        <p:spPr>
-          <a:xfrm>
-            <a:off x="6931925" y="1981200"/>
-            <a:ext cx="1221475" cy="369332"/>
-          </a:xfrm>
-          <a:prstGeom prst="rect">
-            <a:avLst/>
-          </a:prstGeom>
-          <a:noFill/>
-        </p:spPr>
-        <p:txBody>
-          <a:bodyPr wrap="square" rtlCol="0">
-            <a:spAutoFit/>
-          </a:bodyPr>
-          <a:lstStyle/>
-          <a:p>
-            <a:r>
-              <a:rPr lang="en-US" dirty="0" smtClean="0">
-                <a:latin typeface="Times New Roman" pitchFamily="18" charset="0"/>
-                <a:cs typeface="Times New Roman" pitchFamily="18" charset="0"/>
-              </a:rPr>
-              <a:t>equals sign</a:t>
-            </a:r>
-            <a:endParaRPr lang="en-US" dirty="0">
-              <a:latin typeface="Times New Roman" pitchFamily="18" charset="0"/>
-              <a:cs typeface="Times New Roman" pitchFamily="18" charset="0"/>
-            </a:endParaRPr>
-          </a:p>
-        </p:txBody>
-      </p:sp>
-      <p:sp>
-        <p:nvSpPr>
-          <p:cNvPr id="29" name="TextBox 28"/>
-          <p:cNvSpPr txBox="1"/>
-          <p:nvPr/>
-        </p:nvSpPr>
-        <p:spPr>
-          <a:xfrm>
-            <a:off x="6169925" y="4267200"/>
-            <a:ext cx="1754875" cy="646331"/>
-          </a:xfrm>
-          <a:prstGeom prst="rect">
-            <a:avLst/>
-          </a:prstGeom>
-          <a:noFill/>
-        </p:spPr>
-        <p:txBody>
-          <a:bodyPr wrap="square" rtlCol="0">
-            <a:spAutoFit/>
-          </a:bodyPr>
-          <a:lstStyle/>
-          <a:p>
-            <a:r>
-              <a:rPr lang="en-US" dirty="0" smtClean="0">
-                <a:latin typeface="Times New Roman" pitchFamily="18" charset="0"/>
-                <a:cs typeface="Times New Roman" pitchFamily="18" charset="0"/>
-              </a:rPr>
-              <a:t>function body</a:t>
-            </a:r>
-          </a:p>
-          <a:p>
-            <a:r>
-              <a:rPr lang="en-US" dirty="0" smtClean="0">
-                <a:latin typeface="Times New Roman" pitchFamily="18" charset="0"/>
-                <a:cs typeface="Times New Roman" pitchFamily="18" charset="0"/>
-              </a:rPr>
-              <a:t>in curly braces</a:t>
-            </a:r>
-            <a:endParaRPr lang="en-US" dirty="0">
-              <a:latin typeface="Times New Roman" pitchFamily="18" charset="0"/>
-              <a:cs typeface="Times New Roman" pitchFamily="18" charset="0"/>
-            </a:endParaRPr>
-          </a:p>
-        </p:txBody>
-      </p:sp>
     </p:spTree>
     <p:extLst>
       <p:ext uri="{BB962C8B-B14F-4D97-AF65-F5344CB8AC3E}">

</xml_diff>

<commit_message>
Completed the 4th chapter
</commit_message>
<xml_diff>
--- a/ScalaLecture/source/resources/Graphics.pptx
+++ b/ScalaLecture/source/resources/Graphics.pptx
@@ -13,6 +13,11 @@
     <p:sldId id="262" r:id="rId7"/>
     <p:sldId id="263" r:id="rId8"/>
     <p:sldId id="264" r:id="rId9"/>
+    <p:sldId id="265" r:id="rId10"/>
+    <p:sldId id="266" r:id="rId11"/>
+    <p:sldId id="267" r:id="rId12"/>
+    <p:sldId id="268" r:id="rId13"/>
+    <p:sldId id="269" r:id="rId14"/>
   </p:sldIdLst>
   <p:sldSz cx="9144000" cy="6858000" type="screen4x3"/>
   <p:notesSz cx="6858000" cy="9144000"/>
@@ -296,7 +301,7 @@
             <a:fld id="{1D8BD707-D9CF-40AE-B4C6-C98DA3205C09}" type="datetimeFigureOut">
               <a:rPr lang="en-US" smtClean="0"/>
               <a:pPr/>
-              <a:t>3/22/2012</a:t>
+              <a:t>3/31/2012</a:t>
             </a:fld>
             <a:endParaRPr lang="en-US"/>
           </a:p>
@@ -463,7 +468,7 @@
             <a:fld id="{1D8BD707-D9CF-40AE-B4C6-C98DA3205C09}" type="datetimeFigureOut">
               <a:rPr lang="en-US" smtClean="0"/>
               <a:pPr/>
-              <a:t>3/22/2012</a:t>
+              <a:t>3/31/2012</a:t>
             </a:fld>
             <a:endParaRPr lang="en-US"/>
           </a:p>
@@ -640,7 +645,7 @@
             <a:fld id="{1D8BD707-D9CF-40AE-B4C6-C98DA3205C09}" type="datetimeFigureOut">
               <a:rPr lang="en-US" smtClean="0"/>
               <a:pPr/>
-              <a:t>3/22/2012</a:t>
+              <a:t>3/31/2012</a:t>
             </a:fld>
             <a:endParaRPr lang="en-US"/>
           </a:p>
@@ -807,7 +812,7 @@
             <a:fld id="{1D8BD707-D9CF-40AE-B4C6-C98DA3205C09}" type="datetimeFigureOut">
               <a:rPr lang="en-US" smtClean="0"/>
               <a:pPr/>
-              <a:t>3/22/2012</a:t>
+              <a:t>3/31/2012</a:t>
             </a:fld>
             <a:endParaRPr lang="en-US"/>
           </a:p>
@@ -1050,7 +1055,7 @@
             <a:fld id="{1D8BD707-D9CF-40AE-B4C6-C98DA3205C09}" type="datetimeFigureOut">
               <a:rPr lang="en-US" smtClean="0"/>
               <a:pPr/>
-              <a:t>3/22/2012</a:t>
+              <a:t>3/31/2012</a:t>
             </a:fld>
             <a:endParaRPr lang="en-US"/>
           </a:p>
@@ -1335,7 +1340,7 @@
             <a:fld id="{1D8BD707-D9CF-40AE-B4C6-C98DA3205C09}" type="datetimeFigureOut">
               <a:rPr lang="en-US" smtClean="0"/>
               <a:pPr/>
-              <a:t>3/22/2012</a:t>
+              <a:t>3/31/2012</a:t>
             </a:fld>
             <a:endParaRPr lang="en-US"/>
           </a:p>
@@ -1754,7 +1759,7 @@
             <a:fld id="{1D8BD707-D9CF-40AE-B4C6-C98DA3205C09}" type="datetimeFigureOut">
               <a:rPr lang="en-US" smtClean="0"/>
               <a:pPr/>
-              <a:t>3/22/2012</a:t>
+              <a:t>3/31/2012</a:t>
             </a:fld>
             <a:endParaRPr lang="en-US"/>
           </a:p>
@@ -1869,7 +1874,7 @@
             <a:fld id="{1D8BD707-D9CF-40AE-B4C6-C98DA3205C09}" type="datetimeFigureOut">
               <a:rPr lang="en-US" smtClean="0"/>
               <a:pPr/>
-              <a:t>3/22/2012</a:t>
+              <a:t>3/31/2012</a:t>
             </a:fld>
             <a:endParaRPr lang="en-US"/>
           </a:p>
@@ -1961,7 +1966,7 @@
             <a:fld id="{1D8BD707-D9CF-40AE-B4C6-C98DA3205C09}" type="datetimeFigureOut">
               <a:rPr lang="en-US" smtClean="0"/>
               <a:pPr/>
-              <a:t>3/22/2012</a:t>
+              <a:t>3/31/2012</a:t>
             </a:fld>
             <a:endParaRPr lang="en-US"/>
           </a:p>
@@ -2235,7 +2240,7 @@
             <a:fld id="{1D8BD707-D9CF-40AE-B4C6-C98DA3205C09}" type="datetimeFigureOut">
               <a:rPr lang="en-US" smtClean="0"/>
               <a:pPr/>
-              <a:t>3/22/2012</a:t>
+              <a:t>3/31/2012</a:t>
             </a:fld>
             <a:endParaRPr lang="en-US"/>
           </a:p>
@@ -2485,7 +2490,7 @@
             <a:fld id="{1D8BD707-D9CF-40AE-B4C6-C98DA3205C09}" type="datetimeFigureOut">
               <a:rPr lang="en-US" smtClean="0"/>
               <a:pPr/>
-              <a:t>3/22/2012</a:t>
+              <a:t>3/31/2012</a:t>
             </a:fld>
             <a:endParaRPr lang="en-US"/>
           </a:p>
@@ -2695,7 +2700,7 @@
             <a:fld id="{1D8BD707-D9CF-40AE-B4C6-C98DA3205C09}" type="datetimeFigureOut">
               <a:rPr lang="en-US" smtClean="0"/>
               <a:pPr/>
-              <a:t>3/22/2012</a:t>
+              <a:t>3/31/2012</a:t>
             </a:fld>
             <a:endParaRPr lang="en-US"/>
           </a:p>
@@ -3601,6 +3606,2495 @@
 </p:sld>
 </file>
 
+<file path=ppt/slides/slide10.xml><?xml version="1.0" encoding="utf-8"?>
+<p:sld xmlns:a="http://schemas.openxmlformats.org/drawingml/2006/main" xmlns:r="http://schemas.openxmlformats.org/officeDocument/2006/relationships" xmlns:p="http://schemas.openxmlformats.org/presentationml/2006/main">
+  <p:cSld>
+    <p:spTree>
+      <p:nvGrpSpPr>
+        <p:cNvPr id="1" name=""/>
+        <p:cNvGrpSpPr/>
+        <p:nvPr/>
+      </p:nvGrpSpPr>
+      <p:grpSpPr>
+        <a:xfrm>
+          <a:off x="0" y="0"/>
+          <a:ext cx="0" cy="0"/>
+          <a:chOff x="0" y="0"/>
+          <a:chExt cx="0" cy="0"/>
+        </a:xfrm>
+      </p:grpSpPr>
+      <p:sp>
+        <p:nvSpPr>
+          <p:cNvPr id="4" name="TextBox 3"/>
+          <p:cNvSpPr txBox="1"/>
+          <p:nvPr/>
+        </p:nvSpPr>
+        <p:spPr>
+          <a:xfrm>
+            <a:off x="3679208" y="1683112"/>
+            <a:ext cx="1752600" cy="523220"/>
+          </a:xfrm>
+          <a:prstGeom prst="rect">
+            <a:avLst/>
+          </a:prstGeom>
+          <a:noFill/>
+          <a:ln>
+            <a:solidFill>
+              <a:schemeClr val="tx1"/>
+            </a:solidFill>
+          </a:ln>
+        </p:spPr>
+        <p:txBody>
+          <a:bodyPr wrap="square" rtlCol="0">
+            <a:spAutoFit/>
+          </a:bodyPr>
+          <a:lstStyle/>
+          <a:p>
+            <a:pPr algn="ctr"/>
+            <a:r>
+              <a:rPr lang="en-US" sz="2800" dirty="0" smtClean="0">
+                <a:latin typeface="Comic Sans MS" pitchFamily="66" charset="0"/>
+              </a:rPr>
+              <a:t>Copy</a:t>
+            </a:r>
+            <a:endParaRPr lang="en-US" sz="2800" dirty="0">
+              <a:latin typeface="Comic Sans MS" pitchFamily="66" charset="0"/>
+            </a:endParaRPr>
+          </a:p>
+        </p:txBody>
+      </p:sp>
+      <p:sp>
+        <p:nvSpPr>
+          <p:cNvPr id="5" name="TextBox 4"/>
+          <p:cNvSpPr txBox="1"/>
+          <p:nvPr/>
+        </p:nvSpPr>
+        <p:spPr>
+          <a:xfrm>
+            <a:off x="1891352" y="4031664"/>
+            <a:ext cx="1752600" cy="523220"/>
+          </a:xfrm>
+          <a:prstGeom prst="rect">
+            <a:avLst/>
+          </a:prstGeom>
+          <a:noFill/>
+          <a:ln>
+            <a:solidFill>
+              <a:schemeClr val="tx1"/>
+            </a:solidFill>
+          </a:ln>
+        </p:spPr>
+        <p:txBody>
+          <a:bodyPr wrap="square" rtlCol="0">
+            <a:spAutoFit/>
+          </a:bodyPr>
+          <a:lstStyle/>
+          <a:p>
+            <a:pPr algn="ctr"/>
+            <a:r>
+              <a:rPr lang="en-US" sz="2800" dirty="0" smtClean="0">
+                <a:latin typeface="Comic Sans MS" pitchFamily="66" charset="0"/>
+              </a:rPr>
+              <a:t>Keyboard</a:t>
+            </a:r>
+            <a:endParaRPr lang="en-US" sz="2800" dirty="0">
+              <a:latin typeface="Comic Sans MS" pitchFamily="66" charset="0"/>
+            </a:endParaRPr>
+          </a:p>
+        </p:txBody>
+      </p:sp>
+      <p:sp>
+        <p:nvSpPr>
+          <p:cNvPr id="6" name="TextBox 5"/>
+          <p:cNvSpPr txBox="1"/>
+          <p:nvPr/>
+        </p:nvSpPr>
+        <p:spPr>
+          <a:xfrm>
+            <a:off x="5472752" y="4031664"/>
+            <a:ext cx="1752600" cy="523220"/>
+          </a:xfrm>
+          <a:prstGeom prst="rect">
+            <a:avLst/>
+          </a:prstGeom>
+          <a:noFill/>
+          <a:ln>
+            <a:solidFill>
+              <a:schemeClr val="tx1"/>
+            </a:solidFill>
+          </a:ln>
+        </p:spPr>
+        <p:txBody>
+          <a:bodyPr wrap="square" rtlCol="0">
+            <a:spAutoFit/>
+          </a:bodyPr>
+          <a:lstStyle/>
+          <a:p>
+            <a:pPr algn="ctr"/>
+            <a:r>
+              <a:rPr lang="en-US" sz="2800" dirty="0" smtClean="0">
+                <a:latin typeface="Comic Sans MS" pitchFamily="66" charset="0"/>
+              </a:rPr>
+              <a:t>Printer</a:t>
+            </a:r>
+            <a:endParaRPr lang="en-US" sz="2800" dirty="0">
+              <a:latin typeface="Comic Sans MS" pitchFamily="66" charset="0"/>
+            </a:endParaRPr>
+          </a:p>
+        </p:txBody>
+      </p:sp>
+      <p:cxnSp>
+        <p:nvCxnSpPr>
+          <p:cNvPr id="8" name="Straight Connector 7"/>
+          <p:cNvCxnSpPr/>
+          <p:nvPr/>
+        </p:nvCxnSpPr>
+        <p:spPr>
+          <a:xfrm>
+            <a:off x="2767652" y="3134380"/>
+            <a:ext cx="3581400" cy="0"/>
+          </a:xfrm>
+          <a:prstGeom prst="line">
+            <a:avLst/>
+          </a:prstGeom>
+          <a:ln w="25400">
+            <a:solidFill>
+              <a:schemeClr val="tx1"/>
+            </a:solidFill>
+          </a:ln>
+        </p:spPr>
+        <p:style>
+          <a:lnRef idx="1">
+            <a:schemeClr val="accent1"/>
+          </a:lnRef>
+          <a:fillRef idx="0">
+            <a:schemeClr val="accent1"/>
+          </a:fillRef>
+          <a:effectRef idx="0">
+            <a:schemeClr val="accent1"/>
+          </a:effectRef>
+          <a:fontRef idx="minor">
+            <a:schemeClr val="tx1"/>
+          </a:fontRef>
+        </p:style>
+      </p:cxnSp>
+      <p:cxnSp>
+        <p:nvCxnSpPr>
+          <p:cNvPr id="10" name="Straight Connector 9"/>
+          <p:cNvCxnSpPr/>
+          <p:nvPr/>
+        </p:nvCxnSpPr>
+        <p:spPr>
+          <a:xfrm>
+            <a:off x="4555508" y="2206332"/>
+            <a:ext cx="0" cy="928048"/>
+          </a:xfrm>
+          <a:prstGeom prst="line">
+            <a:avLst/>
+          </a:prstGeom>
+          <a:ln w="25400">
+            <a:solidFill>
+              <a:schemeClr val="tx1"/>
+            </a:solidFill>
+          </a:ln>
+        </p:spPr>
+        <p:style>
+          <a:lnRef idx="1">
+            <a:schemeClr val="accent1"/>
+          </a:lnRef>
+          <a:fillRef idx="0">
+            <a:schemeClr val="accent1"/>
+          </a:fillRef>
+          <a:effectRef idx="0">
+            <a:schemeClr val="accent1"/>
+          </a:effectRef>
+          <a:fontRef idx="minor">
+            <a:schemeClr val="tx1"/>
+          </a:fontRef>
+        </p:style>
+      </p:cxnSp>
+      <p:cxnSp>
+        <p:nvCxnSpPr>
+          <p:cNvPr id="12" name="Straight Arrow Connector 11"/>
+          <p:cNvCxnSpPr>
+            <a:endCxn id="5" idx="0"/>
+          </p:cNvCxnSpPr>
+          <p:nvPr/>
+        </p:nvCxnSpPr>
+        <p:spPr>
+          <a:xfrm>
+            <a:off x="2767652" y="3134380"/>
+            <a:ext cx="0" cy="897284"/>
+          </a:xfrm>
+          <a:prstGeom prst="straightConnector1">
+            <a:avLst/>
+          </a:prstGeom>
+          <a:ln w="25400">
+            <a:solidFill>
+              <a:schemeClr val="tx1"/>
+            </a:solidFill>
+            <a:tailEnd type="arrow"/>
+          </a:ln>
+        </p:spPr>
+        <p:style>
+          <a:lnRef idx="1">
+            <a:schemeClr val="accent1"/>
+          </a:lnRef>
+          <a:fillRef idx="0">
+            <a:schemeClr val="accent1"/>
+          </a:fillRef>
+          <a:effectRef idx="0">
+            <a:schemeClr val="accent1"/>
+          </a:effectRef>
+          <a:fontRef idx="minor">
+            <a:schemeClr val="tx1"/>
+          </a:fontRef>
+        </p:style>
+      </p:cxnSp>
+      <p:cxnSp>
+        <p:nvCxnSpPr>
+          <p:cNvPr id="14" name="Straight Arrow Connector 13"/>
+          <p:cNvCxnSpPr>
+            <a:endCxn id="6" idx="0"/>
+          </p:cNvCxnSpPr>
+          <p:nvPr/>
+        </p:nvCxnSpPr>
+        <p:spPr>
+          <a:xfrm>
+            <a:off x="6349052" y="3134380"/>
+            <a:ext cx="0" cy="897284"/>
+          </a:xfrm>
+          <a:prstGeom prst="straightConnector1">
+            <a:avLst/>
+          </a:prstGeom>
+          <a:ln w="25400">
+            <a:solidFill>
+              <a:schemeClr val="tx1"/>
+            </a:solidFill>
+            <a:tailEnd type="arrow"/>
+          </a:ln>
+        </p:spPr>
+        <p:style>
+          <a:lnRef idx="1">
+            <a:schemeClr val="accent1"/>
+          </a:lnRef>
+          <a:fillRef idx="0">
+            <a:schemeClr val="accent1"/>
+          </a:fillRef>
+          <a:effectRef idx="0">
+            <a:schemeClr val="accent1"/>
+          </a:effectRef>
+          <a:fontRef idx="minor">
+            <a:schemeClr val="tx1"/>
+          </a:fontRef>
+        </p:style>
+      </p:cxnSp>
+      <p:cxnSp>
+        <p:nvCxnSpPr>
+          <p:cNvPr id="16" name="Straight Arrow Connector 15"/>
+          <p:cNvCxnSpPr/>
+          <p:nvPr/>
+        </p:nvCxnSpPr>
+        <p:spPr>
+          <a:xfrm flipV="1">
+            <a:off x="2362200" y="3134380"/>
+            <a:ext cx="0" cy="448642"/>
+          </a:xfrm>
+          <a:prstGeom prst="straightConnector1">
+            <a:avLst/>
+          </a:prstGeom>
+          <a:ln w="25400">
+            <a:solidFill>
+              <a:schemeClr val="tx1"/>
+            </a:solidFill>
+            <a:tailEnd type="arrow"/>
+          </a:ln>
+        </p:spPr>
+        <p:style>
+          <a:lnRef idx="1">
+            <a:schemeClr val="accent1"/>
+          </a:lnRef>
+          <a:fillRef idx="0">
+            <a:schemeClr val="accent1"/>
+          </a:fillRef>
+          <a:effectRef idx="0">
+            <a:schemeClr val="accent1"/>
+          </a:effectRef>
+          <a:fontRef idx="minor">
+            <a:schemeClr val="tx1"/>
+          </a:fontRef>
+        </p:style>
+      </p:cxnSp>
+      <p:cxnSp>
+        <p:nvCxnSpPr>
+          <p:cNvPr id="18" name="Straight Arrow Connector 17"/>
+          <p:cNvCxnSpPr/>
+          <p:nvPr/>
+        </p:nvCxnSpPr>
+        <p:spPr>
+          <a:xfrm>
+            <a:off x="6705600" y="3134380"/>
+            <a:ext cx="0" cy="448642"/>
+          </a:xfrm>
+          <a:prstGeom prst="straightConnector1">
+            <a:avLst/>
+          </a:prstGeom>
+          <a:ln w="25400">
+            <a:solidFill>
+              <a:schemeClr val="tx1"/>
+            </a:solidFill>
+            <a:tailEnd type="arrow"/>
+          </a:ln>
+        </p:spPr>
+        <p:style>
+          <a:lnRef idx="1">
+            <a:schemeClr val="accent1"/>
+          </a:lnRef>
+          <a:fillRef idx="0">
+            <a:schemeClr val="accent1"/>
+          </a:fillRef>
+          <a:effectRef idx="0">
+            <a:schemeClr val="accent1"/>
+          </a:effectRef>
+          <a:fontRef idx="minor">
+            <a:schemeClr val="tx1"/>
+          </a:fontRef>
+        </p:style>
+      </p:cxnSp>
+      <p:sp>
+        <p:nvSpPr>
+          <p:cNvPr id="19" name="TextBox 18"/>
+          <p:cNvSpPr txBox="1"/>
+          <p:nvPr/>
+        </p:nvSpPr>
+        <p:spPr>
+          <a:xfrm>
+            <a:off x="6705600" y="3176826"/>
+            <a:ext cx="685800" cy="338554"/>
+          </a:xfrm>
+          <a:prstGeom prst="rect">
+            <a:avLst/>
+          </a:prstGeom>
+          <a:noFill/>
+        </p:spPr>
+        <p:txBody>
+          <a:bodyPr wrap="square" rtlCol="0">
+            <a:spAutoFit/>
+          </a:bodyPr>
+          <a:lstStyle/>
+          <a:p>
+            <a:r>
+              <a:rPr lang="en-US" sz="1600" dirty="0" smtClean="0">
+                <a:latin typeface="Comic Sans MS" pitchFamily="66" charset="0"/>
+              </a:rPr>
+              <a:t>char</a:t>
+            </a:r>
+            <a:endParaRPr lang="en-US" sz="1600" dirty="0">
+              <a:latin typeface="Comic Sans MS" pitchFamily="66" charset="0"/>
+            </a:endParaRPr>
+          </a:p>
+        </p:txBody>
+      </p:sp>
+      <p:sp>
+        <p:nvSpPr>
+          <p:cNvPr id="20" name="TextBox 19"/>
+          <p:cNvSpPr txBox="1"/>
+          <p:nvPr/>
+        </p:nvSpPr>
+        <p:spPr>
+          <a:xfrm>
+            <a:off x="1752600" y="3210580"/>
+            <a:ext cx="685800" cy="338554"/>
+          </a:xfrm>
+          <a:prstGeom prst="rect">
+            <a:avLst/>
+          </a:prstGeom>
+          <a:noFill/>
+        </p:spPr>
+        <p:txBody>
+          <a:bodyPr wrap="square" rtlCol="0">
+            <a:spAutoFit/>
+          </a:bodyPr>
+          <a:lstStyle/>
+          <a:p>
+            <a:r>
+              <a:rPr lang="en-US" sz="1600" dirty="0" smtClean="0">
+                <a:latin typeface="Comic Sans MS" pitchFamily="66" charset="0"/>
+              </a:rPr>
+              <a:t>char</a:t>
+            </a:r>
+            <a:endParaRPr lang="en-US" sz="1600" dirty="0">
+              <a:latin typeface="Comic Sans MS" pitchFamily="66" charset="0"/>
+            </a:endParaRPr>
+          </a:p>
+        </p:txBody>
+      </p:sp>
+      <p:sp>
+        <p:nvSpPr>
+          <p:cNvPr id="13" name="TextBox 12"/>
+          <p:cNvSpPr txBox="1"/>
+          <p:nvPr/>
+        </p:nvSpPr>
+        <p:spPr>
+          <a:xfrm>
+            <a:off x="810904" y="4949532"/>
+            <a:ext cx="1918648" cy="523220"/>
+          </a:xfrm>
+          <a:prstGeom prst="rect">
+            <a:avLst/>
+          </a:prstGeom>
+          <a:noFill/>
+          <a:ln>
+            <a:solidFill>
+              <a:schemeClr val="tx1"/>
+            </a:solidFill>
+          </a:ln>
+        </p:spPr>
+        <p:txBody>
+          <a:bodyPr wrap="square" rtlCol="0">
+            <a:spAutoFit/>
+          </a:bodyPr>
+          <a:lstStyle/>
+          <a:p>
+            <a:pPr algn="ctr"/>
+            <a:r>
+              <a:rPr lang="en-US" sz="2800" dirty="0" smtClean="0">
+                <a:latin typeface="Comic Sans MS" pitchFamily="66" charset="0"/>
+              </a:rPr>
+              <a:t>PT Reader</a:t>
+            </a:r>
+            <a:endParaRPr lang="en-US" sz="2800" dirty="0">
+              <a:latin typeface="Comic Sans MS" pitchFamily="66" charset="0"/>
+            </a:endParaRPr>
+          </a:p>
+        </p:txBody>
+      </p:sp>
+      <p:sp>
+        <p:nvSpPr>
+          <p:cNvPr id="15" name="TextBox 14"/>
+          <p:cNvSpPr txBox="1"/>
+          <p:nvPr/>
+        </p:nvSpPr>
+        <p:spPr>
+          <a:xfrm>
+            <a:off x="6392840" y="4941572"/>
+            <a:ext cx="1918648" cy="523220"/>
+          </a:xfrm>
+          <a:prstGeom prst="rect">
+            <a:avLst/>
+          </a:prstGeom>
+          <a:noFill/>
+          <a:ln>
+            <a:solidFill>
+              <a:schemeClr val="tx1"/>
+            </a:solidFill>
+          </a:ln>
+        </p:spPr>
+        <p:txBody>
+          <a:bodyPr wrap="square" rtlCol="0">
+            <a:spAutoFit/>
+          </a:bodyPr>
+          <a:lstStyle/>
+          <a:p>
+            <a:pPr algn="ctr"/>
+            <a:r>
+              <a:rPr lang="en-US" sz="2800" dirty="0" smtClean="0">
+                <a:latin typeface="Comic Sans MS" pitchFamily="66" charset="0"/>
+              </a:rPr>
+              <a:t>PT Punch</a:t>
+            </a:r>
+            <a:endParaRPr lang="en-US" sz="2800" dirty="0">
+              <a:latin typeface="Comic Sans MS" pitchFamily="66" charset="0"/>
+            </a:endParaRPr>
+          </a:p>
+        </p:txBody>
+      </p:sp>
+      <p:cxnSp>
+        <p:nvCxnSpPr>
+          <p:cNvPr id="17" name="Straight Arrow Connector 16"/>
+          <p:cNvCxnSpPr/>
+          <p:nvPr/>
+        </p:nvCxnSpPr>
+        <p:spPr>
+          <a:xfrm flipV="1">
+            <a:off x="830240" y="4026626"/>
+            <a:ext cx="0" cy="448642"/>
+          </a:xfrm>
+          <a:prstGeom prst="straightConnector1">
+            <a:avLst/>
+          </a:prstGeom>
+          <a:ln w="25400">
+            <a:solidFill>
+              <a:schemeClr val="tx1"/>
+            </a:solidFill>
+            <a:tailEnd type="arrow"/>
+          </a:ln>
+        </p:spPr>
+        <p:style>
+          <a:lnRef idx="1">
+            <a:schemeClr val="accent1"/>
+          </a:lnRef>
+          <a:fillRef idx="0">
+            <a:schemeClr val="accent1"/>
+          </a:fillRef>
+          <a:effectRef idx="0">
+            <a:schemeClr val="accent1"/>
+          </a:effectRef>
+          <a:fontRef idx="minor">
+            <a:schemeClr val="tx1"/>
+          </a:fontRef>
+        </p:style>
+      </p:cxnSp>
+      <p:sp>
+        <p:nvSpPr>
+          <p:cNvPr id="21" name="TextBox 20"/>
+          <p:cNvSpPr txBox="1"/>
+          <p:nvPr/>
+        </p:nvSpPr>
+        <p:spPr>
+          <a:xfrm>
+            <a:off x="220640" y="4102826"/>
+            <a:ext cx="685800" cy="338554"/>
+          </a:xfrm>
+          <a:prstGeom prst="rect">
+            <a:avLst/>
+          </a:prstGeom>
+          <a:noFill/>
+        </p:spPr>
+        <p:txBody>
+          <a:bodyPr wrap="square" rtlCol="0">
+            <a:spAutoFit/>
+          </a:bodyPr>
+          <a:lstStyle/>
+          <a:p>
+            <a:r>
+              <a:rPr lang="en-US" sz="1600" dirty="0" smtClean="0">
+                <a:latin typeface="Comic Sans MS" pitchFamily="66" charset="0"/>
+              </a:rPr>
+              <a:t>char</a:t>
+            </a:r>
+            <a:endParaRPr lang="en-US" sz="1600" dirty="0">
+              <a:latin typeface="Comic Sans MS" pitchFamily="66" charset="0"/>
+            </a:endParaRPr>
+          </a:p>
+        </p:txBody>
+      </p:sp>
+      <p:cxnSp>
+        <p:nvCxnSpPr>
+          <p:cNvPr id="24" name="Straight Arrow Connector 23"/>
+          <p:cNvCxnSpPr/>
+          <p:nvPr/>
+        </p:nvCxnSpPr>
+        <p:spPr>
+          <a:xfrm>
+            <a:off x="8229600" y="4027172"/>
+            <a:ext cx="0" cy="448642"/>
+          </a:xfrm>
+          <a:prstGeom prst="straightConnector1">
+            <a:avLst/>
+          </a:prstGeom>
+          <a:ln w="25400">
+            <a:solidFill>
+              <a:schemeClr val="tx1"/>
+            </a:solidFill>
+            <a:tailEnd type="arrow"/>
+          </a:ln>
+        </p:spPr>
+        <p:style>
+          <a:lnRef idx="1">
+            <a:schemeClr val="accent1"/>
+          </a:lnRef>
+          <a:fillRef idx="0">
+            <a:schemeClr val="accent1"/>
+          </a:fillRef>
+          <a:effectRef idx="0">
+            <a:schemeClr val="accent1"/>
+          </a:effectRef>
+          <a:fontRef idx="minor">
+            <a:schemeClr val="tx1"/>
+          </a:fontRef>
+        </p:style>
+      </p:cxnSp>
+      <p:sp>
+        <p:nvSpPr>
+          <p:cNvPr id="25" name="TextBox 24"/>
+          <p:cNvSpPr txBox="1"/>
+          <p:nvPr/>
+        </p:nvSpPr>
+        <p:spPr>
+          <a:xfrm>
+            <a:off x="8229600" y="4069618"/>
+            <a:ext cx="685800" cy="338554"/>
+          </a:xfrm>
+          <a:prstGeom prst="rect">
+            <a:avLst/>
+          </a:prstGeom>
+          <a:noFill/>
+        </p:spPr>
+        <p:txBody>
+          <a:bodyPr wrap="square" rtlCol="0">
+            <a:spAutoFit/>
+          </a:bodyPr>
+          <a:lstStyle/>
+          <a:p>
+            <a:r>
+              <a:rPr lang="en-US" sz="1600" dirty="0" smtClean="0">
+                <a:latin typeface="Comic Sans MS" pitchFamily="66" charset="0"/>
+              </a:rPr>
+              <a:t>char</a:t>
+            </a:r>
+            <a:endParaRPr lang="en-US" sz="1600" dirty="0">
+              <a:latin typeface="Comic Sans MS" pitchFamily="66" charset="0"/>
+            </a:endParaRPr>
+          </a:p>
+        </p:txBody>
+      </p:sp>
+      <p:cxnSp>
+        <p:nvCxnSpPr>
+          <p:cNvPr id="26" name="Straight Arrow Connector 25"/>
+          <p:cNvCxnSpPr/>
+          <p:nvPr/>
+        </p:nvCxnSpPr>
+        <p:spPr>
+          <a:xfrm>
+            <a:off x="1371600" y="1944722"/>
+            <a:ext cx="0" cy="3001342"/>
+          </a:xfrm>
+          <a:prstGeom prst="straightConnector1">
+            <a:avLst/>
+          </a:prstGeom>
+          <a:ln w="25400">
+            <a:solidFill>
+              <a:schemeClr val="tx1"/>
+            </a:solidFill>
+            <a:tailEnd type="arrow"/>
+          </a:ln>
+        </p:spPr>
+        <p:style>
+          <a:lnRef idx="1">
+            <a:schemeClr val="accent1"/>
+          </a:lnRef>
+          <a:fillRef idx="0">
+            <a:schemeClr val="accent1"/>
+          </a:fillRef>
+          <a:effectRef idx="0">
+            <a:schemeClr val="accent1"/>
+          </a:effectRef>
+          <a:fontRef idx="minor">
+            <a:schemeClr val="tx1"/>
+          </a:fontRef>
+        </p:style>
+      </p:cxnSp>
+      <p:cxnSp>
+        <p:nvCxnSpPr>
+          <p:cNvPr id="27" name="Straight Arrow Connector 26"/>
+          <p:cNvCxnSpPr/>
+          <p:nvPr/>
+        </p:nvCxnSpPr>
+        <p:spPr>
+          <a:xfrm>
+            <a:off x="7696200" y="1928828"/>
+            <a:ext cx="0" cy="3001342"/>
+          </a:xfrm>
+          <a:prstGeom prst="straightConnector1">
+            <a:avLst/>
+          </a:prstGeom>
+          <a:ln w="25400">
+            <a:solidFill>
+              <a:schemeClr val="tx1"/>
+            </a:solidFill>
+            <a:tailEnd type="arrow"/>
+          </a:ln>
+        </p:spPr>
+        <p:style>
+          <a:lnRef idx="1">
+            <a:schemeClr val="accent1"/>
+          </a:lnRef>
+          <a:fillRef idx="0">
+            <a:schemeClr val="accent1"/>
+          </a:fillRef>
+          <a:effectRef idx="0">
+            <a:schemeClr val="accent1"/>
+          </a:effectRef>
+          <a:fontRef idx="minor">
+            <a:schemeClr val="tx1"/>
+          </a:fontRef>
+        </p:style>
+      </p:cxnSp>
+      <p:cxnSp>
+        <p:nvCxnSpPr>
+          <p:cNvPr id="28" name="Straight Connector 27"/>
+          <p:cNvCxnSpPr>
+            <a:endCxn id="4" idx="1"/>
+          </p:cNvCxnSpPr>
+          <p:nvPr/>
+        </p:nvCxnSpPr>
+        <p:spPr>
+          <a:xfrm>
+            <a:off x="1371600" y="1944722"/>
+            <a:ext cx="2307608" cy="0"/>
+          </a:xfrm>
+          <a:prstGeom prst="line">
+            <a:avLst/>
+          </a:prstGeom>
+          <a:ln w="25400">
+            <a:solidFill>
+              <a:schemeClr val="tx1"/>
+            </a:solidFill>
+          </a:ln>
+        </p:spPr>
+        <p:style>
+          <a:lnRef idx="1">
+            <a:schemeClr val="accent1"/>
+          </a:lnRef>
+          <a:fillRef idx="0">
+            <a:schemeClr val="accent1"/>
+          </a:fillRef>
+          <a:effectRef idx="0">
+            <a:schemeClr val="accent1"/>
+          </a:effectRef>
+          <a:fontRef idx="minor">
+            <a:schemeClr val="tx1"/>
+          </a:fontRef>
+        </p:style>
+      </p:cxnSp>
+      <p:cxnSp>
+        <p:nvCxnSpPr>
+          <p:cNvPr id="29" name="Straight Connector 28"/>
+          <p:cNvCxnSpPr/>
+          <p:nvPr/>
+        </p:nvCxnSpPr>
+        <p:spPr>
+          <a:xfrm>
+            <a:off x="5437496" y="1950436"/>
+            <a:ext cx="2258704" cy="0"/>
+          </a:xfrm>
+          <a:prstGeom prst="line">
+            <a:avLst/>
+          </a:prstGeom>
+          <a:ln w="25400">
+            <a:solidFill>
+              <a:schemeClr val="tx1"/>
+            </a:solidFill>
+          </a:ln>
+        </p:spPr>
+        <p:style>
+          <a:lnRef idx="1">
+            <a:schemeClr val="accent1"/>
+          </a:lnRef>
+          <a:fillRef idx="0">
+            <a:schemeClr val="accent1"/>
+          </a:fillRef>
+          <a:effectRef idx="0">
+            <a:schemeClr val="accent1"/>
+          </a:effectRef>
+          <a:fontRef idx="minor">
+            <a:schemeClr val="tx1"/>
+          </a:fontRef>
+        </p:style>
+      </p:cxnSp>
+    </p:spTree>
+    <p:extLst>
+      <p:ext uri="{BB962C8B-B14F-4D97-AF65-F5344CB8AC3E}">
+        <p14:creationId xmlns:p14="http://schemas.microsoft.com/office/powerpoint/2010/main" val="3244123334"/>
+      </p:ext>
+    </p:extLst>
+  </p:cSld>
+  <p:clrMapOvr>
+    <a:masterClrMapping/>
+  </p:clrMapOvr>
+  <p:timing>
+    <p:tnLst>
+      <p:par>
+        <p:cTn id="1" dur="indefinite" restart="never" nodeType="tmRoot"/>
+      </p:par>
+    </p:tnLst>
+  </p:timing>
+</p:sld>
+</file>
+
+<file path=ppt/slides/slide11.xml><?xml version="1.0" encoding="utf-8"?>
+<p:sld xmlns:a="http://schemas.openxmlformats.org/drawingml/2006/main" xmlns:r="http://schemas.openxmlformats.org/officeDocument/2006/relationships" xmlns:p="http://schemas.openxmlformats.org/presentationml/2006/main">
+  <p:cSld>
+    <p:spTree>
+      <p:nvGrpSpPr>
+        <p:cNvPr id="1" name=""/>
+        <p:cNvGrpSpPr/>
+        <p:nvPr/>
+      </p:nvGrpSpPr>
+      <p:grpSpPr>
+        <a:xfrm>
+          <a:off x="0" y="0"/>
+          <a:ext cx="0" cy="0"/>
+          <a:chOff x="0" y="0"/>
+          <a:chExt cx="0" cy="0"/>
+        </a:xfrm>
+      </p:grpSpPr>
+      <p:sp>
+        <p:nvSpPr>
+          <p:cNvPr id="4" name="TextBox 3"/>
+          <p:cNvSpPr txBox="1"/>
+          <p:nvPr/>
+        </p:nvSpPr>
+        <p:spPr>
+          <a:xfrm>
+            <a:off x="3679208" y="609600"/>
+            <a:ext cx="1752600" cy="523220"/>
+          </a:xfrm>
+          <a:prstGeom prst="rect">
+            <a:avLst/>
+          </a:prstGeom>
+          <a:noFill/>
+          <a:ln>
+            <a:solidFill>
+              <a:schemeClr val="tx1"/>
+            </a:solidFill>
+          </a:ln>
+        </p:spPr>
+        <p:txBody>
+          <a:bodyPr wrap="square" rtlCol="0">
+            <a:spAutoFit/>
+          </a:bodyPr>
+          <a:lstStyle/>
+          <a:p>
+            <a:pPr algn="ctr"/>
+            <a:r>
+              <a:rPr lang="en-US" sz="2800" dirty="0" smtClean="0">
+                <a:latin typeface="Comic Sans MS" pitchFamily="66" charset="0"/>
+              </a:rPr>
+              <a:t>Copy</a:t>
+            </a:r>
+            <a:endParaRPr lang="en-US" sz="2800" dirty="0">
+              <a:latin typeface="Comic Sans MS" pitchFamily="66" charset="0"/>
+            </a:endParaRPr>
+          </a:p>
+        </p:txBody>
+      </p:sp>
+      <p:sp>
+        <p:nvSpPr>
+          <p:cNvPr id="5" name="TextBox 4"/>
+          <p:cNvSpPr txBox="1"/>
+          <p:nvPr/>
+        </p:nvSpPr>
+        <p:spPr>
+          <a:xfrm>
+            <a:off x="1891352" y="2958152"/>
+            <a:ext cx="1752600" cy="523220"/>
+          </a:xfrm>
+          <a:prstGeom prst="rect">
+            <a:avLst/>
+          </a:prstGeom>
+          <a:noFill/>
+          <a:ln>
+            <a:solidFill>
+              <a:schemeClr val="tx1"/>
+            </a:solidFill>
+          </a:ln>
+        </p:spPr>
+        <p:txBody>
+          <a:bodyPr wrap="square" rtlCol="0">
+            <a:spAutoFit/>
+          </a:bodyPr>
+          <a:lstStyle/>
+          <a:p>
+            <a:pPr algn="ctr"/>
+            <a:r>
+              <a:rPr lang="en-US" sz="2800" dirty="0" err="1" smtClean="0">
+                <a:latin typeface="Comic Sans MS" pitchFamily="66" charset="0"/>
+              </a:rPr>
+              <a:t>getchar</a:t>
+            </a:r>
+            <a:endParaRPr lang="en-US" sz="2800" dirty="0">
+              <a:latin typeface="Comic Sans MS" pitchFamily="66" charset="0"/>
+            </a:endParaRPr>
+          </a:p>
+        </p:txBody>
+      </p:sp>
+      <p:sp>
+        <p:nvSpPr>
+          <p:cNvPr id="6" name="TextBox 5"/>
+          <p:cNvSpPr txBox="1"/>
+          <p:nvPr/>
+        </p:nvSpPr>
+        <p:spPr>
+          <a:xfrm>
+            <a:off x="5472752" y="2958152"/>
+            <a:ext cx="1752600" cy="523220"/>
+          </a:xfrm>
+          <a:prstGeom prst="rect">
+            <a:avLst/>
+          </a:prstGeom>
+          <a:noFill/>
+          <a:ln>
+            <a:solidFill>
+              <a:schemeClr val="tx1"/>
+            </a:solidFill>
+          </a:ln>
+        </p:spPr>
+        <p:txBody>
+          <a:bodyPr wrap="square" rtlCol="0">
+            <a:spAutoFit/>
+          </a:bodyPr>
+          <a:lstStyle/>
+          <a:p>
+            <a:pPr algn="ctr"/>
+            <a:r>
+              <a:rPr lang="en-US" sz="2800" dirty="0" err="1" smtClean="0">
+                <a:latin typeface="Comic Sans MS" pitchFamily="66" charset="0"/>
+              </a:rPr>
+              <a:t>putchar</a:t>
+            </a:r>
+            <a:endParaRPr lang="en-US" sz="2800" dirty="0">
+              <a:latin typeface="Comic Sans MS" pitchFamily="66" charset="0"/>
+            </a:endParaRPr>
+          </a:p>
+        </p:txBody>
+      </p:sp>
+      <p:cxnSp>
+        <p:nvCxnSpPr>
+          <p:cNvPr id="8" name="Straight Connector 7"/>
+          <p:cNvCxnSpPr/>
+          <p:nvPr/>
+        </p:nvCxnSpPr>
+        <p:spPr>
+          <a:xfrm>
+            <a:off x="2767652" y="2060868"/>
+            <a:ext cx="3581400" cy="0"/>
+          </a:xfrm>
+          <a:prstGeom prst="line">
+            <a:avLst/>
+          </a:prstGeom>
+          <a:ln w="25400">
+            <a:solidFill>
+              <a:schemeClr val="tx1"/>
+            </a:solidFill>
+          </a:ln>
+        </p:spPr>
+        <p:style>
+          <a:lnRef idx="1">
+            <a:schemeClr val="accent1"/>
+          </a:lnRef>
+          <a:fillRef idx="0">
+            <a:schemeClr val="accent1"/>
+          </a:fillRef>
+          <a:effectRef idx="0">
+            <a:schemeClr val="accent1"/>
+          </a:effectRef>
+          <a:fontRef idx="minor">
+            <a:schemeClr val="tx1"/>
+          </a:fontRef>
+        </p:style>
+      </p:cxnSp>
+      <p:cxnSp>
+        <p:nvCxnSpPr>
+          <p:cNvPr id="10" name="Straight Connector 9"/>
+          <p:cNvCxnSpPr/>
+          <p:nvPr/>
+        </p:nvCxnSpPr>
+        <p:spPr>
+          <a:xfrm>
+            <a:off x="4555508" y="1132820"/>
+            <a:ext cx="0" cy="928048"/>
+          </a:xfrm>
+          <a:prstGeom prst="line">
+            <a:avLst/>
+          </a:prstGeom>
+          <a:ln w="25400">
+            <a:solidFill>
+              <a:schemeClr val="tx1"/>
+            </a:solidFill>
+          </a:ln>
+        </p:spPr>
+        <p:style>
+          <a:lnRef idx="1">
+            <a:schemeClr val="accent1"/>
+          </a:lnRef>
+          <a:fillRef idx="0">
+            <a:schemeClr val="accent1"/>
+          </a:fillRef>
+          <a:effectRef idx="0">
+            <a:schemeClr val="accent1"/>
+          </a:effectRef>
+          <a:fontRef idx="minor">
+            <a:schemeClr val="tx1"/>
+          </a:fontRef>
+        </p:style>
+      </p:cxnSp>
+      <p:cxnSp>
+        <p:nvCxnSpPr>
+          <p:cNvPr id="12" name="Straight Arrow Connector 11"/>
+          <p:cNvCxnSpPr>
+            <a:endCxn id="5" idx="0"/>
+          </p:cNvCxnSpPr>
+          <p:nvPr/>
+        </p:nvCxnSpPr>
+        <p:spPr>
+          <a:xfrm>
+            <a:off x="2767652" y="2060868"/>
+            <a:ext cx="0" cy="897284"/>
+          </a:xfrm>
+          <a:prstGeom prst="straightConnector1">
+            <a:avLst/>
+          </a:prstGeom>
+          <a:ln w="25400">
+            <a:solidFill>
+              <a:schemeClr val="tx1"/>
+            </a:solidFill>
+            <a:tailEnd type="arrow"/>
+          </a:ln>
+        </p:spPr>
+        <p:style>
+          <a:lnRef idx="1">
+            <a:schemeClr val="accent1"/>
+          </a:lnRef>
+          <a:fillRef idx="0">
+            <a:schemeClr val="accent1"/>
+          </a:fillRef>
+          <a:effectRef idx="0">
+            <a:schemeClr val="accent1"/>
+          </a:effectRef>
+          <a:fontRef idx="minor">
+            <a:schemeClr val="tx1"/>
+          </a:fontRef>
+        </p:style>
+      </p:cxnSp>
+      <p:cxnSp>
+        <p:nvCxnSpPr>
+          <p:cNvPr id="14" name="Straight Arrow Connector 13"/>
+          <p:cNvCxnSpPr>
+            <a:endCxn id="6" idx="0"/>
+          </p:cNvCxnSpPr>
+          <p:nvPr/>
+        </p:nvCxnSpPr>
+        <p:spPr>
+          <a:xfrm>
+            <a:off x="6349052" y="2060868"/>
+            <a:ext cx="0" cy="897284"/>
+          </a:xfrm>
+          <a:prstGeom prst="straightConnector1">
+            <a:avLst/>
+          </a:prstGeom>
+          <a:ln w="25400">
+            <a:solidFill>
+              <a:schemeClr val="tx1"/>
+            </a:solidFill>
+            <a:tailEnd type="arrow"/>
+          </a:ln>
+        </p:spPr>
+        <p:style>
+          <a:lnRef idx="1">
+            <a:schemeClr val="accent1"/>
+          </a:lnRef>
+          <a:fillRef idx="0">
+            <a:schemeClr val="accent1"/>
+          </a:fillRef>
+          <a:effectRef idx="0">
+            <a:schemeClr val="accent1"/>
+          </a:effectRef>
+          <a:fontRef idx="minor">
+            <a:schemeClr val="tx1"/>
+          </a:fontRef>
+        </p:style>
+      </p:cxnSp>
+      <p:cxnSp>
+        <p:nvCxnSpPr>
+          <p:cNvPr id="16" name="Straight Arrow Connector 15"/>
+          <p:cNvCxnSpPr/>
+          <p:nvPr/>
+        </p:nvCxnSpPr>
+        <p:spPr>
+          <a:xfrm flipV="1">
+            <a:off x="2362200" y="2060868"/>
+            <a:ext cx="0" cy="448642"/>
+          </a:xfrm>
+          <a:prstGeom prst="straightConnector1">
+            <a:avLst/>
+          </a:prstGeom>
+          <a:ln w="25400">
+            <a:solidFill>
+              <a:schemeClr val="tx1"/>
+            </a:solidFill>
+            <a:tailEnd type="arrow"/>
+          </a:ln>
+        </p:spPr>
+        <p:style>
+          <a:lnRef idx="1">
+            <a:schemeClr val="accent1"/>
+          </a:lnRef>
+          <a:fillRef idx="0">
+            <a:schemeClr val="accent1"/>
+          </a:fillRef>
+          <a:effectRef idx="0">
+            <a:schemeClr val="accent1"/>
+          </a:effectRef>
+          <a:fontRef idx="minor">
+            <a:schemeClr val="tx1"/>
+          </a:fontRef>
+        </p:style>
+      </p:cxnSp>
+      <p:cxnSp>
+        <p:nvCxnSpPr>
+          <p:cNvPr id="18" name="Straight Arrow Connector 17"/>
+          <p:cNvCxnSpPr/>
+          <p:nvPr/>
+        </p:nvCxnSpPr>
+        <p:spPr>
+          <a:xfrm>
+            <a:off x="6705600" y="2060868"/>
+            <a:ext cx="0" cy="448642"/>
+          </a:xfrm>
+          <a:prstGeom prst="straightConnector1">
+            <a:avLst/>
+          </a:prstGeom>
+          <a:ln w="25400">
+            <a:solidFill>
+              <a:schemeClr val="tx1"/>
+            </a:solidFill>
+            <a:tailEnd type="arrow"/>
+          </a:ln>
+        </p:spPr>
+        <p:style>
+          <a:lnRef idx="1">
+            <a:schemeClr val="accent1"/>
+          </a:lnRef>
+          <a:fillRef idx="0">
+            <a:schemeClr val="accent1"/>
+          </a:fillRef>
+          <a:effectRef idx="0">
+            <a:schemeClr val="accent1"/>
+          </a:effectRef>
+          <a:fontRef idx="minor">
+            <a:schemeClr val="tx1"/>
+          </a:fontRef>
+        </p:style>
+      </p:cxnSp>
+      <p:sp>
+        <p:nvSpPr>
+          <p:cNvPr id="19" name="TextBox 18"/>
+          <p:cNvSpPr txBox="1"/>
+          <p:nvPr/>
+        </p:nvSpPr>
+        <p:spPr>
+          <a:xfrm>
+            <a:off x="6705600" y="2103314"/>
+            <a:ext cx="685800" cy="338554"/>
+          </a:xfrm>
+          <a:prstGeom prst="rect">
+            <a:avLst/>
+          </a:prstGeom>
+          <a:noFill/>
+        </p:spPr>
+        <p:txBody>
+          <a:bodyPr wrap="square" rtlCol="0">
+            <a:spAutoFit/>
+          </a:bodyPr>
+          <a:lstStyle/>
+          <a:p>
+            <a:r>
+              <a:rPr lang="en-US" sz="1600" dirty="0" smtClean="0">
+                <a:latin typeface="Comic Sans MS" pitchFamily="66" charset="0"/>
+              </a:rPr>
+              <a:t>char</a:t>
+            </a:r>
+            <a:endParaRPr lang="en-US" sz="1600" dirty="0">
+              <a:latin typeface="Comic Sans MS" pitchFamily="66" charset="0"/>
+            </a:endParaRPr>
+          </a:p>
+        </p:txBody>
+      </p:sp>
+      <p:sp>
+        <p:nvSpPr>
+          <p:cNvPr id="20" name="TextBox 19"/>
+          <p:cNvSpPr txBox="1"/>
+          <p:nvPr/>
+        </p:nvSpPr>
+        <p:spPr>
+          <a:xfrm>
+            <a:off x="1752600" y="2137068"/>
+            <a:ext cx="685800" cy="338554"/>
+          </a:xfrm>
+          <a:prstGeom prst="rect">
+            <a:avLst/>
+          </a:prstGeom>
+          <a:noFill/>
+        </p:spPr>
+        <p:txBody>
+          <a:bodyPr wrap="square" rtlCol="0">
+            <a:spAutoFit/>
+          </a:bodyPr>
+          <a:lstStyle/>
+          <a:p>
+            <a:r>
+              <a:rPr lang="en-US" sz="1600" dirty="0" smtClean="0">
+                <a:latin typeface="Comic Sans MS" pitchFamily="66" charset="0"/>
+              </a:rPr>
+              <a:t>char</a:t>
+            </a:r>
+            <a:endParaRPr lang="en-US" sz="1600" dirty="0">
+              <a:latin typeface="Comic Sans MS" pitchFamily="66" charset="0"/>
+            </a:endParaRPr>
+          </a:p>
+        </p:txBody>
+      </p:sp>
+      <p:sp>
+        <p:nvSpPr>
+          <p:cNvPr id="13" name="TextBox 12"/>
+          <p:cNvSpPr txBox="1"/>
+          <p:nvPr/>
+        </p:nvSpPr>
+        <p:spPr>
+          <a:xfrm>
+            <a:off x="1891352" y="4052248"/>
+            <a:ext cx="1752600" cy="523220"/>
+          </a:xfrm>
+          <a:prstGeom prst="rect">
+            <a:avLst/>
+          </a:prstGeom>
+          <a:noFill/>
+          <a:ln>
+            <a:solidFill>
+              <a:schemeClr val="tx1"/>
+            </a:solidFill>
+          </a:ln>
+        </p:spPr>
+        <p:txBody>
+          <a:bodyPr wrap="square" rtlCol="0">
+            <a:spAutoFit/>
+          </a:bodyPr>
+          <a:lstStyle/>
+          <a:p>
+            <a:pPr algn="ctr"/>
+            <a:r>
+              <a:rPr lang="en-US" sz="2800" dirty="0" smtClean="0">
+                <a:latin typeface="Comic Sans MS" pitchFamily="66" charset="0"/>
+              </a:rPr>
+              <a:t>Keyboard</a:t>
+            </a:r>
+            <a:endParaRPr lang="en-US" sz="2800" dirty="0">
+              <a:latin typeface="Comic Sans MS" pitchFamily="66" charset="0"/>
+            </a:endParaRPr>
+          </a:p>
+        </p:txBody>
+      </p:sp>
+      <p:sp>
+        <p:nvSpPr>
+          <p:cNvPr id="15" name="TextBox 14"/>
+          <p:cNvSpPr txBox="1"/>
+          <p:nvPr/>
+        </p:nvSpPr>
+        <p:spPr>
+          <a:xfrm>
+            <a:off x="5472752" y="4052248"/>
+            <a:ext cx="1752600" cy="523220"/>
+          </a:xfrm>
+          <a:prstGeom prst="rect">
+            <a:avLst/>
+          </a:prstGeom>
+          <a:noFill/>
+          <a:ln>
+            <a:solidFill>
+              <a:schemeClr val="tx1"/>
+            </a:solidFill>
+          </a:ln>
+        </p:spPr>
+        <p:txBody>
+          <a:bodyPr wrap="square" rtlCol="0">
+            <a:spAutoFit/>
+          </a:bodyPr>
+          <a:lstStyle/>
+          <a:p>
+            <a:pPr algn="ctr"/>
+            <a:r>
+              <a:rPr lang="en-US" sz="2800" dirty="0" smtClean="0">
+                <a:latin typeface="Comic Sans MS" pitchFamily="66" charset="0"/>
+              </a:rPr>
+              <a:t>Printer</a:t>
+            </a:r>
+            <a:endParaRPr lang="en-US" sz="2800" dirty="0">
+              <a:latin typeface="Comic Sans MS" pitchFamily="66" charset="0"/>
+            </a:endParaRPr>
+          </a:p>
+        </p:txBody>
+      </p:sp>
+      <p:sp>
+        <p:nvSpPr>
+          <p:cNvPr id="2" name="TextBox 1"/>
+          <p:cNvSpPr txBox="1"/>
+          <p:nvPr/>
+        </p:nvSpPr>
+        <p:spPr>
+          <a:xfrm>
+            <a:off x="2514600" y="3508668"/>
+            <a:ext cx="381000" cy="584775"/>
+          </a:xfrm>
+          <a:prstGeom prst="rect">
+            <a:avLst/>
+          </a:prstGeom>
+          <a:noFill/>
+        </p:spPr>
+        <p:txBody>
+          <a:bodyPr wrap="square" rtlCol="0">
+            <a:spAutoFit/>
+          </a:bodyPr>
+          <a:lstStyle/>
+          <a:p>
+            <a:r>
+              <a:rPr lang="en-US" sz="3200" b="1" dirty="0" smtClean="0">
+                <a:solidFill>
+                  <a:srgbClr val="FF0000"/>
+                </a:solidFill>
+                <a:latin typeface="Comic Sans MS" pitchFamily="66" charset="0"/>
+              </a:rPr>
+              <a:t>?</a:t>
+            </a:r>
+            <a:endParaRPr lang="en-US" sz="3200" b="1" dirty="0">
+              <a:solidFill>
+                <a:srgbClr val="FF0000"/>
+              </a:solidFill>
+              <a:latin typeface="Comic Sans MS" pitchFamily="66" charset="0"/>
+            </a:endParaRPr>
+          </a:p>
+        </p:txBody>
+      </p:sp>
+      <p:sp>
+        <p:nvSpPr>
+          <p:cNvPr id="17" name="TextBox 16"/>
+          <p:cNvSpPr txBox="1"/>
+          <p:nvPr/>
+        </p:nvSpPr>
+        <p:spPr>
+          <a:xfrm>
+            <a:off x="6172200" y="3508668"/>
+            <a:ext cx="381000" cy="584775"/>
+          </a:xfrm>
+          <a:prstGeom prst="rect">
+            <a:avLst/>
+          </a:prstGeom>
+          <a:noFill/>
+        </p:spPr>
+        <p:txBody>
+          <a:bodyPr wrap="square" rtlCol="0">
+            <a:spAutoFit/>
+          </a:bodyPr>
+          <a:lstStyle/>
+          <a:p>
+            <a:r>
+              <a:rPr lang="en-US" sz="3200" b="1" dirty="0" smtClean="0">
+                <a:solidFill>
+                  <a:srgbClr val="FF0000"/>
+                </a:solidFill>
+                <a:latin typeface="Comic Sans MS" pitchFamily="66" charset="0"/>
+              </a:rPr>
+              <a:t>?</a:t>
+            </a:r>
+            <a:endParaRPr lang="en-US" sz="3200" b="1" dirty="0">
+              <a:solidFill>
+                <a:srgbClr val="FF0000"/>
+              </a:solidFill>
+              <a:latin typeface="Comic Sans MS" pitchFamily="66" charset="0"/>
+            </a:endParaRPr>
+          </a:p>
+        </p:txBody>
+      </p:sp>
+    </p:spTree>
+    <p:extLst>
+      <p:ext uri="{BB962C8B-B14F-4D97-AF65-F5344CB8AC3E}">
+        <p14:creationId xmlns:p14="http://schemas.microsoft.com/office/powerpoint/2010/main" val="1490659856"/>
+      </p:ext>
+    </p:extLst>
+  </p:cSld>
+  <p:clrMapOvr>
+    <a:masterClrMapping/>
+  </p:clrMapOvr>
+  <p:timing>
+    <p:tnLst>
+      <p:par>
+        <p:cTn id="1" dur="indefinite" restart="never" nodeType="tmRoot"/>
+      </p:par>
+    </p:tnLst>
+  </p:timing>
+</p:sld>
+</file>
+
+<file path=ppt/slides/slide12.xml><?xml version="1.0" encoding="utf-8"?>
+<p:sld xmlns:a="http://schemas.openxmlformats.org/drawingml/2006/main" xmlns:r="http://schemas.openxmlformats.org/officeDocument/2006/relationships" xmlns:p="http://schemas.openxmlformats.org/presentationml/2006/main">
+  <p:cSld>
+    <p:spTree>
+      <p:nvGrpSpPr>
+        <p:cNvPr id="1" name=""/>
+        <p:cNvGrpSpPr/>
+        <p:nvPr/>
+      </p:nvGrpSpPr>
+      <p:grpSpPr>
+        <a:xfrm>
+          <a:off x="0" y="0"/>
+          <a:ext cx="0" cy="0"/>
+          <a:chOff x="0" y="0"/>
+          <a:chExt cx="0" cy="0"/>
+        </a:xfrm>
+      </p:grpSpPr>
+      <p:sp>
+        <p:nvSpPr>
+          <p:cNvPr id="4" name="TextBox 3"/>
+          <p:cNvSpPr txBox="1"/>
+          <p:nvPr/>
+        </p:nvSpPr>
+        <p:spPr>
+          <a:xfrm>
+            <a:off x="3679208" y="606132"/>
+            <a:ext cx="1752600" cy="523220"/>
+          </a:xfrm>
+          <a:prstGeom prst="rect">
+            <a:avLst/>
+          </a:prstGeom>
+          <a:noFill/>
+          <a:ln>
+            <a:solidFill>
+              <a:schemeClr val="tx1"/>
+            </a:solidFill>
+          </a:ln>
+        </p:spPr>
+        <p:txBody>
+          <a:bodyPr wrap="square" rtlCol="0">
+            <a:spAutoFit/>
+          </a:bodyPr>
+          <a:lstStyle/>
+          <a:p>
+            <a:pPr algn="ctr"/>
+            <a:r>
+              <a:rPr lang="en-US" sz="2800" dirty="0" smtClean="0">
+                <a:latin typeface="Comic Sans MS" pitchFamily="66" charset="0"/>
+              </a:rPr>
+              <a:t>Copy</a:t>
+            </a:r>
+            <a:endParaRPr lang="en-US" sz="2800" dirty="0">
+              <a:latin typeface="Comic Sans MS" pitchFamily="66" charset="0"/>
+            </a:endParaRPr>
+          </a:p>
+        </p:txBody>
+      </p:sp>
+      <p:sp>
+        <p:nvSpPr>
+          <p:cNvPr id="5" name="TextBox 4"/>
+          <p:cNvSpPr txBox="1"/>
+          <p:nvPr/>
+        </p:nvSpPr>
+        <p:spPr>
+          <a:xfrm>
+            <a:off x="1891352" y="1735484"/>
+            <a:ext cx="1752600" cy="523220"/>
+          </a:xfrm>
+          <a:prstGeom prst="rect">
+            <a:avLst/>
+          </a:prstGeom>
+          <a:noFill/>
+          <a:ln>
+            <a:solidFill>
+              <a:schemeClr val="tx1"/>
+            </a:solidFill>
+          </a:ln>
+        </p:spPr>
+        <p:txBody>
+          <a:bodyPr wrap="square" rtlCol="0">
+            <a:spAutoFit/>
+          </a:bodyPr>
+          <a:lstStyle/>
+          <a:p>
+            <a:pPr algn="ctr"/>
+            <a:r>
+              <a:rPr lang="en-US" sz="2800" dirty="0" err="1" smtClean="0">
+                <a:latin typeface="Comic Sans MS" pitchFamily="66" charset="0"/>
+              </a:rPr>
+              <a:t>getchar</a:t>
+            </a:r>
+            <a:endParaRPr lang="en-US" sz="2800" dirty="0">
+              <a:latin typeface="Comic Sans MS" pitchFamily="66" charset="0"/>
+            </a:endParaRPr>
+          </a:p>
+        </p:txBody>
+      </p:sp>
+      <p:sp>
+        <p:nvSpPr>
+          <p:cNvPr id="6" name="TextBox 5"/>
+          <p:cNvSpPr txBox="1"/>
+          <p:nvPr/>
+        </p:nvSpPr>
+        <p:spPr>
+          <a:xfrm>
+            <a:off x="5472752" y="1735484"/>
+            <a:ext cx="1752600" cy="523220"/>
+          </a:xfrm>
+          <a:prstGeom prst="rect">
+            <a:avLst/>
+          </a:prstGeom>
+          <a:noFill/>
+          <a:ln>
+            <a:solidFill>
+              <a:schemeClr val="tx1"/>
+            </a:solidFill>
+          </a:ln>
+        </p:spPr>
+        <p:txBody>
+          <a:bodyPr wrap="square" rtlCol="0">
+            <a:spAutoFit/>
+          </a:bodyPr>
+          <a:lstStyle/>
+          <a:p>
+            <a:pPr algn="ctr"/>
+            <a:r>
+              <a:rPr lang="en-US" sz="2800" dirty="0" err="1" smtClean="0">
+                <a:latin typeface="Comic Sans MS" pitchFamily="66" charset="0"/>
+              </a:rPr>
+              <a:t>putchar</a:t>
+            </a:r>
+            <a:endParaRPr lang="en-US" sz="2800" dirty="0">
+              <a:latin typeface="Comic Sans MS" pitchFamily="66" charset="0"/>
+            </a:endParaRPr>
+          </a:p>
+        </p:txBody>
+      </p:sp>
+      <p:cxnSp>
+        <p:nvCxnSpPr>
+          <p:cNvPr id="12" name="Straight Arrow Connector 11"/>
+          <p:cNvCxnSpPr/>
+          <p:nvPr/>
+        </p:nvCxnSpPr>
+        <p:spPr>
+          <a:xfrm>
+            <a:off x="2754004" y="838200"/>
+            <a:ext cx="0" cy="897284"/>
+          </a:xfrm>
+          <a:prstGeom prst="straightConnector1">
+            <a:avLst/>
+          </a:prstGeom>
+          <a:ln w="25400">
+            <a:solidFill>
+              <a:schemeClr val="tx1"/>
+            </a:solidFill>
+            <a:tailEnd type="arrow"/>
+          </a:ln>
+        </p:spPr>
+        <p:style>
+          <a:lnRef idx="1">
+            <a:schemeClr val="accent1"/>
+          </a:lnRef>
+          <a:fillRef idx="0">
+            <a:schemeClr val="accent1"/>
+          </a:fillRef>
+          <a:effectRef idx="0">
+            <a:schemeClr val="accent1"/>
+          </a:effectRef>
+          <a:fontRef idx="minor">
+            <a:schemeClr val="tx1"/>
+          </a:fontRef>
+        </p:style>
+      </p:cxnSp>
+      <p:cxnSp>
+        <p:nvCxnSpPr>
+          <p:cNvPr id="14" name="Straight Arrow Connector 13"/>
+          <p:cNvCxnSpPr>
+            <a:endCxn id="6" idx="0"/>
+          </p:cNvCxnSpPr>
+          <p:nvPr/>
+        </p:nvCxnSpPr>
+        <p:spPr>
+          <a:xfrm>
+            <a:off x="6349052" y="838200"/>
+            <a:ext cx="0" cy="897284"/>
+          </a:xfrm>
+          <a:prstGeom prst="straightConnector1">
+            <a:avLst/>
+          </a:prstGeom>
+          <a:ln w="25400">
+            <a:solidFill>
+              <a:schemeClr val="tx1"/>
+            </a:solidFill>
+            <a:tailEnd type="arrow"/>
+          </a:ln>
+        </p:spPr>
+        <p:style>
+          <a:lnRef idx="1">
+            <a:schemeClr val="accent1"/>
+          </a:lnRef>
+          <a:fillRef idx="0">
+            <a:schemeClr val="accent1"/>
+          </a:fillRef>
+          <a:effectRef idx="0">
+            <a:schemeClr val="accent1"/>
+          </a:effectRef>
+          <a:fontRef idx="minor">
+            <a:schemeClr val="tx1"/>
+          </a:fontRef>
+        </p:style>
+      </p:cxnSp>
+      <p:sp>
+        <p:nvSpPr>
+          <p:cNvPr id="13" name="TextBox 12"/>
+          <p:cNvSpPr txBox="1"/>
+          <p:nvPr/>
+        </p:nvSpPr>
+        <p:spPr>
+          <a:xfrm>
+            <a:off x="1891352" y="4505980"/>
+            <a:ext cx="1752600" cy="523220"/>
+          </a:xfrm>
+          <a:prstGeom prst="rect">
+            <a:avLst/>
+          </a:prstGeom>
+          <a:noFill/>
+          <a:ln>
+            <a:solidFill>
+              <a:schemeClr val="tx1"/>
+            </a:solidFill>
+          </a:ln>
+        </p:spPr>
+        <p:txBody>
+          <a:bodyPr wrap="square" rtlCol="0">
+            <a:spAutoFit/>
+          </a:bodyPr>
+          <a:lstStyle/>
+          <a:p>
+            <a:pPr algn="ctr"/>
+            <a:r>
+              <a:rPr lang="en-US" sz="2800" dirty="0" smtClean="0">
+                <a:latin typeface="Comic Sans MS" pitchFamily="66" charset="0"/>
+              </a:rPr>
+              <a:t>Keyboard</a:t>
+            </a:r>
+            <a:endParaRPr lang="en-US" sz="2800" dirty="0">
+              <a:latin typeface="Comic Sans MS" pitchFamily="66" charset="0"/>
+            </a:endParaRPr>
+          </a:p>
+        </p:txBody>
+      </p:sp>
+      <p:sp>
+        <p:nvSpPr>
+          <p:cNvPr id="15" name="TextBox 14"/>
+          <p:cNvSpPr txBox="1"/>
+          <p:nvPr/>
+        </p:nvSpPr>
+        <p:spPr>
+          <a:xfrm>
+            <a:off x="5472752" y="4505980"/>
+            <a:ext cx="1752600" cy="523220"/>
+          </a:xfrm>
+          <a:prstGeom prst="rect">
+            <a:avLst/>
+          </a:prstGeom>
+          <a:noFill/>
+          <a:ln>
+            <a:solidFill>
+              <a:schemeClr val="tx1"/>
+            </a:solidFill>
+          </a:ln>
+        </p:spPr>
+        <p:txBody>
+          <a:bodyPr wrap="square" rtlCol="0">
+            <a:spAutoFit/>
+          </a:bodyPr>
+          <a:lstStyle/>
+          <a:p>
+            <a:pPr algn="ctr"/>
+            <a:r>
+              <a:rPr lang="en-US" sz="2800" dirty="0" smtClean="0">
+                <a:latin typeface="Comic Sans MS" pitchFamily="66" charset="0"/>
+              </a:rPr>
+              <a:t>Printer</a:t>
+            </a:r>
+            <a:endParaRPr lang="en-US" sz="2800" dirty="0">
+              <a:latin typeface="Comic Sans MS" pitchFamily="66" charset="0"/>
+            </a:endParaRPr>
+          </a:p>
+        </p:txBody>
+      </p:sp>
+      <p:sp>
+        <p:nvSpPr>
+          <p:cNvPr id="21" name="TextBox 20"/>
+          <p:cNvSpPr txBox="1"/>
+          <p:nvPr/>
+        </p:nvSpPr>
+        <p:spPr>
+          <a:xfrm>
+            <a:off x="3684896" y="2950192"/>
+            <a:ext cx="1752600" cy="523220"/>
+          </a:xfrm>
+          <a:prstGeom prst="rect">
+            <a:avLst/>
+          </a:prstGeom>
+          <a:noFill/>
+          <a:ln>
+            <a:solidFill>
+              <a:schemeClr val="tx1"/>
+            </a:solidFill>
+          </a:ln>
+        </p:spPr>
+        <p:txBody>
+          <a:bodyPr wrap="square" rtlCol="0">
+            <a:spAutoFit/>
+          </a:bodyPr>
+          <a:lstStyle/>
+          <a:p>
+            <a:pPr algn="ctr"/>
+            <a:r>
+              <a:rPr lang="en-US" sz="2800" dirty="0" smtClean="0">
+                <a:latin typeface="Comic Sans MS" pitchFamily="66" charset="0"/>
+              </a:rPr>
+              <a:t>File</a:t>
+            </a:r>
+            <a:endParaRPr lang="en-US" sz="2800" dirty="0">
+              <a:latin typeface="Comic Sans MS" pitchFamily="66" charset="0"/>
+            </a:endParaRPr>
+          </a:p>
+        </p:txBody>
+      </p:sp>
+      <p:cxnSp>
+        <p:nvCxnSpPr>
+          <p:cNvPr id="11" name="Straight Connector 10"/>
+          <p:cNvCxnSpPr/>
+          <p:nvPr/>
+        </p:nvCxnSpPr>
+        <p:spPr>
+          <a:xfrm flipH="1" flipV="1">
+            <a:off x="2740356" y="838200"/>
+            <a:ext cx="938852" cy="2246"/>
+          </a:xfrm>
+          <a:prstGeom prst="line">
+            <a:avLst/>
+          </a:prstGeom>
+          <a:ln w="25400">
+            <a:solidFill>
+              <a:schemeClr val="tx1"/>
+            </a:solidFill>
+          </a:ln>
+        </p:spPr>
+        <p:style>
+          <a:lnRef idx="1">
+            <a:schemeClr val="accent1"/>
+          </a:lnRef>
+          <a:fillRef idx="0">
+            <a:schemeClr val="accent1"/>
+          </a:fillRef>
+          <a:effectRef idx="0">
+            <a:schemeClr val="accent1"/>
+          </a:effectRef>
+          <a:fontRef idx="minor">
+            <a:schemeClr val="tx1"/>
+          </a:fontRef>
+        </p:style>
+      </p:cxnSp>
+      <p:cxnSp>
+        <p:nvCxnSpPr>
+          <p:cNvPr id="22" name="Straight Connector 21"/>
+          <p:cNvCxnSpPr/>
+          <p:nvPr/>
+        </p:nvCxnSpPr>
+        <p:spPr>
+          <a:xfrm flipH="1">
+            <a:off x="5448300" y="851848"/>
+            <a:ext cx="911556" cy="0"/>
+          </a:xfrm>
+          <a:prstGeom prst="line">
+            <a:avLst/>
+          </a:prstGeom>
+          <a:ln w="25400">
+            <a:solidFill>
+              <a:schemeClr val="tx1"/>
+            </a:solidFill>
+          </a:ln>
+        </p:spPr>
+        <p:style>
+          <a:lnRef idx="1">
+            <a:schemeClr val="accent1"/>
+          </a:lnRef>
+          <a:fillRef idx="0">
+            <a:schemeClr val="accent1"/>
+          </a:fillRef>
+          <a:effectRef idx="0">
+            <a:schemeClr val="accent1"/>
+          </a:effectRef>
+          <a:fontRef idx="minor">
+            <a:schemeClr val="tx1"/>
+          </a:fontRef>
+        </p:style>
+      </p:cxnSp>
+      <p:cxnSp>
+        <p:nvCxnSpPr>
+          <p:cNvPr id="24" name="Straight Connector 23"/>
+          <p:cNvCxnSpPr/>
+          <p:nvPr/>
+        </p:nvCxnSpPr>
+        <p:spPr>
+          <a:xfrm>
+            <a:off x="2743200" y="2286000"/>
+            <a:ext cx="0" cy="925802"/>
+          </a:xfrm>
+          <a:prstGeom prst="line">
+            <a:avLst/>
+          </a:prstGeom>
+          <a:ln w="25400">
+            <a:solidFill>
+              <a:schemeClr val="tx1"/>
+            </a:solidFill>
+          </a:ln>
+        </p:spPr>
+        <p:style>
+          <a:lnRef idx="1">
+            <a:schemeClr val="accent1"/>
+          </a:lnRef>
+          <a:fillRef idx="0">
+            <a:schemeClr val="accent1"/>
+          </a:fillRef>
+          <a:effectRef idx="0">
+            <a:schemeClr val="accent1"/>
+          </a:effectRef>
+          <a:fontRef idx="minor">
+            <a:schemeClr val="tx1"/>
+          </a:fontRef>
+        </p:style>
+      </p:cxnSp>
+      <p:cxnSp>
+        <p:nvCxnSpPr>
+          <p:cNvPr id="26" name="Straight Connector 25"/>
+          <p:cNvCxnSpPr/>
+          <p:nvPr/>
+        </p:nvCxnSpPr>
+        <p:spPr>
+          <a:xfrm>
+            <a:off x="6400800" y="2286000"/>
+            <a:ext cx="0" cy="925802"/>
+          </a:xfrm>
+          <a:prstGeom prst="line">
+            <a:avLst/>
+          </a:prstGeom>
+          <a:ln w="25400">
+            <a:solidFill>
+              <a:schemeClr val="tx1"/>
+            </a:solidFill>
+          </a:ln>
+        </p:spPr>
+        <p:style>
+          <a:lnRef idx="1">
+            <a:schemeClr val="accent1"/>
+          </a:lnRef>
+          <a:fillRef idx="0">
+            <a:schemeClr val="accent1"/>
+          </a:fillRef>
+          <a:effectRef idx="0">
+            <a:schemeClr val="accent1"/>
+          </a:effectRef>
+          <a:fontRef idx="minor">
+            <a:schemeClr val="tx1"/>
+          </a:fontRef>
+        </p:style>
+      </p:cxnSp>
+      <p:cxnSp>
+        <p:nvCxnSpPr>
+          <p:cNvPr id="28" name="Straight Arrow Connector 27"/>
+          <p:cNvCxnSpPr>
+            <a:endCxn id="21" idx="1"/>
+          </p:cNvCxnSpPr>
+          <p:nvPr/>
+        </p:nvCxnSpPr>
+        <p:spPr>
+          <a:xfrm>
+            <a:off x="2743200" y="3211802"/>
+            <a:ext cx="941696" cy="0"/>
+          </a:xfrm>
+          <a:prstGeom prst="straightConnector1">
+            <a:avLst/>
+          </a:prstGeom>
+          <a:ln w="25400">
+            <a:solidFill>
+              <a:schemeClr val="tx1"/>
+            </a:solidFill>
+            <a:tailEnd type="arrow"/>
+          </a:ln>
+        </p:spPr>
+        <p:style>
+          <a:lnRef idx="1">
+            <a:schemeClr val="accent1"/>
+          </a:lnRef>
+          <a:fillRef idx="0">
+            <a:schemeClr val="accent1"/>
+          </a:fillRef>
+          <a:effectRef idx="0">
+            <a:schemeClr val="accent1"/>
+          </a:effectRef>
+          <a:fontRef idx="minor">
+            <a:schemeClr val="tx1"/>
+          </a:fontRef>
+        </p:style>
+      </p:cxnSp>
+      <p:cxnSp>
+        <p:nvCxnSpPr>
+          <p:cNvPr id="30" name="Straight Arrow Connector 29"/>
+          <p:cNvCxnSpPr>
+            <a:endCxn id="21" idx="3"/>
+          </p:cNvCxnSpPr>
+          <p:nvPr/>
+        </p:nvCxnSpPr>
+        <p:spPr>
+          <a:xfrm flipH="1">
+            <a:off x="5437496" y="3211802"/>
+            <a:ext cx="963304" cy="0"/>
+          </a:xfrm>
+          <a:prstGeom prst="straightConnector1">
+            <a:avLst/>
+          </a:prstGeom>
+          <a:ln w="25400">
+            <a:solidFill>
+              <a:schemeClr val="tx1"/>
+            </a:solidFill>
+            <a:tailEnd type="arrow"/>
+          </a:ln>
+        </p:spPr>
+        <p:style>
+          <a:lnRef idx="1">
+            <a:schemeClr val="accent1"/>
+          </a:lnRef>
+          <a:fillRef idx="0">
+            <a:schemeClr val="accent1"/>
+          </a:fillRef>
+          <a:effectRef idx="0">
+            <a:schemeClr val="accent1"/>
+          </a:effectRef>
+          <a:fontRef idx="minor">
+            <a:schemeClr val="tx1"/>
+          </a:fontRef>
+        </p:style>
+      </p:cxnSp>
+      <p:cxnSp>
+        <p:nvCxnSpPr>
+          <p:cNvPr id="32" name="Straight Connector 31"/>
+          <p:cNvCxnSpPr/>
+          <p:nvPr/>
+        </p:nvCxnSpPr>
+        <p:spPr>
+          <a:xfrm>
+            <a:off x="2743200" y="4114800"/>
+            <a:ext cx="3657600" cy="0"/>
+          </a:xfrm>
+          <a:prstGeom prst="line">
+            <a:avLst/>
+          </a:prstGeom>
+          <a:ln w="25400">
+            <a:solidFill>
+              <a:srgbClr val="FF0000"/>
+            </a:solidFill>
+          </a:ln>
+        </p:spPr>
+        <p:style>
+          <a:lnRef idx="1">
+            <a:schemeClr val="accent1"/>
+          </a:lnRef>
+          <a:fillRef idx="0">
+            <a:schemeClr val="accent1"/>
+          </a:fillRef>
+          <a:effectRef idx="0">
+            <a:schemeClr val="accent1"/>
+          </a:effectRef>
+          <a:fontRef idx="minor">
+            <a:schemeClr val="tx1"/>
+          </a:fontRef>
+        </p:style>
+      </p:cxnSp>
+      <p:cxnSp>
+        <p:nvCxnSpPr>
+          <p:cNvPr id="36" name="Straight Arrow Connector 35"/>
+          <p:cNvCxnSpPr>
+            <a:endCxn id="21" idx="2"/>
+          </p:cNvCxnSpPr>
+          <p:nvPr/>
+        </p:nvCxnSpPr>
+        <p:spPr>
+          <a:xfrm flipV="1">
+            <a:off x="4555508" y="3473412"/>
+            <a:ext cx="5688" cy="641388"/>
+          </a:xfrm>
+          <a:prstGeom prst="straightConnector1">
+            <a:avLst/>
+          </a:prstGeom>
+          <a:ln w="25400">
+            <a:solidFill>
+              <a:srgbClr val="FF0000"/>
+            </a:solidFill>
+            <a:tailEnd type="triangle" w="lg" len="lg"/>
+          </a:ln>
+        </p:spPr>
+        <p:style>
+          <a:lnRef idx="1">
+            <a:schemeClr val="accent1"/>
+          </a:lnRef>
+          <a:fillRef idx="0">
+            <a:schemeClr val="accent1"/>
+          </a:fillRef>
+          <a:effectRef idx="0">
+            <a:schemeClr val="accent1"/>
+          </a:effectRef>
+          <a:fontRef idx="minor">
+            <a:schemeClr val="tx1"/>
+          </a:fontRef>
+        </p:style>
+      </p:cxnSp>
+      <p:cxnSp>
+        <p:nvCxnSpPr>
+          <p:cNvPr id="40" name="Straight Connector 39"/>
+          <p:cNvCxnSpPr/>
+          <p:nvPr/>
+        </p:nvCxnSpPr>
+        <p:spPr>
+          <a:xfrm>
+            <a:off x="2754004" y="4114800"/>
+            <a:ext cx="0" cy="391180"/>
+          </a:xfrm>
+          <a:prstGeom prst="line">
+            <a:avLst/>
+          </a:prstGeom>
+          <a:ln w="25400">
+            <a:solidFill>
+              <a:srgbClr val="FF0000"/>
+            </a:solidFill>
+          </a:ln>
+        </p:spPr>
+        <p:style>
+          <a:lnRef idx="1">
+            <a:schemeClr val="accent1"/>
+          </a:lnRef>
+          <a:fillRef idx="0">
+            <a:schemeClr val="accent1"/>
+          </a:fillRef>
+          <a:effectRef idx="0">
+            <a:schemeClr val="accent1"/>
+          </a:effectRef>
+          <a:fontRef idx="minor">
+            <a:schemeClr val="tx1"/>
+          </a:fontRef>
+        </p:style>
+      </p:cxnSp>
+      <p:cxnSp>
+        <p:nvCxnSpPr>
+          <p:cNvPr id="42" name="Straight Connector 41"/>
+          <p:cNvCxnSpPr/>
+          <p:nvPr/>
+        </p:nvCxnSpPr>
+        <p:spPr>
+          <a:xfrm>
+            <a:off x="6387152" y="4114800"/>
+            <a:ext cx="0" cy="391180"/>
+          </a:xfrm>
+          <a:prstGeom prst="line">
+            <a:avLst/>
+          </a:prstGeom>
+          <a:ln w="25400">
+            <a:solidFill>
+              <a:srgbClr val="FF0000"/>
+            </a:solidFill>
+          </a:ln>
+        </p:spPr>
+        <p:style>
+          <a:lnRef idx="1">
+            <a:schemeClr val="accent1"/>
+          </a:lnRef>
+          <a:fillRef idx="0">
+            <a:schemeClr val="accent1"/>
+          </a:fillRef>
+          <a:effectRef idx="0">
+            <a:schemeClr val="accent1"/>
+          </a:effectRef>
+          <a:fontRef idx="minor">
+            <a:schemeClr val="tx1"/>
+          </a:fontRef>
+        </p:style>
+      </p:cxnSp>
+    </p:spTree>
+    <p:extLst>
+      <p:ext uri="{BB962C8B-B14F-4D97-AF65-F5344CB8AC3E}">
+        <p14:creationId xmlns:p14="http://schemas.microsoft.com/office/powerpoint/2010/main" val="4202986693"/>
+      </p:ext>
+    </p:extLst>
+  </p:cSld>
+  <p:clrMapOvr>
+    <a:masterClrMapping/>
+  </p:clrMapOvr>
+  <p:timing>
+    <p:tnLst>
+      <p:par>
+        <p:cTn id="1" dur="indefinite" restart="never" nodeType="tmRoot"/>
+      </p:par>
+    </p:tnLst>
+  </p:timing>
+</p:sld>
+</file>
+
+<file path=ppt/slides/slide13.xml><?xml version="1.0" encoding="utf-8"?>
+<p:sld xmlns:a="http://schemas.openxmlformats.org/drawingml/2006/main" xmlns:r="http://schemas.openxmlformats.org/officeDocument/2006/relationships" xmlns:p="http://schemas.openxmlformats.org/presentationml/2006/main">
+  <p:cSld>
+    <p:spTree>
+      <p:nvGrpSpPr>
+        <p:cNvPr id="1" name=""/>
+        <p:cNvGrpSpPr/>
+        <p:nvPr/>
+      </p:nvGrpSpPr>
+      <p:grpSpPr>
+        <a:xfrm>
+          <a:off x="0" y="0"/>
+          <a:ext cx="0" cy="0"/>
+          <a:chOff x="0" y="0"/>
+          <a:chExt cx="0" cy="0"/>
+        </a:xfrm>
+      </p:grpSpPr>
+      <p:sp>
+        <p:nvSpPr>
+          <p:cNvPr id="4" name="TextBox 3"/>
+          <p:cNvSpPr txBox="1"/>
+          <p:nvPr/>
+        </p:nvSpPr>
+        <p:spPr>
+          <a:xfrm>
+            <a:off x="990600" y="3124200"/>
+            <a:ext cx="1752600" cy="523220"/>
+          </a:xfrm>
+          <a:prstGeom prst="rect">
+            <a:avLst/>
+          </a:prstGeom>
+          <a:noFill/>
+          <a:ln>
+            <a:solidFill>
+              <a:schemeClr val="tx1"/>
+            </a:solidFill>
+          </a:ln>
+        </p:spPr>
+        <p:txBody>
+          <a:bodyPr wrap="square" rtlCol="0">
+            <a:spAutoFit/>
+          </a:bodyPr>
+          <a:lstStyle/>
+          <a:p>
+            <a:pPr algn="ctr"/>
+            <a:r>
+              <a:rPr lang="en-US" sz="2800" dirty="0" smtClean="0">
+                <a:latin typeface="Comic Sans MS" pitchFamily="66" charset="0"/>
+              </a:rPr>
+              <a:t>Sender</a:t>
+            </a:r>
+            <a:endParaRPr lang="en-US" sz="2800" dirty="0">
+              <a:latin typeface="Comic Sans MS" pitchFamily="66" charset="0"/>
+            </a:endParaRPr>
+          </a:p>
+        </p:txBody>
+      </p:sp>
+      <p:sp>
+        <p:nvSpPr>
+          <p:cNvPr id="5" name="TextBox 4"/>
+          <p:cNvSpPr txBox="1"/>
+          <p:nvPr/>
+        </p:nvSpPr>
+        <p:spPr>
+          <a:xfrm>
+            <a:off x="6400800" y="3124200"/>
+            <a:ext cx="1752600" cy="523220"/>
+          </a:xfrm>
+          <a:prstGeom prst="rect">
+            <a:avLst/>
+          </a:prstGeom>
+          <a:noFill/>
+          <a:ln>
+            <a:solidFill>
+              <a:schemeClr val="tx1"/>
+            </a:solidFill>
+          </a:ln>
+        </p:spPr>
+        <p:txBody>
+          <a:bodyPr wrap="square" rtlCol="0">
+            <a:spAutoFit/>
+          </a:bodyPr>
+          <a:lstStyle/>
+          <a:p>
+            <a:pPr algn="ctr"/>
+            <a:r>
+              <a:rPr lang="en-US" sz="2800" dirty="0" smtClean="0">
+                <a:latin typeface="Comic Sans MS" pitchFamily="66" charset="0"/>
+              </a:rPr>
+              <a:t>Recipient</a:t>
+            </a:r>
+            <a:endParaRPr lang="en-US" sz="2800" dirty="0">
+              <a:latin typeface="Comic Sans MS" pitchFamily="66" charset="0"/>
+            </a:endParaRPr>
+          </a:p>
+        </p:txBody>
+      </p:sp>
+      <p:sp>
+        <p:nvSpPr>
+          <p:cNvPr id="6" name="Oval 5"/>
+          <p:cNvSpPr/>
+          <p:nvPr/>
+        </p:nvSpPr>
+        <p:spPr>
+          <a:xfrm>
+            <a:off x="3581400" y="3142340"/>
+            <a:ext cx="1981200" cy="523220"/>
+          </a:xfrm>
+          <a:prstGeom prst="ellipse">
+            <a:avLst/>
+          </a:prstGeom>
+          <a:noFill/>
+          <a:ln>
+            <a:solidFill>
+              <a:schemeClr val="tx1"/>
+            </a:solidFill>
+          </a:ln>
+        </p:spPr>
+        <p:style>
+          <a:lnRef idx="2">
+            <a:schemeClr val="accent1">
+              <a:shade val="50000"/>
+            </a:schemeClr>
+          </a:lnRef>
+          <a:fillRef idx="1">
+            <a:schemeClr val="accent1"/>
+          </a:fillRef>
+          <a:effectRef idx="0">
+            <a:schemeClr val="accent1"/>
+          </a:effectRef>
+          <a:fontRef idx="minor">
+            <a:schemeClr val="lt1"/>
+          </a:fontRef>
+        </p:style>
+        <p:txBody>
+          <a:bodyPr rtlCol="0" anchor="ctr"/>
+          <a:lstStyle/>
+          <a:p>
+            <a:pPr algn="ctr"/>
+            <a:r>
+              <a:rPr lang="en-US" dirty="0" smtClean="0">
+                <a:solidFill>
+                  <a:schemeClr val="tx1"/>
+                </a:solidFill>
+                <a:latin typeface="Comic Sans MS" pitchFamily="66" charset="0"/>
+              </a:rPr>
+              <a:t>message</a:t>
+            </a:r>
+            <a:endParaRPr lang="en-US" dirty="0">
+              <a:solidFill>
+                <a:schemeClr val="tx1"/>
+              </a:solidFill>
+              <a:latin typeface="Comic Sans MS" pitchFamily="66" charset="0"/>
+            </a:endParaRPr>
+          </a:p>
+        </p:txBody>
+      </p:sp>
+      <p:cxnSp>
+        <p:nvCxnSpPr>
+          <p:cNvPr id="14" name="Straight Arrow Connector 13"/>
+          <p:cNvCxnSpPr/>
+          <p:nvPr/>
+        </p:nvCxnSpPr>
+        <p:spPr>
+          <a:xfrm>
+            <a:off x="2743200" y="3415352"/>
+            <a:ext cx="838200" cy="0"/>
+          </a:xfrm>
+          <a:prstGeom prst="straightConnector1">
+            <a:avLst/>
+          </a:prstGeom>
+          <a:ln w="25400">
+            <a:solidFill>
+              <a:schemeClr val="tx1"/>
+            </a:solidFill>
+            <a:tailEnd type="arrow"/>
+          </a:ln>
+        </p:spPr>
+        <p:style>
+          <a:lnRef idx="1">
+            <a:schemeClr val="accent1"/>
+          </a:lnRef>
+          <a:fillRef idx="0">
+            <a:schemeClr val="accent1"/>
+          </a:fillRef>
+          <a:effectRef idx="0">
+            <a:schemeClr val="accent1"/>
+          </a:effectRef>
+          <a:fontRef idx="minor">
+            <a:schemeClr val="tx1"/>
+          </a:fontRef>
+        </p:style>
+      </p:cxnSp>
+      <p:cxnSp>
+        <p:nvCxnSpPr>
+          <p:cNvPr id="16" name="Straight Arrow Connector 15"/>
+          <p:cNvCxnSpPr/>
+          <p:nvPr/>
+        </p:nvCxnSpPr>
+        <p:spPr>
+          <a:xfrm flipH="1">
+            <a:off x="5576248" y="3415352"/>
+            <a:ext cx="824552" cy="0"/>
+          </a:xfrm>
+          <a:prstGeom prst="straightConnector1">
+            <a:avLst/>
+          </a:prstGeom>
+          <a:ln w="25400">
+            <a:solidFill>
+              <a:schemeClr val="tx1"/>
+            </a:solidFill>
+            <a:tailEnd type="arrow"/>
+          </a:ln>
+        </p:spPr>
+        <p:style>
+          <a:lnRef idx="1">
+            <a:schemeClr val="accent1"/>
+          </a:lnRef>
+          <a:fillRef idx="0">
+            <a:schemeClr val="accent1"/>
+          </a:fillRef>
+          <a:effectRef idx="0">
+            <a:schemeClr val="accent1"/>
+          </a:effectRef>
+          <a:fontRef idx="minor">
+            <a:schemeClr val="tx1"/>
+          </a:fontRef>
+        </p:style>
+      </p:cxnSp>
+      <p:sp>
+        <p:nvSpPr>
+          <p:cNvPr id="22" name="Right Arrow 21"/>
+          <p:cNvSpPr/>
+          <p:nvPr/>
+        </p:nvSpPr>
+        <p:spPr>
+          <a:xfrm>
+            <a:off x="1600200" y="990600"/>
+            <a:ext cx="5867400" cy="1524000"/>
+          </a:xfrm>
+          <a:prstGeom prst="rightArrow">
+            <a:avLst/>
+          </a:prstGeom>
+          <a:noFill/>
+          <a:ln>
+            <a:solidFill>
+              <a:schemeClr val="tx1"/>
+            </a:solidFill>
+          </a:ln>
+        </p:spPr>
+        <p:style>
+          <a:lnRef idx="2">
+            <a:schemeClr val="accent1">
+              <a:shade val="50000"/>
+            </a:schemeClr>
+          </a:lnRef>
+          <a:fillRef idx="1">
+            <a:schemeClr val="accent1"/>
+          </a:fillRef>
+          <a:effectRef idx="0">
+            <a:schemeClr val="accent1"/>
+          </a:effectRef>
+          <a:fontRef idx="minor">
+            <a:schemeClr val="lt1"/>
+          </a:fontRef>
+        </p:style>
+        <p:txBody>
+          <a:bodyPr rtlCol="0" anchor="ctr"/>
+          <a:lstStyle/>
+          <a:p>
+            <a:pPr algn="ctr"/>
+            <a:r>
+              <a:rPr lang="en-US" sz="2800" dirty="0" smtClean="0">
+                <a:solidFill>
+                  <a:schemeClr val="tx1"/>
+                </a:solidFill>
+                <a:latin typeface="Comic Sans MS" pitchFamily="66" charset="0"/>
+              </a:rPr>
+              <a:t>Flow of Control</a:t>
+            </a:r>
+            <a:endParaRPr lang="en-US" sz="2800" dirty="0">
+              <a:solidFill>
+                <a:schemeClr val="tx1"/>
+              </a:solidFill>
+              <a:latin typeface="Comic Sans MS" pitchFamily="66" charset="0"/>
+            </a:endParaRPr>
+          </a:p>
+        </p:txBody>
+      </p:sp>
+      <p:sp>
+        <p:nvSpPr>
+          <p:cNvPr id="23" name="Left Arrow 22"/>
+          <p:cNvSpPr/>
+          <p:nvPr/>
+        </p:nvSpPr>
+        <p:spPr>
+          <a:xfrm>
+            <a:off x="5334000" y="4038600"/>
+            <a:ext cx="2819400" cy="1981200"/>
+          </a:xfrm>
+          <a:prstGeom prst="leftArrow">
+            <a:avLst/>
+          </a:prstGeom>
+          <a:noFill/>
+          <a:ln>
+            <a:solidFill>
+              <a:schemeClr val="tx1"/>
+            </a:solidFill>
+          </a:ln>
+        </p:spPr>
+        <p:style>
+          <a:lnRef idx="2">
+            <a:schemeClr val="accent1">
+              <a:shade val="50000"/>
+            </a:schemeClr>
+          </a:lnRef>
+          <a:fillRef idx="1">
+            <a:schemeClr val="accent1"/>
+          </a:fillRef>
+          <a:effectRef idx="0">
+            <a:schemeClr val="accent1"/>
+          </a:effectRef>
+          <a:fontRef idx="minor">
+            <a:schemeClr val="lt1"/>
+          </a:fontRef>
+        </p:style>
+        <p:txBody>
+          <a:bodyPr rtlCol="0" anchor="ctr"/>
+          <a:lstStyle/>
+          <a:p>
+            <a:pPr algn="ctr"/>
+            <a:r>
+              <a:rPr lang="en-US" sz="2800" dirty="0" smtClean="0">
+                <a:solidFill>
+                  <a:schemeClr val="tx1"/>
+                </a:solidFill>
+                <a:latin typeface="Comic Sans MS" pitchFamily="66" charset="0"/>
+              </a:rPr>
+              <a:t>Opposed Dependency</a:t>
+            </a:r>
+            <a:endParaRPr lang="en-US" sz="2800" dirty="0">
+              <a:solidFill>
+                <a:schemeClr val="tx1"/>
+              </a:solidFill>
+              <a:latin typeface="Comic Sans MS" pitchFamily="66" charset="0"/>
+            </a:endParaRPr>
+          </a:p>
+        </p:txBody>
+      </p:sp>
+    </p:spTree>
+    <p:extLst>
+      <p:ext uri="{BB962C8B-B14F-4D97-AF65-F5344CB8AC3E}">
+        <p14:creationId xmlns:p14="http://schemas.microsoft.com/office/powerpoint/2010/main" val="1049525387"/>
+      </p:ext>
+    </p:extLst>
+  </p:cSld>
+  <p:clrMapOvr>
+    <a:masterClrMapping/>
+  </p:clrMapOvr>
+  <p:timing>
+    <p:tnLst>
+      <p:par>
+        <p:cTn id="1" dur="indefinite" restart="never" nodeType="tmRoot"/>
+      </p:par>
+    </p:tnLst>
+  </p:timing>
+</p:sld>
+</file>
+
 <file path=ppt/slides/slide2.xml><?xml version="1.0" encoding="utf-8"?>
 <p:sld xmlns:a="http://schemas.openxmlformats.org/drawingml/2006/main" xmlns:r="http://schemas.openxmlformats.org/officeDocument/2006/relationships" xmlns:p="http://schemas.openxmlformats.org/presentationml/2006/main">
   <p:cSld>
@@ -6934,6 +9428,449 @@
   <p:clrMapOvr>
     <a:masterClrMapping/>
   </p:clrMapOvr>
+</p:sld>
+</file>
+
+<file path=ppt/slides/slide9.xml><?xml version="1.0" encoding="utf-8"?>
+<p:sld xmlns:a="http://schemas.openxmlformats.org/drawingml/2006/main" xmlns:r="http://schemas.openxmlformats.org/officeDocument/2006/relationships" xmlns:p="http://schemas.openxmlformats.org/presentationml/2006/main">
+  <p:cSld>
+    <p:spTree>
+      <p:nvGrpSpPr>
+        <p:cNvPr id="1" name=""/>
+        <p:cNvGrpSpPr/>
+        <p:nvPr/>
+      </p:nvGrpSpPr>
+      <p:grpSpPr>
+        <a:xfrm>
+          <a:off x="0" y="0"/>
+          <a:ext cx="0" cy="0"/>
+          <a:chOff x="0" y="0"/>
+          <a:chExt cx="0" cy="0"/>
+        </a:xfrm>
+      </p:grpSpPr>
+      <p:sp>
+        <p:nvSpPr>
+          <p:cNvPr id="4" name="TextBox 3"/>
+          <p:cNvSpPr txBox="1"/>
+          <p:nvPr/>
+        </p:nvSpPr>
+        <p:spPr>
+          <a:xfrm>
+            <a:off x="3679208" y="1676400"/>
+            <a:ext cx="1752600" cy="523220"/>
+          </a:xfrm>
+          <a:prstGeom prst="rect">
+            <a:avLst/>
+          </a:prstGeom>
+          <a:noFill/>
+          <a:ln>
+            <a:solidFill>
+              <a:schemeClr val="tx1"/>
+            </a:solidFill>
+          </a:ln>
+        </p:spPr>
+        <p:txBody>
+          <a:bodyPr wrap="square" rtlCol="0">
+            <a:spAutoFit/>
+          </a:bodyPr>
+          <a:lstStyle/>
+          <a:p>
+            <a:pPr algn="ctr"/>
+            <a:r>
+              <a:rPr lang="en-US" sz="2800" dirty="0" smtClean="0">
+                <a:latin typeface="Comic Sans MS" pitchFamily="66" charset="0"/>
+              </a:rPr>
+              <a:t>Copy</a:t>
+            </a:r>
+            <a:endParaRPr lang="en-US" sz="2800" dirty="0">
+              <a:latin typeface="Comic Sans MS" pitchFamily="66" charset="0"/>
+            </a:endParaRPr>
+          </a:p>
+        </p:txBody>
+      </p:sp>
+      <p:sp>
+        <p:nvSpPr>
+          <p:cNvPr id="5" name="TextBox 4"/>
+          <p:cNvSpPr txBox="1"/>
+          <p:nvPr/>
+        </p:nvSpPr>
+        <p:spPr>
+          <a:xfrm>
+            <a:off x="1891352" y="4024952"/>
+            <a:ext cx="1752600" cy="523220"/>
+          </a:xfrm>
+          <a:prstGeom prst="rect">
+            <a:avLst/>
+          </a:prstGeom>
+          <a:noFill/>
+          <a:ln>
+            <a:solidFill>
+              <a:schemeClr val="tx1"/>
+            </a:solidFill>
+          </a:ln>
+        </p:spPr>
+        <p:txBody>
+          <a:bodyPr wrap="square" rtlCol="0">
+            <a:spAutoFit/>
+          </a:bodyPr>
+          <a:lstStyle/>
+          <a:p>
+            <a:pPr algn="ctr"/>
+            <a:r>
+              <a:rPr lang="en-US" sz="2800" dirty="0" smtClean="0">
+                <a:latin typeface="Comic Sans MS" pitchFamily="66" charset="0"/>
+              </a:rPr>
+              <a:t>Keyboard</a:t>
+            </a:r>
+            <a:endParaRPr lang="en-US" sz="2800" dirty="0">
+              <a:latin typeface="Comic Sans MS" pitchFamily="66" charset="0"/>
+            </a:endParaRPr>
+          </a:p>
+        </p:txBody>
+      </p:sp>
+      <p:sp>
+        <p:nvSpPr>
+          <p:cNvPr id="6" name="TextBox 5"/>
+          <p:cNvSpPr txBox="1"/>
+          <p:nvPr/>
+        </p:nvSpPr>
+        <p:spPr>
+          <a:xfrm>
+            <a:off x="5472752" y="4024952"/>
+            <a:ext cx="1752600" cy="523220"/>
+          </a:xfrm>
+          <a:prstGeom prst="rect">
+            <a:avLst/>
+          </a:prstGeom>
+          <a:noFill/>
+          <a:ln>
+            <a:solidFill>
+              <a:schemeClr val="tx1"/>
+            </a:solidFill>
+          </a:ln>
+        </p:spPr>
+        <p:txBody>
+          <a:bodyPr wrap="square" rtlCol="0">
+            <a:spAutoFit/>
+          </a:bodyPr>
+          <a:lstStyle/>
+          <a:p>
+            <a:pPr algn="ctr"/>
+            <a:r>
+              <a:rPr lang="en-US" sz="2800" dirty="0" smtClean="0">
+                <a:latin typeface="Comic Sans MS" pitchFamily="66" charset="0"/>
+              </a:rPr>
+              <a:t>Printer</a:t>
+            </a:r>
+            <a:endParaRPr lang="en-US" sz="2800" dirty="0">
+              <a:latin typeface="Comic Sans MS" pitchFamily="66" charset="0"/>
+            </a:endParaRPr>
+          </a:p>
+        </p:txBody>
+      </p:sp>
+      <p:cxnSp>
+        <p:nvCxnSpPr>
+          <p:cNvPr id="8" name="Straight Connector 7"/>
+          <p:cNvCxnSpPr/>
+          <p:nvPr/>
+        </p:nvCxnSpPr>
+        <p:spPr>
+          <a:xfrm>
+            <a:off x="2767652" y="3127668"/>
+            <a:ext cx="3581400" cy="0"/>
+          </a:xfrm>
+          <a:prstGeom prst="line">
+            <a:avLst/>
+          </a:prstGeom>
+          <a:ln w="25400">
+            <a:solidFill>
+              <a:schemeClr val="tx1"/>
+            </a:solidFill>
+          </a:ln>
+        </p:spPr>
+        <p:style>
+          <a:lnRef idx="1">
+            <a:schemeClr val="accent1"/>
+          </a:lnRef>
+          <a:fillRef idx="0">
+            <a:schemeClr val="accent1"/>
+          </a:fillRef>
+          <a:effectRef idx="0">
+            <a:schemeClr val="accent1"/>
+          </a:effectRef>
+          <a:fontRef idx="minor">
+            <a:schemeClr val="tx1"/>
+          </a:fontRef>
+        </p:style>
+      </p:cxnSp>
+      <p:cxnSp>
+        <p:nvCxnSpPr>
+          <p:cNvPr id="10" name="Straight Connector 9"/>
+          <p:cNvCxnSpPr/>
+          <p:nvPr/>
+        </p:nvCxnSpPr>
+        <p:spPr>
+          <a:xfrm>
+            <a:off x="4555508" y="2199620"/>
+            <a:ext cx="0" cy="928048"/>
+          </a:xfrm>
+          <a:prstGeom prst="line">
+            <a:avLst/>
+          </a:prstGeom>
+          <a:ln w="25400">
+            <a:solidFill>
+              <a:schemeClr val="tx1"/>
+            </a:solidFill>
+          </a:ln>
+        </p:spPr>
+        <p:style>
+          <a:lnRef idx="1">
+            <a:schemeClr val="accent1"/>
+          </a:lnRef>
+          <a:fillRef idx="0">
+            <a:schemeClr val="accent1"/>
+          </a:fillRef>
+          <a:effectRef idx="0">
+            <a:schemeClr val="accent1"/>
+          </a:effectRef>
+          <a:fontRef idx="minor">
+            <a:schemeClr val="tx1"/>
+          </a:fontRef>
+        </p:style>
+      </p:cxnSp>
+      <p:cxnSp>
+        <p:nvCxnSpPr>
+          <p:cNvPr id="12" name="Straight Arrow Connector 11"/>
+          <p:cNvCxnSpPr>
+            <a:endCxn id="5" idx="0"/>
+          </p:cNvCxnSpPr>
+          <p:nvPr/>
+        </p:nvCxnSpPr>
+        <p:spPr>
+          <a:xfrm>
+            <a:off x="2767652" y="3127668"/>
+            <a:ext cx="0" cy="897284"/>
+          </a:xfrm>
+          <a:prstGeom prst="straightConnector1">
+            <a:avLst/>
+          </a:prstGeom>
+          <a:ln w="25400">
+            <a:solidFill>
+              <a:schemeClr val="tx1"/>
+            </a:solidFill>
+            <a:tailEnd type="arrow"/>
+          </a:ln>
+        </p:spPr>
+        <p:style>
+          <a:lnRef idx="1">
+            <a:schemeClr val="accent1"/>
+          </a:lnRef>
+          <a:fillRef idx="0">
+            <a:schemeClr val="accent1"/>
+          </a:fillRef>
+          <a:effectRef idx="0">
+            <a:schemeClr val="accent1"/>
+          </a:effectRef>
+          <a:fontRef idx="minor">
+            <a:schemeClr val="tx1"/>
+          </a:fontRef>
+        </p:style>
+      </p:cxnSp>
+      <p:cxnSp>
+        <p:nvCxnSpPr>
+          <p:cNvPr id="14" name="Straight Arrow Connector 13"/>
+          <p:cNvCxnSpPr>
+            <a:endCxn id="6" idx="0"/>
+          </p:cNvCxnSpPr>
+          <p:nvPr/>
+        </p:nvCxnSpPr>
+        <p:spPr>
+          <a:xfrm>
+            <a:off x="6349052" y="3127668"/>
+            <a:ext cx="0" cy="897284"/>
+          </a:xfrm>
+          <a:prstGeom prst="straightConnector1">
+            <a:avLst/>
+          </a:prstGeom>
+          <a:ln w="25400">
+            <a:solidFill>
+              <a:schemeClr val="tx1"/>
+            </a:solidFill>
+            <a:tailEnd type="arrow"/>
+          </a:ln>
+        </p:spPr>
+        <p:style>
+          <a:lnRef idx="1">
+            <a:schemeClr val="accent1"/>
+          </a:lnRef>
+          <a:fillRef idx="0">
+            <a:schemeClr val="accent1"/>
+          </a:fillRef>
+          <a:effectRef idx="0">
+            <a:schemeClr val="accent1"/>
+          </a:effectRef>
+          <a:fontRef idx="minor">
+            <a:schemeClr val="tx1"/>
+          </a:fontRef>
+        </p:style>
+      </p:cxnSp>
+      <p:cxnSp>
+        <p:nvCxnSpPr>
+          <p:cNvPr id="16" name="Straight Arrow Connector 15"/>
+          <p:cNvCxnSpPr/>
+          <p:nvPr/>
+        </p:nvCxnSpPr>
+        <p:spPr>
+          <a:xfrm flipV="1">
+            <a:off x="2362200" y="3127668"/>
+            <a:ext cx="0" cy="448642"/>
+          </a:xfrm>
+          <a:prstGeom prst="straightConnector1">
+            <a:avLst/>
+          </a:prstGeom>
+          <a:ln w="25400">
+            <a:solidFill>
+              <a:schemeClr val="tx1"/>
+            </a:solidFill>
+            <a:tailEnd type="arrow"/>
+          </a:ln>
+        </p:spPr>
+        <p:style>
+          <a:lnRef idx="1">
+            <a:schemeClr val="accent1"/>
+          </a:lnRef>
+          <a:fillRef idx="0">
+            <a:schemeClr val="accent1"/>
+          </a:fillRef>
+          <a:effectRef idx="0">
+            <a:schemeClr val="accent1"/>
+          </a:effectRef>
+          <a:fontRef idx="minor">
+            <a:schemeClr val="tx1"/>
+          </a:fontRef>
+        </p:style>
+      </p:cxnSp>
+      <p:cxnSp>
+        <p:nvCxnSpPr>
+          <p:cNvPr id="18" name="Straight Arrow Connector 17"/>
+          <p:cNvCxnSpPr/>
+          <p:nvPr/>
+        </p:nvCxnSpPr>
+        <p:spPr>
+          <a:xfrm>
+            <a:off x="6705600" y="3127668"/>
+            <a:ext cx="0" cy="448642"/>
+          </a:xfrm>
+          <a:prstGeom prst="straightConnector1">
+            <a:avLst/>
+          </a:prstGeom>
+          <a:ln w="25400">
+            <a:solidFill>
+              <a:schemeClr val="tx1"/>
+            </a:solidFill>
+            <a:tailEnd type="arrow"/>
+          </a:ln>
+        </p:spPr>
+        <p:style>
+          <a:lnRef idx="1">
+            <a:schemeClr val="accent1"/>
+          </a:lnRef>
+          <a:fillRef idx="0">
+            <a:schemeClr val="accent1"/>
+          </a:fillRef>
+          <a:effectRef idx="0">
+            <a:schemeClr val="accent1"/>
+          </a:effectRef>
+          <a:fontRef idx="minor">
+            <a:schemeClr val="tx1"/>
+          </a:fontRef>
+        </p:style>
+      </p:cxnSp>
+      <p:sp>
+        <p:nvSpPr>
+          <p:cNvPr id="19" name="TextBox 18"/>
+          <p:cNvSpPr txBox="1"/>
+          <p:nvPr/>
+        </p:nvSpPr>
+        <p:spPr>
+          <a:xfrm>
+            <a:off x="6705600" y="3170114"/>
+            <a:ext cx="685800" cy="338554"/>
+          </a:xfrm>
+          <a:prstGeom prst="rect">
+            <a:avLst/>
+          </a:prstGeom>
+          <a:noFill/>
+        </p:spPr>
+        <p:txBody>
+          <a:bodyPr wrap="square" rtlCol="0">
+            <a:spAutoFit/>
+          </a:bodyPr>
+          <a:lstStyle/>
+          <a:p>
+            <a:r>
+              <a:rPr lang="en-US" sz="1600" dirty="0" smtClean="0">
+                <a:latin typeface="Comic Sans MS" pitchFamily="66" charset="0"/>
+              </a:rPr>
+              <a:t>char</a:t>
+            </a:r>
+            <a:endParaRPr lang="en-US" sz="1600" dirty="0">
+              <a:latin typeface="Comic Sans MS" pitchFamily="66" charset="0"/>
+            </a:endParaRPr>
+          </a:p>
+        </p:txBody>
+      </p:sp>
+      <p:sp>
+        <p:nvSpPr>
+          <p:cNvPr id="20" name="TextBox 19"/>
+          <p:cNvSpPr txBox="1"/>
+          <p:nvPr/>
+        </p:nvSpPr>
+        <p:spPr>
+          <a:xfrm>
+            <a:off x="1752600" y="3203868"/>
+            <a:ext cx="685800" cy="338554"/>
+          </a:xfrm>
+          <a:prstGeom prst="rect">
+            <a:avLst/>
+          </a:prstGeom>
+          <a:noFill/>
+        </p:spPr>
+        <p:txBody>
+          <a:bodyPr wrap="square" rtlCol="0">
+            <a:spAutoFit/>
+          </a:bodyPr>
+          <a:lstStyle/>
+          <a:p>
+            <a:r>
+              <a:rPr lang="en-US" sz="1600" dirty="0" smtClean="0">
+                <a:latin typeface="Comic Sans MS" pitchFamily="66" charset="0"/>
+              </a:rPr>
+              <a:t>char</a:t>
+            </a:r>
+            <a:endParaRPr lang="en-US" sz="1600" dirty="0">
+              <a:latin typeface="Comic Sans MS" pitchFamily="66" charset="0"/>
+            </a:endParaRPr>
+          </a:p>
+        </p:txBody>
+      </p:sp>
+    </p:spTree>
+    <p:extLst>
+      <p:ext uri="{BB962C8B-B14F-4D97-AF65-F5344CB8AC3E}">
+        <p14:creationId xmlns:p14="http://schemas.microsoft.com/office/powerpoint/2010/main" val="2503986339"/>
+      </p:ext>
+    </p:extLst>
+  </p:cSld>
+  <p:clrMapOvr>
+    <a:masterClrMapping/>
+  </p:clrMapOvr>
+  <p:timing>
+    <p:tnLst>
+      <p:par>
+        <p:cTn id="1" dur="indefinite" restart="never" nodeType="tmRoot"/>
+      </p:par>
+    </p:tnLst>
+  </p:timing>
 </p:sld>
 </file>
 

</xml_diff>

<commit_message>
Completed the 6th chapter, refactored the 2nd and the 5th chapter
</commit_message>
<xml_diff>
--- a/ScalaLecture/source/resources/Graphics.pptx
+++ b/ScalaLecture/source/resources/Graphics.pptx
@@ -18,6 +18,7 @@
     <p:sldId id="267" r:id="rId12"/>
     <p:sldId id="268" r:id="rId13"/>
     <p:sldId id="269" r:id="rId14"/>
+    <p:sldId id="270" r:id="rId15"/>
   </p:sldIdLst>
   <p:sldSz cx="9144000" cy="6858000" type="screen4x3"/>
   <p:notesSz cx="6858000" cy="9144000"/>
@@ -301,7 +302,7 @@
             <a:fld id="{1D8BD707-D9CF-40AE-B4C6-C98DA3205C09}" type="datetimeFigureOut">
               <a:rPr lang="en-US" smtClean="0"/>
               <a:pPr/>
-              <a:t>3/31/2012</a:t>
+              <a:t>4/9/2012</a:t>
             </a:fld>
             <a:endParaRPr lang="en-US"/>
           </a:p>
@@ -468,7 +469,7 @@
             <a:fld id="{1D8BD707-D9CF-40AE-B4C6-C98DA3205C09}" type="datetimeFigureOut">
               <a:rPr lang="en-US" smtClean="0"/>
               <a:pPr/>
-              <a:t>3/31/2012</a:t>
+              <a:t>4/9/2012</a:t>
             </a:fld>
             <a:endParaRPr lang="en-US"/>
           </a:p>
@@ -645,7 +646,7 @@
             <a:fld id="{1D8BD707-D9CF-40AE-B4C6-C98DA3205C09}" type="datetimeFigureOut">
               <a:rPr lang="en-US" smtClean="0"/>
               <a:pPr/>
-              <a:t>3/31/2012</a:t>
+              <a:t>4/9/2012</a:t>
             </a:fld>
             <a:endParaRPr lang="en-US"/>
           </a:p>
@@ -812,7 +813,7 @@
             <a:fld id="{1D8BD707-D9CF-40AE-B4C6-C98DA3205C09}" type="datetimeFigureOut">
               <a:rPr lang="en-US" smtClean="0"/>
               <a:pPr/>
-              <a:t>3/31/2012</a:t>
+              <a:t>4/9/2012</a:t>
             </a:fld>
             <a:endParaRPr lang="en-US"/>
           </a:p>
@@ -1055,7 +1056,7 @@
             <a:fld id="{1D8BD707-D9CF-40AE-B4C6-C98DA3205C09}" type="datetimeFigureOut">
               <a:rPr lang="en-US" smtClean="0"/>
               <a:pPr/>
-              <a:t>3/31/2012</a:t>
+              <a:t>4/9/2012</a:t>
             </a:fld>
             <a:endParaRPr lang="en-US"/>
           </a:p>
@@ -1340,7 +1341,7 @@
             <a:fld id="{1D8BD707-D9CF-40AE-B4C6-C98DA3205C09}" type="datetimeFigureOut">
               <a:rPr lang="en-US" smtClean="0"/>
               <a:pPr/>
-              <a:t>3/31/2012</a:t>
+              <a:t>4/9/2012</a:t>
             </a:fld>
             <a:endParaRPr lang="en-US"/>
           </a:p>
@@ -1759,7 +1760,7 @@
             <a:fld id="{1D8BD707-D9CF-40AE-B4C6-C98DA3205C09}" type="datetimeFigureOut">
               <a:rPr lang="en-US" smtClean="0"/>
               <a:pPr/>
-              <a:t>3/31/2012</a:t>
+              <a:t>4/9/2012</a:t>
             </a:fld>
             <a:endParaRPr lang="en-US"/>
           </a:p>
@@ -1874,7 +1875,7 @@
             <a:fld id="{1D8BD707-D9CF-40AE-B4C6-C98DA3205C09}" type="datetimeFigureOut">
               <a:rPr lang="en-US" smtClean="0"/>
               <a:pPr/>
-              <a:t>3/31/2012</a:t>
+              <a:t>4/9/2012</a:t>
             </a:fld>
             <a:endParaRPr lang="en-US"/>
           </a:p>
@@ -1966,7 +1967,7 @@
             <a:fld id="{1D8BD707-D9CF-40AE-B4C6-C98DA3205C09}" type="datetimeFigureOut">
               <a:rPr lang="en-US" smtClean="0"/>
               <a:pPr/>
-              <a:t>3/31/2012</a:t>
+              <a:t>4/9/2012</a:t>
             </a:fld>
             <a:endParaRPr lang="en-US"/>
           </a:p>
@@ -2240,7 +2241,7 @@
             <a:fld id="{1D8BD707-D9CF-40AE-B4C6-C98DA3205C09}" type="datetimeFigureOut">
               <a:rPr lang="en-US" smtClean="0"/>
               <a:pPr/>
-              <a:t>3/31/2012</a:t>
+              <a:t>4/9/2012</a:t>
             </a:fld>
             <a:endParaRPr lang="en-US"/>
           </a:p>
@@ -2490,7 +2491,7 @@
             <a:fld id="{1D8BD707-D9CF-40AE-B4C6-C98DA3205C09}" type="datetimeFigureOut">
               <a:rPr lang="en-US" smtClean="0"/>
               <a:pPr/>
-              <a:t>3/31/2012</a:t>
+              <a:t>4/9/2012</a:t>
             </a:fld>
             <a:endParaRPr lang="en-US"/>
           </a:p>
@@ -2700,7 +2701,7 @@
             <a:fld id="{1D8BD707-D9CF-40AE-B4C6-C98DA3205C09}" type="datetimeFigureOut">
               <a:rPr lang="en-US" smtClean="0"/>
               <a:pPr/>
-              <a:t>3/31/2012</a:t>
+              <a:t>4/9/2012</a:t>
             </a:fld>
             <a:endParaRPr lang="en-US"/>
           </a:p>
@@ -6092,6 +6093,336 @@
       </p:par>
     </p:tnLst>
   </p:timing>
+</p:sld>
+</file>
+
+<file path=ppt/slides/slide14.xml><?xml version="1.0" encoding="utf-8"?>
+<p:sld xmlns:a="http://schemas.openxmlformats.org/drawingml/2006/main" xmlns:r="http://schemas.openxmlformats.org/officeDocument/2006/relationships" xmlns:p="http://schemas.openxmlformats.org/presentationml/2006/main">
+  <p:cSld>
+    <p:spTree>
+      <p:nvGrpSpPr>
+        <p:cNvPr id="1" name=""/>
+        <p:cNvGrpSpPr/>
+        <p:nvPr/>
+      </p:nvGrpSpPr>
+      <p:grpSpPr>
+        <a:xfrm>
+          <a:off x="0" y="0"/>
+          <a:ext cx="0" cy="0"/>
+          <a:chOff x="0" y="0"/>
+          <a:chExt cx="0" cy="0"/>
+        </a:xfrm>
+      </p:grpSpPr>
+      <p:pic>
+        <p:nvPicPr>
+          <p:cNvPr id="1026" name="Picture 2" descr="D:\Dropbox\Documents\Papers\ScalaLecture\source\resources\Function literal.png"/>
+          <p:cNvPicPr>
+            <a:picLocks noChangeAspect="1" noChangeArrowheads="1"/>
+          </p:cNvPicPr>
+          <p:nvPr/>
+        </p:nvPicPr>
+        <p:blipFill>
+          <a:blip r:embed="rId2">
+            <a:extLst>
+              <a:ext uri="{28A0092B-C50C-407E-A947-70E740481C1C}">
+                <a14:useLocalDpi xmlns:a14="http://schemas.microsoft.com/office/drawing/2010/main" val="0"/>
+              </a:ext>
+            </a:extLst>
+          </a:blip>
+          <a:srcRect/>
+          <a:stretch>
+            <a:fillRect/>
+          </a:stretch>
+        </p:blipFill>
+        <p:spPr bwMode="auto">
+          <a:xfrm>
+            <a:off x="2819400" y="2971800"/>
+            <a:ext cx="3543300" cy="400050"/>
+          </a:xfrm>
+          <a:prstGeom prst="rect">
+            <a:avLst/>
+          </a:prstGeom>
+          <a:noFill/>
+          <a:extLst>
+            <a:ext uri="{909E8E84-426E-40DD-AFC4-6F175D3DCCD1}">
+              <a14:hiddenFill xmlns:a14="http://schemas.microsoft.com/office/drawing/2010/main">
+                <a:solidFill>
+                  <a:srgbClr val="FFFFFF"/>
+                </a:solidFill>
+              </a14:hiddenFill>
+            </a:ext>
+          </a:extLst>
+        </p:spPr>
+      </p:pic>
+      <p:sp>
+        <p:nvSpPr>
+          <p:cNvPr id="6" name="TextBox 5"/>
+          <p:cNvSpPr txBox="1"/>
+          <p:nvPr/>
+        </p:nvSpPr>
+        <p:spPr>
+          <a:xfrm>
+            <a:off x="1524000" y="2057400"/>
+            <a:ext cx="3505200" cy="369332"/>
+          </a:xfrm>
+          <a:prstGeom prst="rect">
+            <a:avLst/>
+          </a:prstGeom>
+          <a:noFill/>
+        </p:spPr>
+        <p:txBody>
+          <a:bodyPr wrap="square" rtlCol="0">
+            <a:spAutoFit/>
+          </a:bodyPr>
+          <a:lstStyle/>
+          <a:p>
+            <a:r>
+              <a:rPr lang="en-US" dirty="0">
+                <a:latin typeface="Times New Roman" pitchFamily="18" charset="0"/>
+                <a:cs typeface="Times New Roman" pitchFamily="18" charset="0"/>
+              </a:rPr>
+              <a:t>f</a:t>
+            </a:r>
+            <a:r>
+              <a:rPr lang="en-US" dirty="0" smtClean="0">
+                <a:latin typeface="Times New Roman" pitchFamily="18" charset="0"/>
+                <a:cs typeface="Times New Roman" pitchFamily="18" charset="0"/>
+              </a:rPr>
+              <a:t>unction parameters is parentheses</a:t>
+            </a:r>
+            <a:endParaRPr lang="en-US" dirty="0">
+              <a:latin typeface="Times New Roman" pitchFamily="18" charset="0"/>
+              <a:cs typeface="Times New Roman" pitchFamily="18" charset="0"/>
+            </a:endParaRPr>
+          </a:p>
+        </p:txBody>
+      </p:sp>
+      <p:sp>
+        <p:nvSpPr>
+          <p:cNvPr id="7" name="TextBox 6"/>
+          <p:cNvSpPr txBox="1"/>
+          <p:nvPr/>
+        </p:nvSpPr>
+        <p:spPr>
+          <a:xfrm>
+            <a:off x="4343400" y="3810000"/>
+            <a:ext cx="1371600" cy="369332"/>
+          </a:xfrm>
+          <a:prstGeom prst="rect">
+            <a:avLst/>
+          </a:prstGeom>
+          <a:noFill/>
+        </p:spPr>
+        <p:txBody>
+          <a:bodyPr wrap="square" rtlCol="0">
+            <a:spAutoFit/>
+          </a:bodyPr>
+          <a:lstStyle/>
+          <a:p>
+            <a:r>
+              <a:rPr lang="en-US" dirty="0" smtClean="0">
+                <a:latin typeface="Times New Roman" pitchFamily="18" charset="0"/>
+                <a:cs typeface="Times New Roman" pitchFamily="18" charset="0"/>
+              </a:rPr>
+              <a:t>right arrow</a:t>
+            </a:r>
+            <a:endParaRPr lang="en-US" dirty="0">
+              <a:latin typeface="Times New Roman" pitchFamily="18" charset="0"/>
+              <a:cs typeface="Times New Roman" pitchFamily="18" charset="0"/>
+            </a:endParaRPr>
+          </a:p>
+        </p:txBody>
+      </p:sp>
+      <p:sp>
+        <p:nvSpPr>
+          <p:cNvPr id="8" name="TextBox 7"/>
+          <p:cNvSpPr txBox="1"/>
+          <p:nvPr/>
+        </p:nvSpPr>
+        <p:spPr>
+          <a:xfrm>
+            <a:off x="6172200" y="2373868"/>
+            <a:ext cx="1600200" cy="369332"/>
+          </a:xfrm>
+          <a:prstGeom prst="rect">
+            <a:avLst/>
+          </a:prstGeom>
+          <a:noFill/>
+        </p:spPr>
+        <p:txBody>
+          <a:bodyPr wrap="square" rtlCol="0">
+            <a:spAutoFit/>
+          </a:bodyPr>
+          <a:lstStyle/>
+          <a:p>
+            <a:r>
+              <a:rPr lang="en-US" dirty="0" smtClean="0">
+                <a:latin typeface="Times New Roman" pitchFamily="18" charset="0"/>
+                <a:cs typeface="Times New Roman" pitchFamily="18" charset="0"/>
+              </a:rPr>
+              <a:t>function body</a:t>
+            </a:r>
+            <a:endParaRPr lang="en-US" dirty="0">
+              <a:latin typeface="Times New Roman" pitchFamily="18" charset="0"/>
+              <a:cs typeface="Times New Roman" pitchFamily="18" charset="0"/>
+            </a:endParaRPr>
+          </a:p>
+        </p:txBody>
+      </p:sp>
+      <p:cxnSp>
+        <p:nvCxnSpPr>
+          <p:cNvPr id="9" name="Straight Arrow Connector 8"/>
+          <p:cNvCxnSpPr/>
+          <p:nvPr/>
+        </p:nvCxnSpPr>
+        <p:spPr>
+          <a:xfrm flipH="1">
+            <a:off x="3276600" y="2426732"/>
+            <a:ext cx="228600" cy="468868"/>
+          </a:xfrm>
+          <a:prstGeom prst="straightConnector1">
+            <a:avLst/>
+          </a:prstGeom>
+          <a:ln>
+            <a:solidFill>
+              <a:schemeClr val="tx1"/>
+            </a:solidFill>
+            <a:tailEnd type="arrow"/>
+          </a:ln>
+        </p:spPr>
+        <p:style>
+          <a:lnRef idx="1">
+            <a:schemeClr val="accent1"/>
+          </a:lnRef>
+          <a:fillRef idx="0">
+            <a:schemeClr val="accent1"/>
+          </a:fillRef>
+          <a:effectRef idx="0">
+            <a:schemeClr val="accent1"/>
+          </a:effectRef>
+          <a:fontRef idx="minor">
+            <a:schemeClr val="tx1"/>
+          </a:fontRef>
+        </p:style>
+      </p:cxnSp>
+      <p:cxnSp>
+        <p:nvCxnSpPr>
+          <p:cNvPr id="11" name="Straight Arrow Connector 10"/>
+          <p:cNvCxnSpPr/>
+          <p:nvPr/>
+        </p:nvCxnSpPr>
+        <p:spPr>
+          <a:xfrm>
+            <a:off x="3886200" y="2426732"/>
+            <a:ext cx="304800" cy="468868"/>
+          </a:xfrm>
+          <a:prstGeom prst="straightConnector1">
+            <a:avLst/>
+          </a:prstGeom>
+          <a:ln>
+            <a:solidFill>
+              <a:schemeClr val="tx1"/>
+            </a:solidFill>
+            <a:tailEnd type="arrow"/>
+          </a:ln>
+        </p:spPr>
+        <p:style>
+          <a:lnRef idx="1">
+            <a:schemeClr val="accent1"/>
+          </a:lnRef>
+          <a:fillRef idx="0">
+            <a:schemeClr val="accent1"/>
+          </a:fillRef>
+          <a:effectRef idx="0">
+            <a:schemeClr val="accent1"/>
+          </a:effectRef>
+          <a:fontRef idx="minor">
+            <a:schemeClr val="tx1"/>
+          </a:fontRef>
+        </p:style>
+      </p:cxnSp>
+      <p:cxnSp>
+        <p:nvCxnSpPr>
+          <p:cNvPr id="13" name="Straight Arrow Connector 12"/>
+          <p:cNvCxnSpPr/>
+          <p:nvPr/>
+        </p:nvCxnSpPr>
+        <p:spPr>
+          <a:xfrm flipH="1">
+            <a:off x="6019800" y="2743200"/>
+            <a:ext cx="342900" cy="228600"/>
+          </a:xfrm>
+          <a:prstGeom prst="straightConnector1">
+            <a:avLst/>
+          </a:prstGeom>
+          <a:ln>
+            <a:solidFill>
+              <a:schemeClr val="tx1"/>
+            </a:solidFill>
+            <a:tailEnd type="arrow"/>
+          </a:ln>
+        </p:spPr>
+        <p:style>
+          <a:lnRef idx="1">
+            <a:schemeClr val="accent1"/>
+          </a:lnRef>
+          <a:fillRef idx="0">
+            <a:schemeClr val="accent1"/>
+          </a:fillRef>
+          <a:effectRef idx="0">
+            <a:schemeClr val="accent1"/>
+          </a:effectRef>
+          <a:fontRef idx="minor">
+            <a:schemeClr val="tx1"/>
+          </a:fontRef>
+        </p:style>
+      </p:cxnSp>
+      <p:cxnSp>
+        <p:nvCxnSpPr>
+          <p:cNvPr id="15" name="Straight Arrow Connector 14"/>
+          <p:cNvCxnSpPr/>
+          <p:nvPr/>
+        </p:nvCxnSpPr>
+        <p:spPr>
+          <a:xfrm flipV="1">
+            <a:off x="5181600" y="3371850"/>
+            <a:ext cx="76200" cy="361950"/>
+          </a:xfrm>
+          <a:prstGeom prst="straightConnector1">
+            <a:avLst/>
+          </a:prstGeom>
+          <a:ln>
+            <a:solidFill>
+              <a:schemeClr val="tx1"/>
+            </a:solidFill>
+            <a:tailEnd type="arrow"/>
+          </a:ln>
+        </p:spPr>
+        <p:style>
+          <a:lnRef idx="1">
+            <a:schemeClr val="accent1"/>
+          </a:lnRef>
+          <a:fillRef idx="0">
+            <a:schemeClr val="accent1"/>
+          </a:fillRef>
+          <a:effectRef idx="0">
+            <a:schemeClr val="accent1"/>
+          </a:effectRef>
+          <a:fontRef idx="minor">
+            <a:schemeClr val="tx1"/>
+          </a:fontRef>
+        </p:style>
+      </p:cxnSp>
+    </p:spTree>
+    <p:extLst>
+      <p:ext uri="{BB962C8B-B14F-4D97-AF65-F5344CB8AC3E}">
+        <p14:creationId xmlns:p14="http://schemas.microsoft.com/office/powerpoint/2010/main" val="233803161"/>
+      </p:ext>
+    </p:extLst>
+  </p:cSld>
+  <p:clrMapOvr>
+    <a:masterClrMapping/>
+  </p:clrMapOvr>
 </p:sld>
 </file>
 

</xml_diff>

<commit_message>
Completed the 10th chapter, refactored the 9th chapter
</commit_message>
<xml_diff>
--- a/ScalaLecture/source/resources/Graphics.pptx
+++ b/ScalaLecture/source/resources/Graphics.pptx
@@ -19,6 +19,7 @@
     <p:sldId id="268" r:id="rId13"/>
     <p:sldId id="269" r:id="rId14"/>
     <p:sldId id="270" r:id="rId15"/>
+    <p:sldId id="271" r:id="rId16"/>
   </p:sldIdLst>
   <p:sldSz cx="9144000" cy="6858000" type="screen4x3"/>
   <p:notesSz cx="6858000" cy="9144000"/>
@@ -302,7 +303,7 @@
             <a:fld id="{1D8BD707-D9CF-40AE-B4C6-C98DA3205C09}" type="datetimeFigureOut">
               <a:rPr lang="en-US" smtClean="0"/>
               <a:pPr/>
-              <a:t>4/9/2012</a:t>
+              <a:t>5/15/2012</a:t>
             </a:fld>
             <a:endParaRPr lang="en-US"/>
           </a:p>
@@ -469,7 +470,7 @@
             <a:fld id="{1D8BD707-D9CF-40AE-B4C6-C98DA3205C09}" type="datetimeFigureOut">
               <a:rPr lang="en-US" smtClean="0"/>
               <a:pPr/>
-              <a:t>4/9/2012</a:t>
+              <a:t>5/15/2012</a:t>
             </a:fld>
             <a:endParaRPr lang="en-US"/>
           </a:p>
@@ -646,7 +647,7 @@
             <a:fld id="{1D8BD707-D9CF-40AE-B4C6-C98DA3205C09}" type="datetimeFigureOut">
               <a:rPr lang="en-US" smtClean="0"/>
               <a:pPr/>
-              <a:t>4/9/2012</a:t>
+              <a:t>5/15/2012</a:t>
             </a:fld>
             <a:endParaRPr lang="en-US"/>
           </a:p>
@@ -813,7 +814,7 @@
             <a:fld id="{1D8BD707-D9CF-40AE-B4C6-C98DA3205C09}" type="datetimeFigureOut">
               <a:rPr lang="en-US" smtClean="0"/>
               <a:pPr/>
-              <a:t>4/9/2012</a:t>
+              <a:t>5/15/2012</a:t>
             </a:fld>
             <a:endParaRPr lang="en-US"/>
           </a:p>
@@ -1056,7 +1057,7 @@
             <a:fld id="{1D8BD707-D9CF-40AE-B4C6-C98DA3205C09}" type="datetimeFigureOut">
               <a:rPr lang="en-US" smtClean="0"/>
               <a:pPr/>
-              <a:t>4/9/2012</a:t>
+              <a:t>5/15/2012</a:t>
             </a:fld>
             <a:endParaRPr lang="en-US"/>
           </a:p>
@@ -1341,7 +1342,7 @@
             <a:fld id="{1D8BD707-D9CF-40AE-B4C6-C98DA3205C09}" type="datetimeFigureOut">
               <a:rPr lang="en-US" smtClean="0"/>
               <a:pPr/>
-              <a:t>4/9/2012</a:t>
+              <a:t>5/15/2012</a:t>
             </a:fld>
             <a:endParaRPr lang="en-US"/>
           </a:p>
@@ -1760,7 +1761,7 @@
             <a:fld id="{1D8BD707-D9CF-40AE-B4C6-C98DA3205C09}" type="datetimeFigureOut">
               <a:rPr lang="en-US" smtClean="0"/>
               <a:pPr/>
-              <a:t>4/9/2012</a:t>
+              <a:t>5/15/2012</a:t>
             </a:fld>
             <a:endParaRPr lang="en-US"/>
           </a:p>
@@ -1875,7 +1876,7 @@
             <a:fld id="{1D8BD707-D9CF-40AE-B4C6-C98DA3205C09}" type="datetimeFigureOut">
               <a:rPr lang="en-US" smtClean="0"/>
               <a:pPr/>
-              <a:t>4/9/2012</a:t>
+              <a:t>5/15/2012</a:t>
             </a:fld>
             <a:endParaRPr lang="en-US"/>
           </a:p>
@@ -1967,7 +1968,7 @@
             <a:fld id="{1D8BD707-D9CF-40AE-B4C6-C98DA3205C09}" type="datetimeFigureOut">
               <a:rPr lang="en-US" smtClean="0"/>
               <a:pPr/>
-              <a:t>4/9/2012</a:t>
+              <a:t>5/15/2012</a:t>
             </a:fld>
             <a:endParaRPr lang="en-US"/>
           </a:p>
@@ -2241,7 +2242,7 @@
             <a:fld id="{1D8BD707-D9CF-40AE-B4C6-C98DA3205C09}" type="datetimeFigureOut">
               <a:rPr lang="en-US" smtClean="0"/>
               <a:pPr/>
-              <a:t>4/9/2012</a:t>
+              <a:t>5/15/2012</a:t>
             </a:fld>
             <a:endParaRPr lang="en-US"/>
           </a:p>
@@ -2491,7 +2492,7 @@
             <a:fld id="{1D8BD707-D9CF-40AE-B4C6-C98DA3205C09}" type="datetimeFigureOut">
               <a:rPr lang="en-US" smtClean="0"/>
               <a:pPr/>
-              <a:t>4/9/2012</a:t>
+              <a:t>5/15/2012</a:t>
             </a:fld>
             <a:endParaRPr lang="en-US"/>
           </a:p>
@@ -2701,7 +2702,7 @@
             <a:fld id="{1D8BD707-D9CF-40AE-B4C6-C98DA3205C09}" type="datetimeFigureOut">
               <a:rPr lang="en-US" smtClean="0"/>
               <a:pPr/>
-              <a:t>4/9/2012</a:t>
+              <a:t>5/15/2012</a:t>
             </a:fld>
             <a:endParaRPr lang="en-US"/>
           </a:p>
@@ -6423,6 +6424,508 @@
   <p:clrMapOvr>
     <a:masterClrMapping/>
   </p:clrMapOvr>
+</p:sld>
+</file>
+
+<file path=ppt/slides/slide15.xml><?xml version="1.0" encoding="utf-8"?>
+<p:sld xmlns:a="http://schemas.openxmlformats.org/drawingml/2006/main" xmlns:r="http://schemas.openxmlformats.org/officeDocument/2006/relationships" xmlns:p="http://schemas.openxmlformats.org/presentationml/2006/main">
+  <p:cSld>
+    <p:spTree>
+      <p:nvGrpSpPr>
+        <p:cNvPr id="1" name=""/>
+        <p:cNvGrpSpPr/>
+        <p:nvPr/>
+      </p:nvGrpSpPr>
+      <p:grpSpPr>
+        <a:xfrm>
+          <a:off x="0" y="0"/>
+          <a:ext cx="0" cy="0"/>
+          <a:chOff x="0" y="0"/>
+          <a:chExt cx="0" cy="0"/>
+        </a:xfrm>
+      </p:grpSpPr>
+      <p:sp>
+        <p:nvSpPr>
+          <p:cNvPr id="4" name="Rectangle 3"/>
+          <p:cNvSpPr/>
+          <p:nvPr/>
+        </p:nvSpPr>
+        <p:spPr>
+          <a:xfrm>
+            <a:off x="3657600" y="1221180"/>
+            <a:ext cx="1828800" cy="914400"/>
+          </a:xfrm>
+          <a:prstGeom prst="rect">
+            <a:avLst/>
+          </a:prstGeom>
+          <a:solidFill>
+            <a:schemeClr val="bg1"/>
+          </a:solidFill>
+          <a:ln>
+            <a:solidFill>
+              <a:schemeClr val="tx1"/>
+            </a:solidFill>
+          </a:ln>
+        </p:spPr>
+        <p:style>
+          <a:lnRef idx="2">
+            <a:schemeClr val="accent1">
+              <a:shade val="50000"/>
+            </a:schemeClr>
+          </a:lnRef>
+          <a:fillRef idx="1">
+            <a:schemeClr val="accent1"/>
+          </a:fillRef>
+          <a:effectRef idx="0">
+            <a:schemeClr val="accent1"/>
+          </a:effectRef>
+          <a:fontRef idx="minor">
+            <a:schemeClr val="lt1"/>
+          </a:fontRef>
+        </p:style>
+        <p:txBody>
+          <a:bodyPr rtlCol="0" anchor="ctr"/>
+          <a:lstStyle/>
+          <a:p>
+            <a:pPr algn="ctr"/>
+            <a:r>
+              <a:rPr lang="en-US" sz="2600" dirty="0" smtClean="0">
+                <a:solidFill>
+                  <a:schemeClr val="tx1"/>
+                </a:solidFill>
+                <a:latin typeface="Comic Sans MS" pitchFamily="66" charset="0"/>
+              </a:rPr>
+              <a:t>Base</a:t>
+            </a:r>
+            <a:endParaRPr lang="en-US" sz="2600" dirty="0">
+              <a:solidFill>
+                <a:schemeClr val="tx1"/>
+              </a:solidFill>
+              <a:latin typeface="Comic Sans MS" pitchFamily="66" charset="0"/>
+            </a:endParaRPr>
+          </a:p>
+        </p:txBody>
+      </p:sp>
+      <p:sp>
+        <p:nvSpPr>
+          <p:cNvPr id="5" name="Rectangle 4"/>
+          <p:cNvSpPr/>
+          <p:nvPr/>
+        </p:nvSpPr>
+        <p:spPr>
+          <a:xfrm>
+            <a:off x="1828800" y="3964380"/>
+            <a:ext cx="1828800" cy="914400"/>
+          </a:xfrm>
+          <a:prstGeom prst="rect">
+            <a:avLst/>
+          </a:prstGeom>
+          <a:solidFill>
+            <a:schemeClr val="bg1"/>
+          </a:solidFill>
+          <a:ln>
+            <a:solidFill>
+              <a:schemeClr val="tx1"/>
+            </a:solidFill>
+          </a:ln>
+        </p:spPr>
+        <p:style>
+          <a:lnRef idx="2">
+            <a:schemeClr val="accent1">
+              <a:shade val="50000"/>
+            </a:schemeClr>
+          </a:lnRef>
+          <a:fillRef idx="1">
+            <a:schemeClr val="accent1"/>
+          </a:fillRef>
+          <a:effectRef idx="0">
+            <a:schemeClr val="accent1"/>
+          </a:effectRef>
+          <a:fontRef idx="minor">
+            <a:schemeClr val="lt1"/>
+          </a:fontRef>
+        </p:style>
+        <p:txBody>
+          <a:bodyPr rtlCol="0" anchor="ctr"/>
+          <a:lstStyle/>
+          <a:p>
+            <a:pPr algn="ctr"/>
+            <a:r>
+              <a:rPr lang="en-US" sz="2600" dirty="0" smtClean="0">
+                <a:solidFill>
+                  <a:schemeClr val="tx1"/>
+                </a:solidFill>
+                <a:latin typeface="Comic Sans MS" pitchFamily="66" charset="0"/>
+              </a:rPr>
+              <a:t>Core</a:t>
+            </a:r>
+            <a:endParaRPr lang="en-US" sz="2600" dirty="0">
+              <a:solidFill>
+                <a:schemeClr val="tx1"/>
+              </a:solidFill>
+              <a:latin typeface="Comic Sans MS" pitchFamily="66" charset="0"/>
+            </a:endParaRPr>
+          </a:p>
+        </p:txBody>
+      </p:sp>
+      <p:sp>
+        <p:nvSpPr>
+          <p:cNvPr id="6" name="Rectangle 5"/>
+          <p:cNvSpPr/>
+          <p:nvPr/>
+        </p:nvSpPr>
+        <p:spPr>
+          <a:xfrm>
+            <a:off x="5486400" y="3964380"/>
+            <a:ext cx="1828800" cy="914400"/>
+          </a:xfrm>
+          <a:prstGeom prst="rect">
+            <a:avLst/>
+          </a:prstGeom>
+          <a:solidFill>
+            <a:schemeClr val="bg1"/>
+          </a:solidFill>
+          <a:ln>
+            <a:solidFill>
+              <a:schemeClr val="tx1"/>
+            </a:solidFill>
+          </a:ln>
+        </p:spPr>
+        <p:style>
+          <a:lnRef idx="2">
+            <a:schemeClr val="accent1">
+              <a:shade val="50000"/>
+            </a:schemeClr>
+          </a:lnRef>
+          <a:fillRef idx="1">
+            <a:schemeClr val="accent1"/>
+          </a:fillRef>
+          <a:effectRef idx="0">
+            <a:schemeClr val="accent1"/>
+          </a:effectRef>
+          <a:fontRef idx="minor">
+            <a:schemeClr val="lt1"/>
+          </a:fontRef>
+        </p:style>
+        <p:txBody>
+          <a:bodyPr rtlCol="0" anchor="ctr"/>
+          <a:lstStyle/>
+          <a:p>
+            <a:pPr algn="ctr"/>
+            <a:r>
+              <a:rPr lang="en-US" sz="2600" dirty="0" smtClean="0">
+                <a:solidFill>
+                  <a:schemeClr val="tx1"/>
+                </a:solidFill>
+                <a:latin typeface="Comic Sans MS" pitchFamily="66" charset="0"/>
+              </a:rPr>
+              <a:t>Stackable</a:t>
+            </a:r>
+            <a:endParaRPr lang="en-US" sz="2600" dirty="0">
+              <a:solidFill>
+                <a:schemeClr val="tx1"/>
+              </a:solidFill>
+              <a:latin typeface="Comic Sans MS" pitchFamily="66" charset="0"/>
+            </a:endParaRPr>
+          </a:p>
+        </p:txBody>
+      </p:sp>
+      <p:cxnSp>
+        <p:nvCxnSpPr>
+          <p:cNvPr id="8" name="Straight Connector 7"/>
+          <p:cNvCxnSpPr/>
+          <p:nvPr/>
+        </p:nvCxnSpPr>
+        <p:spPr>
+          <a:xfrm>
+            <a:off x="2729552" y="3036332"/>
+            <a:ext cx="3685032" cy="0"/>
+          </a:xfrm>
+          <a:prstGeom prst="line">
+            <a:avLst/>
+          </a:prstGeom>
+          <a:ln w="25400">
+            <a:solidFill>
+              <a:schemeClr val="tx1"/>
+            </a:solidFill>
+          </a:ln>
+        </p:spPr>
+        <p:style>
+          <a:lnRef idx="1">
+            <a:schemeClr val="accent1"/>
+          </a:lnRef>
+          <a:fillRef idx="0">
+            <a:schemeClr val="accent1"/>
+          </a:fillRef>
+          <a:effectRef idx="0">
+            <a:schemeClr val="accent1"/>
+          </a:effectRef>
+          <a:fontRef idx="minor">
+            <a:schemeClr val="tx1"/>
+          </a:fontRef>
+        </p:style>
+      </p:cxnSp>
+      <p:cxnSp>
+        <p:nvCxnSpPr>
+          <p:cNvPr id="10" name="Straight Connector 9"/>
+          <p:cNvCxnSpPr>
+            <a:stCxn id="5" idx="0"/>
+          </p:cNvCxnSpPr>
+          <p:nvPr/>
+        </p:nvCxnSpPr>
+        <p:spPr>
+          <a:xfrm flipV="1">
+            <a:off x="2743200" y="3049980"/>
+            <a:ext cx="0" cy="914400"/>
+          </a:xfrm>
+          <a:prstGeom prst="line">
+            <a:avLst/>
+          </a:prstGeom>
+          <a:ln w="25400">
+            <a:solidFill>
+              <a:schemeClr val="tx1"/>
+            </a:solidFill>
+          </a:ln>
+        </p:spPr>
+        <p:style>
+          <a:lnRef idx="1">
+            <a:schemeClr val="accent1"/>
+          </a:lnRef>
+          <a:fillRef idx="0">
+            <a:schemeClr val="accent1"/>
+          </a:fillRef>
+          <a:effectRef idx="0">
+            <a:schemeClr val="accent1"/>
+          </a:effectRef>
+          <a:fontRef idx="minor">
+            <a:schemeClr val="tx1"/>
+          </a:fontRef>
+        </p:style>
+      </p:cxnSp>
+      <p:cxnSp>
+        <p:nvCxnSpPr>
+          <p:cNvPr id="12" name="Straight Connector 11"/>
+          <p:cNvCxnSpPr>
+            <a:endCxn id="6" idx="0"/>
+          </p:cNvCxnSpPr>
+          <p:nvPr/>
+        </p:nvCxnSpPr>
+        <p:spPr>
+          <a:xfrm>
+            <a:off x="6400800" y="3036332"/>
+            <a:ext cx="0" cy="928048"/>
+          </a:xfrm>
+          <a:prstGeom prst="line">
+            <a:avLst/>
+          </a:prstGeom>
+          <a:ln w="25400">
+            <a:solidFill>
+              <a:schemeClr val="tx1"/>
+            </a:solidFill>
+          </a:ln>
+        </p:spPr>
+        <p:style>
+          <a:lnRef idx="1">
+            <a:schemeClr val="accent1"/>
+          </a:lnRef>
+          <a:fillRef idx="0">
+            <a:schemeClr val="accent1"/>
+          </a:fillRef>
+          <a:effectRef idx="0">
+            <a:schemeClr val="accent1"/>
+          </a:effectRef>
+          <a:fontRef idx="minor">
+            <a:schemeClr val="tx1"/>
+          </a:fontRef>
+        </p:style>
+      </p:cxnSp>
+      <p:cxnSp>
+        <p:nvCxnSpPr>
+          <p:cNvPr id="14" name="Straight Arrow Connector 13"/>
+          <p:cNvCxnSpPr>
+            <a:endCxn id="4" idx="2"/>
+          </p:cNvCxnSpPr>
+          <p:nvPr/>
+        </p:nvCxnSpPr>
+        <p:spPr>
+          <a:xfrm flipV="1">
+            <a:off x="4572000" y="2135580"/>
+            <a:ext cx="0" cy="900752"/>
+          </a:xfrm>
+          <a:prstGeom prst="straightConnector1">
+            <a:avLst/>
+          </a:prstGeom>
+          <a:ln w="38100" cap="flat">
+            <a:solidFill>
+              <a:schemeClr val="tx1"/>
+            </a:solidFill>
+            <a:tailEnd type="triangle"/>
+          </a:ln>
+        </p:spPr>
+        <p:style>
+          <a:lnRef idx="1">
+            <a:schemeClr val="accent1"/>
+          </a:lnRef>
+          <a:fillRef idx="0">
+            <a:schemeClr val="accent1"/>
+          </a:fillRef>
+          <a:effectRef idx="0">
+            <a:schemeClr val="accent1"/>
+          </a:effectRef>
+          <a:fontRef idx="minor">
+            <a:schemeClr val="tx1"/>
+          </a:fontRef>
+        </p:style>
+      </p:cxnSp>
+      <p:sp>
+        <p:nvSpPr>
+          <p:cNvPr id="21" name="TextBox 20"/>
+          <p:cNvSpPr txBox="1"/>
+          <p:nvPr/>
+        </p:nvSpPr>
+        <p:spPr>
+          <a:xfrm>
+            <a:off x="2743200" y="838200"/>
+            <a:ext cx="3657600" cy="369332"/>
+          </a:xfrm>
+          <a:prstGeom prst="rect">
+            <a:avLst/>
+          </a:prstGeom>
+          <a:noFill/>
+        </p:spPr>
+        <p:txBody>
+          <a:bodyPr wrap="square" rtlCol="0">
+            <a:spAutoFit/>
+          </a:bodyPr>
+          <a:lstStyle/>
+          <a:p>
+            <a:pPr algn="ctr"/>
+            <a:r>
+              <a:rPr lang="en-US" dirty="0" smtClean="0">
+                <a:latin typeface="Consolas" pitchFamily="49" charset="0"/>
+                <a:cs typeface="Consolas" pitchFamily="49" charset="0"/>
+              </a:rPr>
+              <a:t>abstract class or trait</a:t>
+            </a:r>
+            <a:endParaRPr lang="en-US" dirty="0">
+              <a:latin typeface="Consolas" pitchFamily="49" charset="0"/>
+              <a:cs typeface="Consolas" pitchFamily="49" charset="0"/>
+            </a:endParaRPr>
+          </a:p>
+        </p:txBody>
+      </p:sp>
+      <p:sp>
+        <p:nvSpPr>
+          <p:cNvPr id="22" name="TextBox 21"/>
+          <p:cNvSpPr txBox="1"/>
+          <p:nvPr/>
+        </p:nvSpPr>
+        <p:spPr>
+          <a:xfrm>
+            <a:off x="914400" y="4876800"/>
+            <a:ext cx="3657600" cy="369332"/>
+          </a:xfrm>
+          <a:prstGeom prst="rect">
+            <a:avLst/>
+          </a:prstGeom>
+          <a:noFill/>
+        </p:spPr>
+        <p:txBody>
+          <a:bodyPr wrap="square" rtlCol="0">
+            <a:spAutoFit/>
+          </a:bodyPr>
+          <a:lstStyle/>
+          <a:p>
+            <a:pPr algn="ctr"/>
+            <a:r>
+              <a:rPr lang="en-US" dirty="0">
+                <a:latin typeface="Consolas" pitchFamily="49" charset="0"/>
+                <a:cs typeface="Consolas" pitchFamily="49" charset="0"/>
+              </a:rPr>
+              <a:t>c</a:t>
+            </a:r>
+            <a:r>
+              <a:rPr lang="en-US" dirty="0" smtClean="0">
+                <a:latin typeface="Consolas" pitchFamily="49" charset="0"/>
+                <a:cs typeface="Consolas" pitchFamily="49" charset="0"/>
+              </a:rPr>
+              <a:t>lass(</a:t>
+            </a:r>
+            <a:r>
+              <a:rPr lang="en-US" dirty="0" err="1" smtClean="0">
+                <a:latin typeface="Consolas" pitchFamily="49" charset="0"/>
+                <a:cs typeface="Consolas" pitchFamily="49" charset="0"/>
+              </a:rPr>
+              <a:t>es</a:t>
+            </a:r>
+            <a:r>
+              <a:rPr lang="en-US" dirty="0" smtClean="0">
+                <a:latin typeface="Consolas" pitchFamily="49" charset="0"/>
+                <a:cs typeface="Consolas" pitchFamily="49" charset="0"/>
+              </a:rPr>
+              <a:t>)</a:t>
+            </a:r>
+            <a:endParaRPr lang="en-US" dirty="0">
+              <a:latin typeface="Consolas" pitchFamily="49" charset="0"/>
+              <a:cs typeface="Consolas" pitchFamily="49" charset="0"/>
+            </a:endParaRPr>
+          </a:p>
+        </p:txBody>
+      </p:sp>
+      <p:sp>
+        <p:nvSpPr>
+          <p:cNvPr id="23" name="TextBox 22"/>
+          <p:cNvSpPr txBox="1"/>
+          <p:nvPr/>
+        </p:nvSpPr>
+        <p:spPr>
+          <a:xfrm>
+            <a:off x="4572000" y="4878780"/>
+            <a:ext cx="3657600" cy="369332"/>
+          </a:xfrm>
+          <a:prstGeom prst="rect">
+            <a:avLst/>
+          </a:prstGeom>
+          <a:noFill/>
+        </p:spPr>
+        <p:txBody>
+          <a:bodyPr wrap="square" rtlCol="0">
+            <a:spAutoFit/>
+          </a:bodyPr>
+          <a:lstStyle/>
+          <a:p>
+            <a:pPr algn="ctr"/>
+            <a:r>
+              <a:rPr lang="en-US" dirty="0" smtClean="0">
+                <a:latin typeface="Consolas" pitchFamily="49" charset="0"/>
+                <a:cs typeface="Consolas" pitchFamily="49" charset="0"/>
+              </a:rPr>
+              <a:t>traits</a:t>
+            </a:r>
+            <a:endParaRPr lang="en-US" dirty="0">
+              <a:latin typeface="Consolas" pitchFamily="49" charset="0"/>
+              <a:cs typeface="Consolas" pitchFamily="49" charset="0"/>
+            </a:endParaRPr>
+          </a:p>
+        </p:txBody>
+      </p:sp>
+    </p:spTree>
+    <p:extLst>
+      <p:ext uri="{BB962C8B-B14F-4D97-AF65-F5344CB8AC3E}">
+        <p14:creationId xmlns:p14="http://schemas.microsoft.com/office/powerpoint/2010/main" val="3057425437"/>
+      </p:ext>
+    </p:extLst>
+  </p:cSld>
+  <p:clrMapOvr>
+    <a:masterClrMapping/>
+  </p:clrMapOvr>
+  <p:timing>
+    <p:tnLst>
+      <p:par>
+        <p:cTn id="1" dur="indefinite" restart="never" nodeType="tmRoot"/>
+      </p:par>
+    </p:tnLst>
+  </p:timing>
 </p:sld>
 </file>
 

</xml_diff>

<commit_message>
Refatored the 13th chapter
</commit_message>
<xml_diff>
--- a/ScalaLecture/source/resources/Graphics.pptx
+++ b/ScalaLecture/source/resources/Graphics.pptx
@@ -32,6 +32,8 @@
     <p:sldId id="281" r:id="rId26"/>
     <p:sldId id="282" r:id="rId27"/>
     <p:sldId id="283" r:id="rId28"/>
+    <p:sldId id="284" r:id="rId29"/>
+    <p:sldId id="285" r:id="rId30"/>
   </p:sldIdLst>
   <p:sldSz cx="9144000" cy="6858000" type="screen4x3"/>
   <p:notesSz cx="6858000" cy="9144000"/>
@@ -315,7 +317,7 @@
             <a:fld id="{1D8BD707-D9CF-40AE-B4C6-C98DA3205C09}" type="datetimeFigureOut">
               <a:rPr lang="en-US" smtClean="0"/>
               <a:pPr/>
-              <a:t>6/17/2012</a:t>
+              <a:t>6/18/2012</a:t>
             </a:fld>
             <a:endParaRPr lang="en-US"/>
           </a:p>
@@ -482,7 +484,7 @@
             <a:fld id="{1D8BD707-D9CF-40AE-B4C6-C98DA3205C09}" type="datetimeFigureOut">
               <a:rPr lang="en-US" smtClean="0"/>
               <a:pPr/>
-              <a:t>6/17/2012</a:t>
+              <a:t>6/18/2012</a:t>
             </a:fld>
             <a:endParaRPr lang="en-US"/>
           </a:p>
@@ -659,7 +661,7 @@
             <a:fld id="{1D8BD707-D9CF-40AE-B4C6-C98DA3205C09}" type="datetimeFigureOut">
               <a:rPr lang="en-US" smtClean="0"/>
               <a:pPr/>
-              <a:t>6/17/2012</a:t>
+              <a:t>6/18/2012</a:t>
             </a:fld>
             <a:endParaRPr lang="en-US"/>
           </a:p>
@@ -826,7 +828,7 @@
             <a:fld id="{1D8BD707-D9CF-40AE-B4C6-C98DA3205C09}" type="datetimeFigureOut">
               <a:rPr lang="en-US" smtClean="0"/>
               <a:pPr/>
-              <a:t>6/17/2012</a:t>
+              <a:t>6/18/2012</a:t>
             </a:fld>
             <a:endParaRPr lang="en-US"/>
           </a:p>
@@ -1069,7 +1071,7 @@
             <a:fld id="{1D8BD707-D9CF-40AE-B4C6-C98DA3205C09}" type="datetimeFigureOut">
               <a:rPr lang="en-US" smtClean="0"/>
               <a:pPr/>
-              <a:t>6/17/2012</a:t>
+              <a:t>6/18/2012</a:t>
             </a:fld>
             <a:endParaRPr lang="en-US"/>
           </a:p>
@@ -1354,7 +1356,7 @@
             <a:fld id="{1D8BD707-D9CF-40AE-B4C6-C98DA3205C09}" type="datetimeFigureOut">
               <a:rPr lang="en-US" smtClean="0"/>
               <a:pPr/>
-              <a:t>6/17/2012</a:t>
+              <a:t>6/18/2012</a:t>
             </a:fld>
             <a:endParaRPr lang="en-US"/>
           </a:p>
@@ -1773,7 +1775,7 @@
             <a:fld id="{1D8BD707-D9CF-40AE-B4C6-C98DA3205C09}" type="datetimeFigureOut">
               <a:rPr lang="en-US" smtClean="0"/>
               <a:pPr/>
-              <a:t>6/17/2012</a:t>
+              <a:t>6/18/2012</a:t>
             </a:fld>
             <a:endParaRPr lang="en-US"/>
           </a:p>
@@ -1888,7 +1890,7 @@
             <a:fld id="{1D8BD707-D9CF-40AE-B4C6-C98DA3205C09}" type="datetimeFigureOut">
               <a:rPr lang="en-US" smtClean="0"/>
               <a:pPr/>
-              <a:t>6/17/2012</a:t>
+              <a:t>6/18/2012</a:t>
             </a:fld>
             <a:endParaRPr lang="en-US"/>
           </a:p>
@@ -1980,7 +1982,7 @@
             <a:fld id="{1D8BD707-D9CF-40AE-B4C6-C98DA3205C09}" type="datetimeFigureOut">
               <a:rPr lang="en-US" smtClean="0"/>
               <a:pPr/>
-              <a:t>6/17/2012</a:t>
+              <a:t>6/18/2012</a:t>
             </a:fld>
             <a:endParaRPr lang="en-US"/>
           </a:p>
@@ -2254,7 +2256,7 @@
             <a:fld id="{1D8BD707-D9CF-40AE-B4C6-C98DA3205C09}" type="datetimeFigureOut">
               <a:rPr lang="en-US" smtClean="0"/>
               <a:pPr/>
-              <a:t>6/17/2012</a:t>
+              <a:t>6/18/2012</a:t>
             </a:fld>
             <a:endParaRPr lang="en-US"/>
           </a:p>
@@ -2504,7 +2506,7 @@
             <a:fld id="{1D8BD707-D9CF-40AE-B4C6-C98DA3205C09}" type="datetimeFigureOut">
               <a:rPr lang="en-US" smtClean="0"/>
               <a:pPr/>
-              <a:t>6/17/2012</a:t>
+              <a:t>6/18/2012</a:t>
             </a:fld>
             <a:endParaRPr lang="en-US"/>
           </a:p>
@@ -2714,7 +2716,7 @@
             <a:fld id="{1D8BD707-D9CF-40AE-B4C6-C98DA3205C09}" type="datetimeFigureOut">
               <a:rPr lang="en-US" smtClean="0"/>
               <a:pPr/>
-              <a:t>6/17/2012</a:t>
+              <a:t>6/18/2012</a:t>
             </a:fld>
             <a:endParaRPr lang="en-US"/>
           </a:p>
@@ -19942,6 +19944,1097 @@
     <p:extLst>
       <p:ext uri="{BB962C8B-B14F-4D97-AF65-F5344CB8AC3E}">
         <p14:creationId xmlns:p14="http://schemas.microsoft.com/office/powerpoint/2010/main" val="881278509"/>
+      </p:ext>
+    </p:extLst>
+  </p:cSld>
+  <p:clrMapOvr>
+    <a:masterClrMapping/>
+  </p:clrMapOvr>
+  <p:timing>
+    <p:tnLst>
+      <p:par>
+        <p:cTn id="1" dur="indefinite" restart="never" nodeType="tmRoot"/>
+      </p:par>
+    </p:tnLst>
+  </p:timing>
+</p:sld>
+</file>
+
+<file path=ppt/slides/slide28.xml><?xml version="1.0" encoding="utf-8"?>
+<p:sld xmlns:a="http://schemas.openxmlformats.org/drawingml/2006/main" xmlns:r="http://schemas.openxmlformats.org/officeDocument/2006/relationships" xmlns:p="http://schemas.openxmlformats.org/presentationml/2006/main">
+  <p:cSld>
+    <p:spTree>
+      <p:nvGrpSpPr>
+        <p:cNvPr id="1" name=""/>
+        <p:cNvGrpSpPr/>
+        <p:nvPr/>
+      </p:nvGrpSpPr>
+      <p:grpSpPr>
+        <a:xfrm>
+          <a:off x="0" y="0"/>
+          <a:ext cx="0" cy="0"/>
+          <a:chOff x="0" y="0"/>
+          <a:chExt cx="0" cy="0"/>
+        </a:xfrm>
+      </p:grpSpPr>
+      <p:sp>
+        <p:nvSpPr>
+          <p:cNvPr id="4" name="Rectangle 3"/>
+          <p:cNvSpPr/>
+          <p:nvPr/>
+        </p:nvSpPr>
+        <p:spPr>
+          <a:xfrm>
+            <a:off x="3290248" y="1143000"/>
+            <a:ext cx="2555544" cy="3810000"/>
+          </a:xfrm>
+          <a:prstGeom prst="rect">
+            <a:avLst/>
+          </a:prstGeom>
+          <a:effectLst>
+            <a:softEdge rad="63500"/>
+          </a:effectLst>
+        </p:spPr>
+        <p:style>
+          <a:lnRef idx="2">
+            <a:schemeClr val="accent1">
+              <a:shade val="50000"/>
+            </a:schemeClr>
+          </a:lnRef>
+          <a:fillRef idx="1">
+            <a:schemeClr val="accent1"/>
+          </a:fillRef>
+          <a:effectRef idx="0">
+            <a:schemeClr val="accent1"/>
+          </a:effectRef>
+          <a:fontRef idx="minor">
+            <a:schemeClr val="lt1"/>
+          </a:fontRef>
+        </p:style>
+        <p:txBody>
+          <a:bodyPr rtlCol="0" anchor="ctr"/>
+          <a:lstStyle/>
+          <a:p>
+            <a:pPr algn="ctr"/>
+            <a:endParaRPr lang="en-US" dirty="0"/>
+          </a:p>
+        </p:txBody>
+      </p:sp>
+      <p:sp>
+        <p:nvSpPr>
+          <p:cNvPr id="5" name="Rectangle 4"/>
+          <p:cNvSpPr/>
+          <p:nvPr/>
+        </p:nvSpPr>
+        <p:spPr>
+          <a:xfrm>
+            <a:off x="3581400" y="1905000"/>
+            <a:ext cx="1981200" cy="914400"/>
+          </a:xfrm>
+          <a:prstGeom prst="rect">
+            <a:avLst/>
+          </a:prstGeom>
+          <a:solidFill>
+            <a:schemeClr val="accent2">
+              <a:lumMod val="60000"/>
+              <a:lumOff val="40000"/>
+            </a:schemeClr>
+          </a:solidFill>
+          <a:effectLst>
+            <a:softEdge rad="63500"/>
+          </a:effectLst>
+        </p:spPr>
+        <p:style>
+          <a:lnRef idx="2">
+            <a:schemeClr val="accent1">
+              <a:shade val="50000"/>
+            </a:schemeClr>
+          </a:lnRef>
+          <a:fillRef idx="1">
+            <a:schemeClr val="accent1"/>
+          </a:fillRef>
+          <a:effectRef idx="0">
+            <a:schemeClr val="accent1"/>
+          </a:effectRef>
+          <a:fontRef idx="minor">
+            <a:schemeClr val="lt1"/>
+          </a:fontRef>
+        </p:style>
+        <p:txBody>
+          <a:bodyPr rtlCol="0" anchor="ctr"/>
+          <a:lstStyle/>
+          <a:p>
+            <a:pPr algn="ctr"/>
+            <a:r>
+              <a:rPr lang="en-US" b="1" dirty="0" smtClean="0"/>
+              <a:t>Behavior</a:t>
+            </a:r>
+            <a:endParaRPr lang="en-US" b="1" dirty="0"/>
+          </a:p>
+        </p:txBody>
+      </p:sp>
+      <p:sp>
+        <p:nvSpPr>
+          <p:cNvPr id="6" name="Rectangle 5"/>
+          <p:cNvSpPr/>
+          <p:nvPr/>
+        </p:nvSpPr>
+        <p:spPr>
+          <a:xfrm>
+            <a:off x="3581400" y="3429000"/>
+            <a:ext cx="1981200" cy="914400"/>
+          </a:xfrm>
+          <a:prstGeom prst="rect">
+            <a:avLst/>
+          </a:prstGeom>
+          <a:solidFill>
+            <a:srgbClr val="92D050"/>
+          </a:solidFill>
+          <a:effectLst>
+            <a:softEdge rad="63500"/>
+          </a:effectLst>
+        </p:spPr>
+        <p:style>
+          <a:lnRef idx="2">
+            <a:schemeClr val="accent1">
+              <a:shade val="50000"/>
+            </a:schemeClr>
+          </a:lnRef>
+          <a:fillRef idx="1">
+            <a:schemeClr val="accent1"/>
+          </a:fillRef>
+          <a:effectRef idx="0">
+            <a:schemeClr val="accent1"/>
+          </a:effectRef>
+          <a:fontRef idx="minor">
+            <a:schemeClr val="lt1"/>
+          </a:fontRef>
+        </p:style>
+        <p:txBody>
+          <a:bodyPr rtlCol="0" anchor="ctr"/>
+          <a:lstStyle/>
+          <a:p>
+            <a:pPr algn="ctr"/>
+            <a:r>
+              <a:rPr lang="en-US" b="1" dirty="0" smtClean="0">
+                <a:solidFill>
+                  <a:schemeClr val="bg1"/>
+                </a:solidFill>
+              </a:rPr>
+              <a:t>State</a:t>
+            </a:r>
+            <a:endParaRPr lang="en-US" b="1" dirty="0">
+              <a:solidFill>
+                <a:schemeClr val="bg1"/>
+              </a:solidFill>
+            </a:endParaRPr>
+          </a:p>
+        </p:txBody>
+      </p:sp>
+      <p:sp>
+        <p:nvSpPr>
+          <p:cNvPr id="8" name="Rectangle 7"/>
+          <p:cNvSpPr/>
+          <p:nvPr/>
+        </p:nvSpPr>
+        <p:spPr>
+          <a:xfrm>
+            <a:off x="3581400" y="1336344"/>
+            <a:ext cx="1981200" cy="457200"/>
+          </a:xfrm>
+          <a:prstGeom prst="rect">
+            <a:avLst/>
+          </a:prstGeom>
+          <a:solidFill>
+            <a:schemeClr val="accent1"/>
+          </a:solidFill>
+          <a:effectLst>
+            <a:softEdge rad="63500"/>
+          </a:effectLst>
+        </p:spPr>
+        <p:style>
+          <a:lnRef idx="2">
+            <a:schemeClr val="accent1">
+              <a:shade val="50000"/>
+            </a:schemeClr>
+          </a:lnRef>
+          <a:fillRef idx="1">
+            <a:schemeClr val="accent1"/>
+          </a:fillRef>
+          <a:effectRef idx="0">
+            <a:schemeClr val="accent1"/>
+          </a:effectRef>
+          <a:fontRef idx="minor">
+            <a:schemeClr val="lt1"/>
+          </a:fontRef>
+        </p:style>
+        <p:txBody>
+          <a:bodyPr rtlCol="0" anchor="ctr"/>
+          <a:lstStyle/>
+          <a:p>
+            <a:pPr algn="ctr"/>
+            <a:r>
+              <a:rPr lang="en-US" sz="2400" b="1" dirty="0" smtClean="0"/>
+              <a:t>Actor</a:t>
+            </a:r>
+            <a:endParaRPr lang="en-US" sz="2400" b="1" dirty="0"/>
+          </a:p>
+        </p:txBody>
+      </p:sp>
+      <p:sp>
+        <p:nvSpPr>
+          <p:cNvPr id="9" name="Rectangle 8"/>
+          <p:cNvSpPr/>
+          <p:nvPr/>
+        </p:nvSpPr>
+        <p:spPr>
+          <a:xfrm>
+            <a:off x="5181600" y="1344304"/>
+            <a:ext cx="1676400" cy="457200"/>
+          </a:xfrm>
+          <a:prstGeom prst="rect">
+            <a:avLst/>
+          </a:prstGeom>
+          <a:solidFill>
+            <a:schemeClr val="accent1">
+              <a:lumMod val="60000"/>
+              <a:lumOff val="40000"/>
+            </a:schemeClr>
+          </a:solidFill>
+          <a:ln>
+            <a:solidFill>
+              <a:schemeClr val="tx2">
+                <a:lumMod val="40000"/>
+                <a:lumOff val="60000"/>
+              </a:schemeClr>
+            </a:solidFill>
+          </a:ln>
+          <a:effectLst>
+            <a:softEdge rad="63500"/>
+          </a:effectLst>
+        </p:spPr>
+        <p:style>
+          <a:lnRef idx="2">
+            <a:schemeClr val="accent1">
+              <a:shade val="50000"/>
+            </a:schemeClr>
+          </a:lnRef>
+          <a:fillRef idx="1">
+            <a:schemeClr val="accent1"/>
+          </a:fillRef>
+          <a:effectRef idx="0">
+            <a:schemeClr val="accent1"/>
+          </a:effectRef>
+          <a:fontRef idx="minor">
+            <a:schemeClr val="lt1"/>
+          </a:fontRef>
+        </p:style>
+        <p:txBody>
+          <a:bodyPr rtlCol="0" anchor="ctr"/>
+          <a:lstStyle/>
+          <a:p>
+            <a:pPr algn="ctr"/>
+            <a:endParaRPr lang="en-US"/>
+          </a:p>
+        </p:txBody>
+      </p:sp>
+      <p:sp>
+        <p:nvSpPr>
+          <p:cNvPr id="10" name="Oval 9"/>
+          <p:cNvSpPr/>
+          <p:nvPr/>
+        </p:nvSpPr>
+        <p:spPr>
+          <a:xfrm>
+            <a:off x="6449704" y="1426192"/>
+            <a:ext cx="304800" cy="304800"/>
+          </a:xfrm>
+          <a:prstGeom prst="ellipse">
+            <a:avLst/>
+          </a:prstGeom>
+          <a:solidFill>
+            <a:srgbClr val="00B0F0"/>
+          </a:solidFill>
+          <a:ln>
+            <a:solidFill>
+              <a:schemeClr val="tx1"/>
+            </a:solidFill>
+          </a:ln>
+        </p:spPr>
+        <p:style>
+          <a:lnRef idx="2">
+            <a:schemeClr val="accent1">
+              <a:shade val="50000"/>
+            </a:schemeClr>
+          </a:lnRef>
+          <a:fillRef idx="1">
+            <a:schemeClr val="accent1"/>
+          </a:fillRef>
+          <a:effectRef idx="0">
+            <a:schemeClr val="accent1"/>
+          </a:effectRef>
+          <a:fontRef idx="minor">
+            <a:schemeClr val="lt1"/>
+          </a:fontRef>
+        </p:style>
+        <p:txBody>
+          <a:bodyPr rtlCol="0" anchor="ctr"/>
+          <a:lstStyle/>
+          <a:p>
+            <a:pPr algn="ctr"/>
+            <a:endParaRPr lang="en-US"/>
+          </a:p>
+        </p:txBody>
+      </p:sp>
+      <p:sp>
+        <p:nvSpPr>
+          <p:cNvPr id="11" name="Oval 10"/>
+          <p:cNvSpPr/>
+          <p:nvPr/>
+        </p:nvSpPr>
+        <p:spPr>
+          <a:xfrm>
+            <a:off x="6082352" y="1420504"/>
+            <a:ext cx="304800" cy="304800"/>
+          </a:xfrm>
+          <a:prstGeom prst="ellipse">
+            <a:avLst/>
+          </a:prstGeom>
+          <a:solidFill>
+            <a:srgbClr val="00B0F0"/>
+          </a:solidFill>
+          <a:ln>
+            <a:solidFill>
+              <a:schemeClr val="tx1"/>
+            </a:solidFill>
+          </a:ln>
+        </p:spPr>
+        <p:style>
+          <a:lnRef idx="2">
+            <a:schemeClr val="accent1">
+              <a:shade val="50000"/>
+            </a:schemeClr>
+          </a:lnRef>
+          <a:fillRef idx="1">
+            <a:schemeClr val="accent1"/>
+          </a:fillRef>
+          <a:effectRef idx="0">
+            <a:schemeClr val="accent1"/>
+          </a:effectRef>
+          <a:fontRef idx="minor">
+            <a:schemeClr val="lt1"/>
+          </a:fontRef>
+        </p:style>
+        <p:txBody>
+          <a:bodyPr rtlCol="0" anchor="ctr"/>
+          <a:lstStyle/>
+          <a:p>
+            <a:pPr algn="ctr"/>
+            <a:endParaRPr lang="en-US"/>
+          </a:p>
+        </p:txBody>
+      </p:sp>
+      <p:sp>
+        <p:nvSpPr>
+          <p:cNvPr id="12" name="Oval 11"/>
+          <p:cNvSpPr/>
+          <p:nvPr/>
+        </p:nvSpPr>
+        <p:spPr>
+          <a:xfrm>
+            <a:off x="5715000" y="1426192"/>
+            <a:ext cx="304800" cy="304800"/>
+          </a:xfrm>
+          <a:prstGeom prst="ellipse">
+            <a:avLst/>
+          </a:prstGeom>
+          <a:solidFill>
+            <a:srgbClr val="00B0F0"/>
+          </a:solidFill>
+          <a:ln>
+            <a:solidFill>
+              <a:schemeClr val="tx1"/>
+            </a:solidFill>
+          </a:ln>
+        </p:spPr>
+        <p:style>
+          <a:lnRef idx="2">
+            <a:schemeClr val="accent1">
+              <a:shade val="50000"/>
+            </a:schemeClr>
+          </a:lnRef>
+          <a:fillRef idx="1">
+            <a:schemeClr val="accent1"/>
+          </a:fillRef>
+          <a:effectRef idx="0">
+            <a:schemeClr val="accent1"/>
+          </a:effectRef>
+          <a:fontRef idx="minor">
+            <a:schemeClr val="lt1"/>
+          </a:fontRef>
+        </p:style>
+        <p:txBody>
+          <a:bodyPr rtlCol="0" anchor="ctr"/>
+          <a:lstStyle/>
+          <a:p>
+            <a:pPr algn="ctr"/>
+            <a:endParaRPr lang="en-US"/>
+          </a:p>
+        </p:txBody>
+      </p:sp>
+      <p:sp>
+        <p:nvSpPr>
+          <p:cNvPr id="13" name="Oval 12"/>
+          <p:cNvSpPr/>
+          <p:nvPr/>
+        </p:nvSpPr>
+        <p:spPr>
+          <a:xfrm>
+            <a:off x="5334000" y="1420504"/>
+            <a:ext cx="304800" cy="304800"/>
+          </a:xfrm>
+          <a:prstGeom prst="ellipse">
+            <a:avLst/>
+          </a:prstGeom>
+          <a:solidFill>
+            <a:srgbClr val="00B0F0"/>
+          </a:solidFill>
+          <a:ln>
+            <a:solidFill>
+              <a:schemeClr val="tx1"/>
+            </a:solidFill>
+          </a:ln>
+        </p:spPr>
+        <p:style>
+          <a:lnRef idx="2">
+            <a:schemeClr val="accent1">
+              <a:shade val="50000"/>
+            </a:schemeClr>
+          </a:lnRef>
+          <a:fillRef idx="1">
+            <a:schemeClr val="accent1"/>
+          </a:fillRef>
+          <a:effectRef idx="0">
+            <a:schemeClr val="accent1"/>
+          </a:effectRef>
+          <a:fontRef idx="minor">
+            <a:schemeClr val="lt1"/>
+          </a:fontRef>
+        </p:style>
+        <p:txBody>
+          <a:bodyPr rtlCol="0" anchor="ctr"/>
+          <a:lstStyle/>
+          <a:p>
+            <a:pPr algn="ctr"/>
+            <a:endParaRPr lang="en-US"/>
+          </a:p>
+        </p:txBody>
+      </p:sp>
+    </p:spTree>
+    <p:extLst>
+      <p:ext uri="{BB962C8B-B14F-4D97-AF65-F5344CB8AC3E}">
+        <p14:creationId xmlns:p14="http://schemas.microsoft.com/office/powerpoint/2010/main" val="2780535464"/>
+      </p:ext>
+    </p:extLst>
+  </p:cSld>
+  <p:clrMapOvr>
+    <a:masterClrMapping/>
+  </p:clrMapOvr>
+  <p:timing>
+    <p:tnLst>
+      <p:par>
+        <p:cTn id="1" dur="indefinite" restart="never" nodeType="tmRoot"/>
+      </p:par>
+    </p:tnLst>
+  </p:timing>
+</p:sld>
+</file>
+
+<file path=ppt/slides/slide29.xml><?xml version="1.0" encoding="utf-8"?>
+<p:sld xmlns:a="http://schemas.openxmlformats.org/drawingml/2006/main" xmlns:r="http://schemas.openxmlformats.org/officeDocument/2006/relationships" xmlns:p="http://schemas.openxmlformats.org/presentationml/2006/main">
+  <p:cSld>
+    <p:spTree>
+      <p:nvGrpSpPr>
+        <p:cNvPr id="1" name=""/>
+        <p:cNvGrpSpPr/>
+        <p:nvPr/>
+      </p:nvGrpSpPr>
+      <p:grpSpPr>
+        <a:xfrm>
+          <a:off x="0" y="0"/>
+          <a:ext cx="0" cy="0"/>
+          <a:chOff x="0" y="0"/>
+          <a:chExt cx="0" cy="0"/>
+        </a:xfrm>
+      </p:grpSpPr>
+      <p:sp>
+        <p:nvSpPr>
+          <p:cNvPr id="3" name="Down Arrow 2"/>
+          <p:cNvSpPr/>
+          <p:nvPr/>
+        </p:nvSpPr>
+        <p:spPr>
+          <a:xfrm>
+            <a:off x="1690048" y="381000"/>
+            <a:ext cx="5715000" cy="5943600"/>
+          </a:xfrm>
+          <a:prstGeom prst="downArrow">
+            <a:avLst/>
+          </a:prstGeom>
+          <a:solidFill>
+            <a:srgbClr val="00B050"/>
+          </a:solidFill>
+          <a:effectLst>
+            <a:softEdge rad="63500"/>
+          </a:effectLst>
+        </p:spPr>
+        <p:style>
+          <a:lnRef idx="2">
+            <a:schemeClr val="accent1">
+              <a:shade val="50000"/>
+            </a:schemeClr>
+          </a:lnRef>
+          <a:fillRef idx="1">
+            <a:schemeClr val="accent1"/>
+          </a:fillRef>
+          <a:effectRef idx="0">
+            <a:schemeClr val="accent1"/>
+          </a:effectRef>
+          <a:fontRef idx="minor">
+            <a:schemeClr val="lt1"/>
+          </a:fontRef>
+        </p:style>
+        <p:txBody>
+          <a:bodyPr rtlCol="0" anchor="ctr"/>
+          <a:lstStyle/>
+          <a:p>
+            <a:pPr algn="ctr"/>
+            <a:endParaRPr lang="en-US"/>
+          </a:p>
+        </p:txBody>
+      </p:sp>
+      <p:sp>
+        <p:nvSpPr>
+          <p:cNvPr id="4" name="Rectangle 3"/>
+          <p:cNvSpPr/>
+          <p:nvPr/>
+        </p:nvSpPr>
+        <p:spPr>
+          <a:xfrm>
+            <a:off x="3290248" y="1143000"/>
+            <a:ext cx="2555544" cy="3810000"/>
+          </a:xfrm>
+          <a:prstGeom prst="rect">
+            <a:avLst/>
+          </a:prstGeom>
+          <a:solidFill>
+            <a:srgbClr val="00B050"/>
+          </a:solidFill>
+          <a:ln>
+            <a:solidFill>
+              <a:srgbClr val="00B050"/>
+            </a:solidFill>
+          </a:ln>
+          <a:effectLst>
+            <a:softEdge rad="63500"/>
+          </a:effectLst>
+        </p:spPr>
+        <p:style>
+          <a:lnRef idx="2">
+            <a:schemeClr val="accent1">
+              <a:shade val="50000"/>
+            </a:schemeClr>
+          </a:lnRef>
+          <a:fillRef idx="1">
+            <a:schemeClr val="accent1"/>
+          </a:fillRef>
+          <a:effectRef idx="0">
+            <a:schemeClr val="accent1"/>
+          </a:effectRef>
+          <a:fontRef idx="minor">
+            <a:schemeClr val="lt1"/>
+          </a:fontRef>
+        </p:style>
+        <p:txBody>
+          <a:bodyPr rtlCol="0" anchor="ctr"/>
+          <a:lstStyle/>
+          <a:p>
+            <a:pPr algn="ctr"/>
+            <a:endParaRPr lang="en-US" dirty="0"/>
+          </a:p>
+        </p:txBody>
+      </p:sp>
+      <p:sp>
+        <p:nvSpPr>
+          <p:cNvPr id="5" name="Rectangle 4"/>
+          <p:cNvSpPr/>
+          <p:nvPr/>
+        </p:nvSpPr>
+        <p:spPr>
+          <a:xfrm>
+            <a:off x="3581400" y="1905000"/>
+            <a:ext cx="1981200" cy="914400"/>
+          </a:xfrm>
+          <a:prstGeom prst="rect">
+            <a:avLst/>
+          </a:prstGeom>
+          <a:solidFill>
+            <a:schemeClr val="accent2">
+              <a:lumMod val="60000"/>
+              <a:lumOff val="40000"/>
+            </a:schemeClr>
+          </a:solidFill>
+          <a:effectLst>
+            <a:softEdge rad="63500"/>
+          </a:effectLst>
+        </p:spPr>
+        <p:style>
+          <a:lnRef idx="2">
+            <a:schemeClr val="accent1">
+              <a:shade val="50000"/>
+            </a:schemeClr>
+          </a:lnRef>
+          <a:fillRef idx="1">
+            <a:schemeClr val="accent1"/>
+          </a:fillRef>
+          <a:effectRef idx="0">
+            <a:schemeClr val="accent1"/>
+          </a:effectRef>
+          <a:fontRef idx="minor">
+            <a:schemeClr val="lt1"/>
+          </a:fontRef>
+        </p:style>
+        <p:txBody>
+          <a:bodyPr rtlCol="0" anchor="ctr"/>
+          <a:lstStyle/>
+          <a:p>
+            <a:pPr algn="ctr"/>
+            <a:r>
+              <a:rPr lang="en-US" b="1" dirty="0" smtClean="0"/>
+              <a:t>Behavior</a:t>
+            </a:r>
+            <a:endParaRPr lang="en-US" b="1" dirty="0"/>
+          </a:p>
+        </p:txBody>
+      </p:sp>
+      <p:sp>
+        <p:nvSpPr>
+          <p:cNvPr id="6" name="Rectangle 5"/>
+          <p:cNvSpPr/>
+          <p:nvPr/>
+        </p:nvSpPr>
+        <p:spPr>
+          <a:xfrm>
+            <a:off x="3581400" y="3429000"/>
+            <a:ext cx="1981200" cy="914400"/>
+          </a:xfrm>
+          <a:prstGeom prst="rect">
+            <a:avLst/>
+          </a:prstGeom>
+          <a:solidFill>
+            <a:srgbClr val="92D050"/>
+          </a:solidFill>
+          <a:effectLst>
+            <a:softEdge rad="63500"/>
+          </a:effectLst>
+        </p:spPr>
+        <p:style>
+          <a:lnRef idx="2">
+            <a:schemeClr val="accent1">
+              <a:shade val="50000"/>
+            </a:schemeClr>
+          </a:lnRef>
+          <a:fillRef idx="1">
+            <a:schemeClr val="accent1"/>
+          </a:fillRef>
+          <a:effectRef idx="0">
+            <a:schemeClr val="accent1"/>
+          </a:effectRef>
+          <a:fontRef idx="minor">
+            <a:schemeClr val="lt1"/>
+          </a:fontRef>
+        </p:style>
+        <p:txBody>
+          <a:bodyPr rtlCol="0" anchor="ctr"/>
+          <a:lstStyle/>
+          <a:p>
+            <a:pPr algn="ctr"/>
+            <a:r>
+              <a:rPr lang="en-US" b="1" dirty="0" smtClean="0">
+                <a:solidFill>
+                  <a:schemeClr val="bg1"/>
+                </a:solidFill>
+              </a:rPr>
+              <a:t>State</a:t>
+            </a:r>
+            <a:endParaRPr lang="en-US" b="1" dirty="0">
+              <a:solidFill>
+                <a:schemeClr val="bg1"/>
+              </a:solidFill>
+            </a:endParaRPr>
+          </a:p>
+        </p:txBody>
+      </p:sp>
+      <p:sp>
+        <p:nvSpPr>
+          <p:cNvPr id="8" name="Rectangle 7"/>
+          <p:cNvSpPr/>
+          <p:nvPr/>
+        </p:nvSpPr>
+        <p:spPr>
+          <a:xfrm>
+            <a:off x="3581400" y="1336344"/>
+            <a:ext cx="1981200" cy="457200"/>
+          </a:xfrm>
+          <a:prstGeom prst="rect">
+            <a:avLst/>
+          </a:prstGeom>
+          <a:solidFill>
+            <a:srgbClr val="00B050"/>
+          </a:solidFill>
+          <a:ln>
+            <a:solidFill>
+              <a:srgbClr val="00B050"/>
+            </a:solidFill>
+          </a:ln>
+          <a:effectLst>
+            <a:softEdge rad="63500"/>
+          </a:effectLst>
+        </p:spPr>
+        <p:style>
+          <a:lnRef idx="2">
+            <a:schemeClr val="accent1">
+              <a:shade val="50000"/>
+            </a:schemeClr>
+          </a:lnRef>
+          <a:fillRef idx="1">
+            <a:schemeClr val="accent1"/>
+          </a:fillRef>
+          <a:effectRef idx="0">
+            <a:schemeClr val="accent1"/>
+          </a:effectRef>
+          <a:fontRef idx="minor">
+            <a:schemeClr val="lt1"/>
+          </a:fontRef>
+        </p:style>
+        <p:txBody>
+          <a:bodyPr rtlCol="0" anchor="ctr"/>
+          <a:lstStyle/>
+          <a:p>
+            <a:pPr algn="ctr"/>
+            <a:r>
+              <a:rPr lang="en-US" sz="2400" b="1" dirty="0" smtClean="0"/>
+              <a:t>Actor</a:t>
+            </a:r>
+            <a:endParaRPr lang="en-US" sz="2400" b="1" dirty="0"/>
+          </a:p>
+        </p:txBody>
+      </p:sp>
+      <p:sp>
+        <p:nvSpPr>
+          <p:cNvPr id="9" name="Rectangle 8"/>
+          <p:cNvSpPr/>
+          <p:nvPr/>
+        </p:nvSpPr>
+        <p:spPr>
+          <a:xfrm>
+            <a:off x="5181600" y="1344304"/>
+            <a:ext cx="1676400" cy="457200"/>
+          </a:xfrm>
+          <a:prstGeom prst="rect">
+            <a:avLst/>
+          </a:prstGeom>
+          <a:solidFill>
+            <a:schemeClr val="accent1">
+              <a:lumMod val="60000"/>
+              <a:lumOff val="40000"/>
+            </a:schemeClr>
+          </a:solidFill>
+          <a:ln>
+            <a:solidFill>
+              <a:schemeClr val="tx2">
+                <a:lumMod val="40000"/>
+                <a:lumOff val="60000"/>
+              </a:schemeClr>
+            </a:solidFill>
+          </a:ln>
+          <a:effectLst>
+            <a:softEdge rad="63500"/>
+          </a:effectLst>
+        </p:spPr>
+        <p:style>
+          <a:lnRef idx="2">
+            <a:schemeClr val="accent1">
+              <a:shade val="50000"/>
+            </a:schemeClr>
+          </a:lnRef>
+          <a:fillRef idx="1">
+            <a:schemeClr val="accent1"/>
+          </a:fillRef>
+          <a:effectRef idx="0">
+            <a:schemeClr val="accent1"/>
+          </a:effectRef>
+          <a:fontRef idx="minor">
+            <a:schemeClr val="lt1"/>
+          </a:fontRef>
+        </p:style>
+        <p:txBody>
+          <a:bodyPr rtlCol="0" anchor="ctr"/>
+          <a:lstStyle/>
+          <a:p>
+            <a:pPr algn="ctr"/>
+            <a:endParaRPr lang="en-US"/>
+          </a:p>
+        </p:txBody>
+      </p:sp>
+      <p:sp>
+        <p:nvSpPr>
+          <p:cNvPr id="10" name="Oval 9"/>
+          <p:cNvSpPr/>
+          <p:nvPr/>
+        </p:nvSpPr>
+        <p:spPr>
+          <a:xfrm>
+            <a:off x="6449704" y="1426192"/>
+            <a:ext cx="304800" cy="304800"/>
+          </a:xfrm>
+          <a:prstGeom prst="ellipse">
+            <a:avLst/>
+          </a:prstGeom>
+          <a:solidFill>
+            <a:srgbClr val="00B0F0"/>
+          </a:solidFill>
+          <a:ln>
+            <a:solidFill>
+              <a:schemeClr val="tx1"/>
+            </a:solidFill>
+          </a:ln>
+        </p:spPr>
+        <p:style>
+          <a:lnRef idx="2">
+            <a:schemeClr val="accent1">
+              <a:shade val="50000"/>
+            </a:schemeClr>
+          </a:lnRef>
+          <a:fillRef idx="1">
+            <a:schemeClr val="accent1"/>
+          </a:fillRef>
+          <a:effectRef idx="0">
+            <a:schemeClr val="accent1"/>
+          </a:effectRef>
+          <a:fontRef idx="minor">
+            <a:schemeClr val="lt1"/>
+          </a:fontRef>
+        </p:style>
+        <p:txBody>
+          <a:bodyPr rtlCol="0" anchor="ctr"/>
+          <a:lstStyle/>
+          <a:p>
+            <a:pPr algn="ctr"/>
+            <a:endParaRPr lang="en-US"/>
+          </a:p>
+        </p:txBody>
+      </p:sp>
+      <p:sp>
+        <p:nvSpPr>
+          <p:cNvPr id="11" name="Oval 10"/>
+          <p:cNvSpPr/>
+          <p:nvPr/>
+        </p:nvSpPr>
+        <p:spPr>
+          <a:xfrm>
+            <a:off x="6082352" y="1420504"/>
+            <a:ext cx="304800" cy="304800"/>
+          </a:xfrm>
+          <a:prstGeom prst="ellipse">
+            <a:avLst/>
+          </a:prstGeom>
+          <a:solidFill>
+            <a:srgbClr val="00B0F0"/>
+          </a:solidFill>
+          <a:ln>
+            <a:solidFill>
+              <a:schemeClr val="tx1"/>
+            </a:solidFill>
+          </a:ln>
+        </p:spPr>
+        <p:style>
+          <a:lnRef idx="2">
+            <a:schemeClr val="accent1">
+              <a:shade val="50000"/>
+            </a:schemeClr>
+          </a:lnRef>
+          <a:fillRef idx="1">
+            <a:schemeClr val="accent1"/>
+          </a:fillRef>
+          <a:effectRef idx="0">
+            <a:schemeClr val="accent1"/>
+          </a:effectRef>
+          <a:fontRef idx="minor">
+            <a:schemeClr val="lt1"/>
+          </a:fontRef>
+        </p:style>
+        <p:txBody>
+          <a:bodyPr rtlCol="0" anchor="ctr"/>
+          <a:lstStyle/>
+          <a:p>
+            <a:pPr algn="ctr"/>
+            <a:endParaRPr lang="en-US"/>
+          </a:p>
+        </p:txBody>
+      </p:sp>
+      <p:sp>
+        <p:nvSpPr>
+          <p:cNvPr id="12" name="Oval 11"/>
+          <p:cNvSpPr/>
+          <p:nvPr/>
+        </p:nvSpPr>
+        <p:spPr>
+          <a:xfrm>
+            <a:off x="5715000" y="1426192"/>
+            <a:ext cx="304800" cy="304800"/>
+          </a:xfrm>
+          <a:prstGeom prst="ellipse">
+            <a:avLst/>
+          </a:prstGeom>
+          <a:solidFill>
+            <a:srgbClr val="00B0F0"/>
+          </a:solidFill>
+          <a:ln>
+            <a:solidFill>
+              <a:schemeClr val="tx1"/>
+            </a:solidFill>
+          </a:ln>
+        </p:spPr>
+        <p:style>
+          <a:lnRef idx="2">
+            <a:schemeClr val="accent1">
+              <a:shade val="50000"/>
+            </a:schemeClr>
+          </a:lnRef>
+          <a:fillRef idx="1">
+            <a:schemeClr val="accent1"/>
+          </a:fillRef>
+          <a:effectRef idx="0">
+            <a:schemeClr val="accent1"/>
+          </a:effectRef>
+          <a:fontRef idx="minor">
+            <a:schemeClr val="lt1"/>
+          </a:fontRef>
+        </p:style>
+        <p:txBody>
+          <a:bodyPr rtlCol="0" anchor="ctr"/>
+          <a:lstStyle/>
+          <a:p>
+            <a:pPr algn="ctr"/>
+            <a:endParaRPr lang="en-US"/>
+          </a:p>
+        </p:txBody>
+      </p:sp>
+      <p:sp>
+        <p:nvSpPr>
+          <p:cNvPr id="14" name="Oval 13"/>
+          <p:cNvSpPr/>
+          <p:nvPr/>
+        </p:nvSpPr>
+        <p:spPr>
+          <a:xfrm>
+            <a:off x="4405952" y="2958152"/>
+            <a:ext cx="304800" cy="304800"/>
+          </a:xfrm>
+          <a:prstGeom prst="ellipse">
+            <a:avLst/>
+          </a:prstGeom>
+          <a:solidFill>
+            <a:srgbClr val="00B0F0"/>
+          </a:solidFill>
+          <a:ln>
+            <a:solidFill>
+              <a:schemeClr val="tx1"/>
+            </a:solidFill>
+          </a:ln>
+        </p:spPr>
+        <p:style>
+          <a:lnRef idx="2">
+            <a:schemeClr val="accent1">
+              <a:shade val="50000"/>
+            </a:schemeClr>
+          </a:lnRef>
+          <a:fillRef idx="1">
+            <a:schemeClr val="accent1"/>
+          </a:fillRef>
+          <a:effectRef idx="0">
+            <a:schemeClr val="accent1"/>
+          </a:effectRef>
+          <a:fontRef idx="minor">
+            <a:schemeClr val="lt1"/>
+          </a:fontRef>
+        </p:style>
+        <p:txBody>
+          <a:bodyPr rtlCol="0" anchor="ctr"/>
+          <a:lstStyle/>
+          <a:p>
+            <a:pPr algn="ctr"/>
+            <a:endParaRPr lang="en-US"/>
+          </a:p>
+        </p:txBody>
+      </p:sp>
+      <p:sp>
+        <p:nvSpPr>
+          <p:cNvPr id="7" name="Rectangle 6"/>
+          <p:cNvSpPr/>
+          <p:nvPr/>
+        </p:nvSpPr>
+        <p:spPr>
+          <a:xfrm>
+            <a:off x="3200400" y="533400"/>
+            <a:ext cx="2667000" cy="533400"/>
+          </a:xfrm>
+          <a:prstGeom prst="rect">
+            <a:avLst/>
+          </a:prstGeom>
+          <a:solidFill>
+            <a:srgbClr val="00B050"/>
+          </a:solidFill>
+          <a:ln>
+            <a:solidFill>
+              <a:srgbClr val="00B050"/>
+            </a:solidFill>
+          </a:ln>
+        </p:spPr>
+        <p:style>
+          <a:lnRef idx="2">
+            <a:schemeClr val="accent1">
+              <a:shade val="50000"/>
+            </a:schemeClr>
+          </a:lnRef>
+          <a:fillRef idx="1">
+            <a:schemeClr val="accent1"/>
+          </a:fillRef>
+          <a:effectRef idx="0">
+            <a:schemeClr val="accent1"/>
+          </a:effectRef>
+          <a:fontRef idx="minor">
+            <a:schemeClr val="lt1"/>
+          </a:fontRef>
+        </p:style>
+        <p:txBody>
+          <a:bodyPr rtlCol="0" anchor="ctr"/>
+          <a:lstStyle/>
+          <a:p>
+            <a:pPr algn="ctr"/>
+            <a:r>
+              <a:rPr lang="en-US" b="1" dirty="0" smtClean="0"/>
+              <a:t>Event-Based Thread</a:t>
+            </a:r>
+            <a:endParaRPr lang="en-US" b="1" dirty="0"/>
+          </a:p>
+        </p:txBody>
+      </p:sp>
+    </p:spTree>
+    <p:extLst>
+      <p:ext uri="{BB962C8B-B14F-4D97-AF65-F5344CB8AC3E}">
+        <p14:creationId xmlns:p14="http://schemas.microsoft.com/office/powerpoint/2010/main" val="1810474654"/>
       </p:ext>
     </p:extLst>
   </p:cSld>

</xml_diff>